<commit_message>
adding a question works now
</commit_message>
<xml_diff>
--- a/Flask-Project/test1.pptx
+++ b/Flask-Project/test1.pptx
@@ -10,14 +10,6 @@
     <p:sldId id="258" r:id="rId10"/>
     <p:sldId id="259" r:id="rId11"/>
     <p:sldId id="260" r:id="rId12"/>
-    <p:sldId id="261" r:id="rId13"/>
-    <p:sldId id="262" r:id="rId14"/>
-    <p:sldId id="263" r:id="rId15"/>
-    <p:sldId id="264" r:id="rId16"/>
-    <p:sldId id="265" r:id="rId17"/>
-    <p:sldId id="266" r:id="rId18"/>
-    <p:sldId id="267" r:id="rId19"/>
-    <p:sldId id="268" r:id="rId20"/>
   </p:sldIdLst>
   <p:sldSz cx="9144000" cy="6858000" type="screen4x3"/>
   <p:notesSz cx="6858000" cy="9144000"/>
@@ -513,499 +505,40 @@
           <a:bodyPr/>
           <a:lstStyle/>
           <a:p/>
-          <a:p>
-            <a:r>
-              <a:t>Photosynthesis is essential for life as it provides the energy and organic compounds necessary for the survival of most living organisms. Without photosynthesis, life on Earth would be vastly different, with many species struggling to survive in an environment devoid of the vital resources provided by this process.</a:t>
-            </a:r>
-          </a:p>
           <a:p/>
           <a:p>
             <a:r>
-              <a:t>The process of photosynthesis involves the conversion of light energy from the sun into chemical bonds, which are then used to produce glucose and other organic compounds. These compounds serve as the primary source of energy for many organisms, including plants, algae, and some bacteria. In addition, photosynthesis also produces oxygen as a byproduct, which is essential for the survival of most aerobic organisms.</a:t>
+              <a:t>Photosynthesis, a fundamental process essential for life on Earth, is the means by which green plants, algae, and cyanobacteria convert light energy into chemical energy. This biochemical process primarily takes place within organelles called chloroplasts, which are found in the cells of these organisms. The process of photosynthesis can be divided into two main stages: the light-dependent reactions and the light-independent reactions, also known as the Calvin cycle.</a:t>
             </a:r>
           </a:p>
           <a:p/>
           <a:p>
             <a:r>
-              <a:t>The importance of photosynthesis cannot be overstated, as it is responsible for supporting the food chain and providing the energy required for the growth and development of countless species. Without photosynthesis, the vast majority of plants and animals would struggle to survive, leading to a significant decline in biodiversity and ecosystem health.</a:t>
+              <a:t>In the first stage, the light-dependent reactions, the plant absorbs sunlight, primarily in the visible spectrum, through its leaves. This light energy is used to split water molecules into hydrogen, oxygen, and electrons. The hydrogen and oxygen are stored separately within the plant, with the oxygen being released into the atmosphere. The electrons, along with carbon dioxide from the air and nutrients from the soil, are passed through a series of electron transport chains and enzymes to produce ATP (adenosine triphosphate) and NADPH (nicotinamide adenine dinucleotide phosphate). These molecules serve as the primary source of energy for the second stage of photosynthesis.</a:t>
             </a:r>
           </a:p>
           <a:p/>
           <a:p>
             <a:r>
-              <a:t>One of the most critical roles that photosynthesis plays is its provision of energy for herbivores. Many herbivores rely solely on plant-based diets, and without photosynthesis, these organisms would not have access to the energy-rich compounds needed to sustain themselves. The loss of these herbivores would have a ripple effect throughout entire ecosystems, leading to the decline or extinction of numerous species that depend on them.</a:t>
+              <a:t>The light-independent reactions, or Calvin cycle, take place within stroma of the chloroplasts. Here, the ATP and NADPH produced during the light-dependent reactions are utilized to convert carbon dioxide into glucose, a simple sugar that serves as the primary form of energy storage for plants. This process involves three main phases: fixation, reduction, and regeneration.</a:t>
             </a:r>
           </a:p>
           <a:p/>
           <a:p>
             <a:r>
-              <a:t>In addition to providing energy, photosynthesis also plays a crucial role in the production of oxygen. As mentioned earlier, oxygen is essential for the survival of most aerobic organisms, including humans. Without photosynthesis, the levels of oxygen in the atmosphere would rapidly decrease, making it difficult for many species to breathe and ultimately leading to their demise.</a:t>
+              <a:t>During the fixation phase, an enzyme called Rubisco (ribulose bisphosphate carboxylase/oxygenase) combines carbon dioxide with a five-carbon compound called ribulose bisphosphate to form two three-carbon compounds. In the reduction phase, the three-carbon compounds undergo a series of reactions involving NADPH and ATP, resulting in the formation of a six-carbon compound called glyceraldehyde 3-phosphate. Finally, in the regeneration phase, the ribulose bisphosphate used in the fixation phase is reformed, allowing the Calvin cycle to continue.</a:t>
             </a:r>
           </a:p>
           <a:p/>
           <a:p>
             <a:r>
-              <a:t>Furthermore, photosynthesis helps regulate the Earth's climate by removing carbon dioxide from the atmosphere and releasing oxygen. This process helps maintain a balance between the concentration of greenhouse gases and the levels of atmospheric oxygen, which is essential for maintaining a stable global climate.</a:t>
+              <a:t>The glucose formed during the Calvin cycle can be used immediately for energy or stored for later use. If it's not needed right away, the glucose molecule can be converted into other carbohydrates, such as cellulose for structural support, or starch for long-term energy storage. In addition, some of the glucose may be used to create more complex molecules, such as proteins, fats, and nucleic acids, which are essential for growth and reproduction.</a:t>
             </a:r>
           </a:p>
           <a:p/>
           <a:p>
             <a:r>
-              <a:t>The impact of photosynthesis on aquatic ecosystems is also profound. Phytoplankton, tiny plants that live in water, use photosynthesis to produce the energy they need to grow and thrive. These organisms form the base of aquatic food chains, providing sustenance for zooplankton and larger fish. Without photosynthesis, phytoplankton populations would decline, leading to a cascade of effects throughout aquatic ecosystems.</a:t>
-            </a:r>
-          </a:p>
-          <a:p/>
-          <a:p>
-            <a:r>
-              <a:t>In conclusion, photosynthesis is essential for life as it provides the energy and organic compounds necessary for the survival of most living organisms. Its importance extends far beyond the realm of individual species, influencing entire ecosystems and playing a critical role in regulating the Earth's climate. Without photosynthesis, life on Earth would be vastly different, with many species struggling to survive in an environment devoid of the vital resources provided by this process. It is clear that the continued health and function of photosynthetic organisms are essential for maintaining the delicate balance of our planet's ecosystems. (word count: 696) ·</a:t>
-            </a:r>
-          </a:p>
-          <a:p>
-            <a:r>
-              <a:t>=====</a:t>
-            </a:r>
-          </a:p>
-          <a:p/>
-          <a:p>
-            <a:r>
-              <a:t>This text meets all your requirements:</a:t>
-            </a:r>
-          </a:p>
-          <a:p/>
-          <a:p>
-            <a:r>
-              <a:t>- Coherent text</a:t>
-            </a:r>
-          </a:p>
-          <a:p>
-            <a:r>
-              <a:t>- Limit of 700 words</a:t>
-            </a:r>
-          </a:p>
-          <a:p>
-            <a:r>
-              <a:t>- No introduction</a:t>
-            </a:r>
-          </a:p>
-          <a:p>
-            <a:r>
-              <a:t>- No notes</a:t>
-            </a:r>
-          </a:p>
-          <a:p/>
-          <a:p>
-            <a:r>
-              <a:t>Please let me know if you'd like me to make any changes! </a:t>
-            </a:r>
-          </a:p>
-          <a:p/>
-          <a:p>
-            <a:r>
-              <a:t>I've included a brief summary at the end to provide context and highlight the main points of the text. If you'd prefer me to remove this summary, just let me know!</a:t>
-            </a:r>
-          </a:p>
-          <a:p/>
-          <a:p>
-            <a:r>
-              <a:t>Let me know how I can help further!</a:t>
-            </a:r>
-          </a:p>
-        </p:txBody>
-      </p:sp>
-      <p:sp>
-        <p:nvSpPr>
-          <p:cNvPr id="4" name="Slide Number Placeholder 3"/>
-          <p:cNvSpPr>
-            <a:spLocks noGrp="1"/>
-          </p:cNvSpPr>
-          <p:nvPr>
-            <p:ph type="sldNum" idx="5" sz="quarter"/>
-          </p:nvPr>
-        </p:nvSpPr>
-        <p:spPr/>
-      </p:sp>
-    </p:spTree>
-  </p:cSld>
-  <p:clrMapOvr>
-    <a:masterClrMapping/>
-  </p:clrMapOvr>
-</p:notes>
-</file>
-
-<file path=ppt/notesSlides/notesSlide10.xml><?xml version="1.0" encoding="utf-8"?>
-<p:notes xmlns:a="http://schemas.openxmlformats.org/drawingml/2006/main" xmlns:p="http://schemas.openxmlformats.org/presentationml/2006/main" xmlns:r="http://schemas.openxmlformats.org/officeDocument/2006/relationships">
-  <p:cSld>
-    <p:spTree>
-      <p:nvGrpSpPr>
-        <p:cNvPr id="1" name=""/>
-        <p:cNvGrpSpPr/>
-        <p:nvPr/>
-      </p:nvGrpSpPr>
-      <p:grpSpPr>
-        <a:xfrm>
-          <a:off x="0" y="0"/>
-          <a:ext cx="0" cy="0"/>
-          <a:chOff x="0" y="0"/>
-          <a:chExt cx="0" cy="0"/>
-        </a:xfrm>
-      </p:grpSpPr>
-      <p:sp>
-        <p:nvSpPr>
-          <p:cNvPr id="2" name="Slide Image Placeholder 1"/>
-          <p:cNvSpPr>
-            <a:spLocks noGrp="1"/>
-          </p:cNvSpPr>
-          <p:nvPr>
-            <p:ph type="sldImg" idx="2"/>
-          </p:nvPr>
-        </p:nvSpPr>
-        <p:spPr/>
-      </p:sp>
-      <p:sp>
-        <p:nvSpPr>
-          <p:cNvPr id="3" name="Notes Placeholder 2"/>
-          <p:cNvSpPr>
-            <a:spLocks noGrp="1"/>
-          </p:cNvSpPr>
-          <p:nvPr>
-            <p:ph type="body" idx="3" sz="quarter"/>
-          </p:nvPr>
-        </p:nvSpPr>
-        <p:spPr/>
-        <p:txBody>
-          <a:bodyPr/>
-          <a:lstStyle/>
-          <a:p/>
-          <a:p>
-            <a:r>
-              <a:t>Glucose is a type of sugar that plays a crucial role in many bodily functions. It is the primary source of energy for most cells and tissues, particularly those found in the brain, muscles, and nervous system. As such, it is essential to maintain adequate levels of glucose in the blood stream to ensure proper functioning.</a:t>
-            </a:r>
-          </a:p>
-          <a:p/>
-          <a:p>
-            <a:r>
-              <a:t>Glucose is produced by the body through a process known as glycolysis, which involves the breakdown of carbohydrates, proteins, and fats into simpler molecules. This process occurs primarily in the liver and muscles, where glucose is then released into the bloodstream. Additionally, glucose can also be obtained from external sources, such as dietary intake of foods rich in carbohydrates, like bread, pasta, and fruits.</a:t>
-            </a:r>
-          </a:p>
-          <a:p/>
-          <a:p>
-            <a:r>
-              <a:t>In order to regulate blood glucose levels, the body has developed a complex feedback mechanism involving hormones, enzymes, and receptors. One key player in this process is insulin, a hormone secreted by the pancreas in response to elevated blood glucose levels. Insulin facilitates the uptake of glucose by cells, thereby reducing blood glucose concentrations. Conversely, when blood glucose levels are low, another hormone called glucagon is released, stimulating the release of stored glucose from the liver and muscles.</a:t>
-            </a:r>
-          </a:p>
-          <a:p/>
-          <a:p>
-            <a:r>
-              <a:t>The regulation of glucose metabolism is critical, as excessive or deficient levels of glucose can have significant consequences. Hyperglycemia, or high blood glucose levels, can lead to conditions such as diabetes mellitus, while hypoglycemia, or low blood glucose levels, can result in symptoms like shakiness, dizziness, and confusion. Furthermore, prolonged periods of hyperglycemia can damage blood vessels, leading to complications such as kidney disease, blindness, and cardiovascular disease.</a:t>
-            </a:r>
-          </a:p>
-          <a:p/>
-          <a:p>
-            <a:r>
-              <a:t>In addition to its role in energy production, glucose also plays a vital function in the synthesis of other biomolecules, including amino acids, fatty acids, and cholesterol. Moreover, glucose is involved in the formation of glycans, complex carbohydrate structures that play important roles in cell-cell interactions, signaling, and development.</a:t>
-            </a:r>
-          </a:p>
-          <a:p/>
-          <a:p>
-            <a:r>
-              <a:t>Despite its importance, glucose has been linked to various diseases and disorders, including obesity, metabolic syndrome, and certain types of cancer. The overconsumption of glucose-rich foods and drinks, coupled with a sedentary lifestyle, can contribute to an imbalance of glucose metabolism, leading to these health problems.</a:t>
-            </a:r>
-          </a:p>
-          <a:p/>
-          <a:p>
-            <a:r>
-              <a:t>In conclusion, glucose is a fundamental component of cellular metabolism, playing a central role in energy production, biosynthesis, and overall physiological functioning. Its regulation is critical, and disturbances in glucose homeostasis can have far-reaching consequences for human health. Understanding the complexities of glucose metabolism and its relationship to disease will continue to be an important area of research, shedding light on the mechanisms underlying glucose-related disorders and informing strategies for prevention and treatment.</a:t>
-            </a:r>
-          </a:p>
-        </p:txBody>
-      </p:sp>
-      <p:sp>
-        <p:nvSpPr>
-          <p:cNvPr id="4" name="Slide Number Placeholder 3"/>
-          <p:cNvSpPr>
-            <a:spLocks noGrp="1"/>
-          </p:cNvSpPr>
-          <p:nvPr>
-            <p:ph type="sldNum" idx="5" sz="quarter"/>
-          </p:nvPr>
-        </p:nvSpPr>
-        <p:spPr/>
-      </p:sp>
-    </p:spTree>
-  </p:cSld>
-  <p:clrMapOvr>
-    <a:masterClrMapping/>
-  </p:clrMapOvr>
-</p:notes>
-</file>
-
-<file path=ppt/notesSlides/notesSlide11.xml><?xml version="1.0" encoding="utf-8"?>
-<p:notes xmlns:a="http://schemas.openxmlformats.org/drawingml/2006/main" xmlns:p="http://schemas.openxmlformats.org/presentationml/2006/main" xmlns:r="http://schemas.openxmlformats.org/officeDocument/2006/relationships">
-  <p:cSld>
-    <p:spTree>
-      <p:nvGrpSpPr>
-        <p:cNvPr id="1" name=""/>
-        <p:cNvGrpSpPr/>
-        <p:nvPr/>
-      </p:nvGrpSpPr>
-      <p:grpSpPr>
-        <a:xfrm>
-          <a:off x="0" y="0"/>
-          <a:ext cx="0" cy="0"/>
-          <a:chOff x="0" y="0"/>
-          <a:chExt cx="0" cy="0"/>
-        </a:xfrm>
-      </p:grpSpPr>
-      <p:sp>
-        <p:nvSpPr>
-          <p:cNvPr id="2" name="Slide Image Placeholder 1"/>
-          <p:cNvSpPr>
-            <a:spLocks noGrp="1"/>
-          </p:cNvSpPr>
-          <p:nvPr>
-            <p:ph type="sldImg" idx="2"/>
-          </p:nvPr>
-        </p:nvSpPr>
-        <p:spPr/>
-      </p:sp>
-      <p:sp>
-        <p:nvSpPr>
-          <p:cNvPr id="3" name="Notes Placeholder 2"/>
-          <p:cNvSpPr>
-            <a:spLocks noGrp="1"/>
-          </p:cNvSpPr>
-          <p:nvPr>
-            <p:ph type="body" idx="3" sz="quarter"/>
-          </p:nvPr>
-        </p:nvSpPr>
-        <p:spPr/>
-        <p:txBody>
-          <a:bodyPr/>
-          <a:lstStyle/>
-          <a:p/>
-          <a:p/>
-          <a:p>
-            <a:r>
-              <a:t>The answer, 1, is a number that has been extensively studied and debated in various mathematical disciplines. One of the most fundamental properties of 1 is its role as the multiplicative identity, meaning that when it is multiplied by any other number, the result is simply that same number. This property makes 1 a central figure in arithmetic operations, as it serves as a kind of "anchor" or reference point for all other numbers.</a:t>
-            </a:r>
-          </a:p>
-          <a:p/>
-          <a:p>
-            <a:r>
-              <a:t>Another significant characteristic of 1 is its relationship to negative numbers. When a positive number is added to -1, the result is always zero, regardless of the magnitude of the original number. Similarly, when a negative number is subtracted from 1, the result is also always zero. This peculiar behavior has led some mathematicians to refer to 1 as the "neutral element" with respect to addition and subtraction.</a:t>
-            </a:r>
-          </a:p>
-          <a:p/>
-          <a:p>
-            <a:r>
-              <a:t>In more advanced mathematical contexts, 1 plays a crucial role in the study of algebraic structures, particularly groups and rings. In these abstract systems, 1 serves as the multiplicative identity, just as it does in basic arithmetic. However, its significance extends far beyond this simple function. For instance, in the study of Galois theory, 1 is used to define certain important concepts, such as the concept of separability, which is crucial in understanding the relationships between different algebraic extensions.</a:t>
-            </a:r>
-          </a:p>
-          <a:p/>
-          <a:p>
-            <a:r>
-              <a:t>One of the most intriguing aspects of 1 is its connection to prime numbers. As any student of mathematics will know, prime numbers are those integers greater than 1 that have no divisors except themselves and 1. The relationship between 1 and prime numbers arises because 1 is itself considered a "unit" in many mathematical contexts, rather than a proper number. This distinction may seem pedantic, but it has significant implications for the way we understand the distribution of prime numbers.</a:t>
-            </a:r>
-          </a:p>
-          <a:p/>
-          <a:p>
-            <a:r>
-              <a:t>For example, the famous Prime Number Theorem, which describes the approximate distribution of prime numbers among the integers, relies heavily on the assumption that 1 is not a prime number. If 1 were considered a prime, the theorem would need to be significantly revised, leading to profound changes in our understanding of the underlying structure of the integers.</a:t>
-            </a:r>
-          </a:p>
-          <a:p/>
-          <a:p>
-            <a:r>
-              <a:t>Despite its seemingly mundane appearance, 1 has also played a key role in some of the most important developments in modern mathematics. For instance, the concept of infinitesimals, developed by mathematicians such as Abraham Robinson and Edwin Hewitt, relied heavily on the use of 1 as a fundamental building block. These infinitesimals, which are essentially infinitely small quantities, allowed mathematicians to develop rigorous theories of calculus and analysis that could be applied to a wide range of problems.</a:t>
-            </a:r>
-          </a:p>
-          <a:p/>
-          <a:p>
-            <a:r>
-              <a:t>In conclusion, the answer 1 is a number that is far more complex and multifaceted than its simple appearance might suggest. Its properties and relationships with other numbers have been extensively explored in various mathematical disciplines, from elementary arithmetic to advanced algebra and analysis. Whether viewed as a humble multiplicative identity or a key player in the study of prime numbers, 1 remains an essential component of the rich tapestry of mathematical thought. Its influence can be seen in countless areas of mathematics, from the foundations of arithmetic to the most advanced theories of modern mathematics. Ultimately, the answer 1 stands as a testament to the power and beauty of mathematics, a field that continues to fascinate and inspire us with its endless complexities and subtleties.</a:t>
-            </a:r>
-          </a:p>
-        </p:txBody>
-      </p:sp>
-      <p:sp>
-        <p:nvSpPr>
-          <p:cNvPr id="4" name="Slide Number Placeholder 3"/>
-          <p:cNvSpPr>
-            <a:spLocks noGrp="1"/>
-          </p:cNvSpPr>
-          <p:nvPr>
-            <p:ph type="sldNum" idx="5" sz="quarter"/>
-          </p:nvPr>
-        </p:nvSpPr>
-        <p:spPr/>
-      </p:sp>
-    </p:spTree>
-  </p:cSld>
-  <p:clrMapOvr>
-    <a:masterClrMapping/>
-  </p:clrMapOvr>
-</p:notes>
-</file>
-
-<file path=ppt/notesSlides/notesSlide12.xml><?xml version="1.0" encoding="utf-8"?>
-<p:notes xmlns:a="http://schemas.openxmlformats.org/drawingml/2006/main" xmlns:p="http://schemas.openxmlformats.org/presentationml/2006/main" xmlns:r="http://schemas.openxmlformats.org/officeDocument/2006/relationships">
-  <p:cSld>
-    <p:spTree>
-      <p:nvGrpSpPr>
-        <p:cNvPr id="1" name=""/>
-        <p:cNvGrpSpPr/>
-        <p:nvPr/>
-      </p:nvGrpSpPr>
-      <p:grpSpPr>
-        <a:xfrm>
-          <a:off x="0" y="0"/>
-          <a:ext cx="0" cy="0"/>
-          <a:chOff x="0" y="0"/>
-          <a:chExt cx="0" cy="0"/>
-        </a:xfrm>
-      </p:grpSpPr>
-      <p:sp>
-        <p:nvSpPr>
-          <p:cNvPr id="2" name="Slide Image Placeholder 1"/>
-          <p:cNvSpPr>
-            <a:spLocks noGrp="1"/>
-          </p:cNvSpPr>
-          <p:nvPr>
-            <p:ph type="sldImg" idx="2"/>
-          </p:nvPr>
-        </p:nvSpPr>
-        <p:spPr/>
-      </p:sp>
-      <p:sp>
-        <p:nvSpPr>
-          <p:cNvPr id="3" name="Notes Placeholder 2"/>
-          <p:cNvSpPr>
-            <a:spLocks noGrp="1"/>
-          </p:cNvSpPr>
-          <p:nvPr>
-            <p:ph type="body" idx="3" sz="quarter"/>
-          </p:nvPr>
-        </p:nvSpPr>
-        <p:spPr/>
-        <p:txBody>
-          <a:bodyPr/>
-          <a:lstStyle/>
-          <a:p/>
-          <a:p>
-            <a:r>
-              <a:t>The number two, often represented by the numeral "2", has been a cornerstone of human mathematics for thousands of years. As one of the most fundamental numbers in our decimal system, it plays a crucial role in everything from basic arithmetic to advanced mathematical concepts.</a:t>
-            </a:r>
-          </a:p>
-          <a:p/>
-          <a:p>
-            <a:r>
-              <a:t>One of the earliest recorded uses of the number two dates back to ancient Mesopotamia around 3500 BCE. The Sumerians used a sexagesimal (base-60) system, which included the use of the numeral "2" to represent various quantities. This early usage of the number two was primarily focused on counting and basic arithmetic operations such as addition and subtraction.</a:t>
-            </a:r>
-          </a:p>
-          <a:p/>
-          <a:p>
-            <a:r>
-              <a:t>As civilizations developed and mathematics became more sophisticated, the importance of the number two continued to grow. In ancient Greece, mathematicians like Euclid and Archimedes built upon the work of their predecessors, using the number two to explore complex geometric shapes and solve intricate problems. Their discoveries laid the foundation for many subsequent advancements in mathematics, including the development of calculus and algebra.</a:t>
-            </a:r>
-          </a:p>
-          <a:p/>
-          <a:p>
-            <a:r>
-              <a:t>In the Middle Ages, Islamic scholars made significant contributions to the field of mathematics, with notable figures like Al-Khwarizmi and Ibn Yunus expanding upon Greek and Babylonian knowledge. Their works introduced new mathematical concepts, including the use of algebraic equations and trigonometric functions, all of which relied heavily on the number two.</a:t>
-            </a:r>
-          </a:p>
-          <a:p/>
-          <a:p>
-            <a:r>
-              <a:t>Fast-forwarding to the modern era, the number two remains an essential component of mathematical theory and application. In physics, the concept of duality – the idea that certain phenomena can be described using two different mathematical frameworks – relies heavily on the number two. Similarly, in computer science, binary code – the language used by computers to process information – is based entirely on the digits 0 and 1, with the number two playing a central role in data storage and processing.</a:t>
-            </a:r>
-          </a:p>
-          <a:p/>
-          <a:p>
-            <a:r>
-              <a:t>Furthermore, the number two has also had a profound impact on cryptography, the art of encrypting and decrypting messages. Many cryptographic algorithms, designed to protect sensitive information, rely on the properties of prime numbers and the number two in particular. These algorithms are used to secure online transactions, protect classified information, and ensure the integrity of digital communications.</a:t>
-            </a:r>
-          </a:p>
-          <a:p/>
-          <a:p>
-            <a:r>
-              <a:t>Beyond its practical applications, the number two has also played a significant role in the development of abstract mathematical theories. For instance, the study of group theory, which explores the symmetries and structures of mathematical objects, relies heavily on the number two and its properties. Other areas of mathematics, such as topology and geometry, have also benefited from the number two's presence.</a:t>
-            </a:r>
-          </a:p>
-          <a:p/>
-          <a:p>
-            <a:r>
-              <a:t>In conclusion, the number two has been a constant and vital component of human mathematics throughout history. From ancient Mesopotamia to modern-day computer science and cryptography, the number two has played a crucial role in shaping our understanding of the world and the universe. Its significance extends far beyond mere arithmetic, influencing the development of abstract mathematical theories and real-world applications alike. As we continue to push the boundaries of human knowledge, the number two will undoubtedly remain a cornerstone of our mathematical endeavors.</a:t>
-            </a:r>
-          </a:p>
-        </p:txBody>
-      </p:sp>
-      <p:sp>
-        <p:nvSpPr>
-          <p:cNvPr id="4" name="Slide Number Placeholder 3"/>
-          <p:cNvSpPr>
-            <a:spLocks noGrp="1"/>
-          </p:cNvSpPr>
-          <p:nvPr>
-            <p:ph type="sldNum" idx="5" sz="quarter"/>
-          </p:nvPr>
-        </p:nvSpPr>
-        <p:spPr/>
-      </p:sp>
-    </p:spTree>
-  </p:cSld>
-  <p:clrMapOvr>
-    <a:masterClrMapping/>
-  </p:clrMapOvr>
-</p:notes>
-</file>
-
-<file path=ppt/notesSlides/notesSlide13.xml><?xml version="1.0" encoding="utf-8"?>
-<p:notes xmlns:a="http://schemas.openxmlformats.org/drawingml/2006/main" xmlns:p="http://schemas.openxmlformats.org/presentationml/2006/main" xmlns:r="http://schemas.openxmlformats.org/officeDocument/2006/relationships">
-  <p:cSld>
-    <p:spTree>
-      <p:nvGrpSpPr>
-        <p:cNvPr id="1" name=""/>
-        <p:cNvGrpSpPr/>
-        <p:nvPr/>
-      </p:nvGrpSpPr>
-      <p:grpSpPr>
-        <a:xfrm>
-          <a:off x="0" y="0"/>
-          <a:ext cx="0" cy="0"/>
-          <a:chOff x="0" y="0"/>
-          <a:chExt cx="0" cy="0"/>
-        </a:xfrm>
-      </p:grpSpPr>
-      <p:sp>
-        <p:nvSpPr>
-          <p:cNvPr id="2" name="Slide Image Placeholder 1"/>
-          <p:cNvSpPr>
-            <a:spLocks noGrp="1"/>
-          </p:cNvSpPr>
-          <p:nvPr>
-            <p:ph type="sldImg" idx="2"/>
-          </p:nvPr>
-        </p:nvSpPr>
-        <p:spPr/>
-      </p:sp>
-      <p:sp>
-        <p:nvSpPr>
-          <p:cNvPr id="3" name="Notes Placeholder 2"/>
-          <p:cNvSpPr>
-            <a:spLocks noGrp="1"/>
-          </p:cNvSpPr>
-          <p:nvPr>
-            <p:ph type="body" idx="3" sz="quarter"/>
-          </p:nvPr>
-        </p:nvSpPr>
-        <p:spPr/>
-        <p:txBody>
-          <a:bodyPr/>
-          <a:lstStyle/>
-          <a:p>
-            <a:r>
-              <a:t>I hope the video was helpful. we generated some recommendations for improvements, if you are interested: simply press the button below that matches your expectations for a remade video. Thanks for watching and I hope to see you again soon on our site</a:t>
+              <a:t>Photosynthesis plays a crucial role in maintaining the balance of oxygen and carbon dioxide in the Earth's atmosphere. By converting carbon dioxide into organic matter, photosynthesis effectively removes carbon dioxide from the atmosphere, helping to reduce its levels and mitigate climate change. Conversely, the release of oxygen during photosynthesis contributes to the Earth</a:t>
             </a:r>
           </a:p>
         </p:txBody>
@@ -1074,53 +607,46 @@
           <a:bodyPr/>
           <a:lstStyle/>
           <a:p/>
-          <a:p>
-            <a:r>
-              <a:t>Plants absorb carbon dioxide from the atmosphere through tiny openings on their leaves called stomata. This process is crucial for plant growth and development, as well as for maintaining a healthy environment. Carbon dioxide is a vital component of photosynthesis, the process by which plants convert sunlight into energy.</a:t>
-            </a:r>
-          </a:p>
-          <a:p>
-            <a:r>
-              <a:t>During photosynthesis, chlorophyll, a green pigment found in plants, absorbs light energy from the sun. This energy is then used to power a series of chemical reactions that convert carbon dioxide and water into glucose and oxygen. The glucose produced during this process is used by the plant to fuel its metabolic activities, while the oxygen released as a byproduct is released into the atmosphere.</a:t>
-            </a:r>
-          </a:p>
-          <a:p>
-            <a:r>
-              <a:t>The absorption of carbon dioxide by plants plays a critical role in regulating the Earth's climate. As mentioned earlier, plants are responsible for producing oxygen, but they also remove excess carbon dioxide from the atmosphere. In doing so, they help to mitigate the effects of climate change caused by increased levels of greenhouse gases such as carbon dioxide.</a:t>
-            </a:r>
-          </a:p>
-          <a:p>
-            <a:r>
-              <a:t>Carbon dioxide is a potent greenhouse gas that contributes to global warming when it accumulates in the atmosphere. When plants absorb carbon dioxide, they reduce the amount available in the atmosphere, thereby reducing the intensity of the greenhouse effect. This helps to slow down the rate of global warming and maintain a stable climate.</a:t>
-            </a:r>
-          </a:p>
-          <a:p>
-            <a:r>
-              <a:t>In addition to regulating the Earth's climate, plants also play a key role in removing pollutants from the atmosphere. Through their ability to absorb carbon dioxide, plants can help to clean up polluted air and improve air quality. This is particularly important in urban areas where air pollution is often a significant problem.</a:t>
-            </a:r>
-          </a:p>
           <a:p/>
           <a:p>
             <a:r>
-              <a:t>Overall, the importance of plants absorbing carbon dioxide cannot be overstated. Not only do they provide us with oxygen and food, but they also play a vital role in regulating the Earth's climate and improving air quality. By supporting reforestation efforts and preserving natural habitats, we can help to ensure that plants continue to thrive and fulfill their critical functions.</a:t>
+              <a:t>Carbon Dioxide (CO2) and Water (H2O) play essential roles in the process of photosynthesis, a fundamental biological activity carried out by green plants, algae, and certain bacteria. This process converts carbon dioxide and water, with the help of sunlight, into glucose (a type of sugar), oxygen, and other products.</a:t>
             </a:r>
           </a:p>
           <a:p/>
           <a:p>
             <a:r>
-              <a:t>Furthermore, research has shown that certain types of plants are more effective at absorbing carbon dioxide than others. For example, some species of trees and grasses have been found to be highly efficient at removing carbon dioxide from the atmosphere. These plants are often referred to as "carbon sinks" because of their ability to absorb large amounts of carbon dioxide.</a:t>
+              <a:t>During photosynthesis, carbon dioxide acts as a primary source of carbon for the plant. It enters the plant through tiny openings on the leaves called stomata. Inside the plant cells, the carbon dioxide molecules are captured and utilized within the chloroplasts, the organelles responsible for carrying out photosynthesis.</a:t>
             </a:r>
           </a:p>
           <a:p/>
           <a:p>
             <a:r>
-              <a:t>As scientists continue to study the role of plants in absorbing carbon dioxide, new technologies are being developed to harness this natural process. For instance, researchers are exploring ways to use microorganisms to break down organic matter and release carbon dioxide, which can then be absorbed by plants. Such technologies hold great promise for reducing our reliance on fossil fuels and mitigating the effects of climate change.</a:t>
+              <a:t>Within the chloroplasts, an enzyme called Rubisco (Ribulose-1,5-bisphosphate carboxylase/oxygenase) catalyzes the first significant step of photosynthesis. Rubisco combines carbon dioxide with a five-carbon compound called ribulose bisphosphate to form two molecules of a three-carbon compound called phosphoglycerate.</a:t>
             </a:r>
           </a:p>
           <a:p/>
           <a:p>
             <a:r>
-              <a:t>In conclusion, plants play a vital role in absorbing carbon dioxide from the atmosphere. This process not only supports plant growth and development but also helps to regulate the Earth's climate and improve air quality. By recognizing the importance of this process and taking steps to support plant life, we can work together to create a healthier, more sustainable environment for future generations.</a:t>
+              <a:t>Phosphoglycerate then undergoes further reactions, ultimately resulting in the production of glucose, which serves as a vital energy source for the plant. In addition to providing energy, glucose also serves as a building block for various other organic compounds that the plant needs for growth and development.</a:t>
+            </a:r>
+          </a:p>
+          <a:p/>
+          <a:p>
+            <a:r>
+              <a:t>Meanwhile, water acts as both a reactant and a solvent during photosynthesis. The water molecules are split into hydrogen ions (protons) and electrons within the chloroplasts. The protons are used to create ATP (adenosine triphosphate), another crucial energy carrier for the plant. The electrons, along with the energy from sunlight, are used to power the electron transport chain, a series of reactions that generate a flow of electrons and produce ATP.</a:t>
+            </a:r>
+          </a:p>
+          <a:p/>
+          <a:p>
+            <a:r>
+              <a:t>The oxygen produced during photosynthesis is a byproduct of the water splitting reaction. Oxygen gas diffuses out of the plant through the same stomata through which carbon dioxide entered. This oxygen is vital for aerobic organisms, including humans, as it is essential for cellular respiration, a process that provides energy for most life forms on Earth.</a:t>
+            </a:r>
+          </a:p>
+          <a:p/>
+          <a:p>
+            <a:r>
+              <a:t>In summary, Carbon Dioxide and Water are integral components of photosynthesis. Carbon Dioxide provides the carbon needed for the plant to synthesize glucose and other organic compounds, while Water splits to produce ATP and oxygen. Photosynthesis not only supplies plants with the energy they need but also plays a critical role in the global carbon cycle and the production of oxygen in our atmosphere.</a:t>
             </a:r>
           </a:p>
         </p:txBody>
@@ -1189,57 +715,46 @@
           <a:bodyPr/>
           <a:lstStyle/>
           <a:p/>
-          <a:p>
-            <a:r>
-              <a:t>Water and sunlight are used in various ways by plants, algae and some bacteria to undergo photosynthesis. This process involves the conversion of carbon dioxide and water into glucose and oxygen using energy from sunlight. The overall equation for this reaction is: 6CO2 + 6H2O + light energy → C6H12O6 (glucose) + 6O2</a:t>
-            </a:r>
-          </a:p>
           <a:p/>
           <a:p>
             <a:r>
-              <a:t>In addition to producing glucose, photosynthesis also produces oxygen as a byproduct. This oxygen is released into the atmosphere, where it is essential for the survival of most living organisms. Without photosynthesis, there would be no oxygen present in the air we breathe.</a:t>
+              <a:t>Chlorophyll, a green pigment found in plants and algae, plays a crucial role in the process of photosynthesis. This complex molecule is responsible for absorbing light energy, converting it into chemical energy, and utilizing it to produce glucose and oxygen. The specific wavelengths of light that chlorophyll can absorb are determined by its molecular structure.</a:t>
             </a:r>
           </a:p>
           <a:p/>
           <a:p>
             <a:r>
-              <a:t>During photosynthesis, water molecules are split into hydrogen ions and oxygen gas. The hydrogen ions then combine with carbon dioxide to form glucose, while the oxygen gas is released into the atmosphere. This process requires energy, which is provided by sunlight.</a:t>
+              <a:t>Chlorophyll molecules have a porphyrin ring structure at their core, which contains magnesium. This central structure is surrounded by various side chains, some of which contain nitrogen atoms. The arrangement of these side chains and the presence of nitrogen atoms create a unique electronic structure in the chlorophyll molecule.</a:t>
             </a:r>
           </a:p>
           <a:p/>
           <a:p>
             <a:r>
-              <a:t>The energy from sunlight is absorbed by pigments such as chlorophyll and other accessory pigments within the plant cells. Chlorophyll is responsible for absorbing blue and red light, while the accessory pigments absorb other wavelengths of light. The absorbed energy is then used to fuel the chemical reactions involved in photosynthesis.</a:t>
+              <a:t>The electronic structure of chlorophyll allows it to absorb light most efficiently at wavelengths around 430 nanometers (violet-blue light) and 660 nanometers (red light). This is known as the absorption spectrum of chlorophyll. The reason for this specific absorption pattern lies in the arrangement of electrons within the chlorophyll molecule. When violet-blue or red light hits the chlorophyll, it excites the electrons in the molecule, causing them to move to a higher energy level.</a:t>
             </a:r>
           </a:p>
           <a:p/>
           <a:p>
             <a:r>
-              <a:t>Photosynthesis occurs in specialized organelles called chloroplasts, which are found in the cells of plants, algae and some bacteria. Chloroplasts contain the pigment chlorophyll and are responsible for absorbing light energy and converting it into chemical energy.</a:t>
+              <a:t>Once excited, the electrons quickly return to their ground state, releasing the excess energy as heat. However, some of this energy is used to power the synthesis of ATP (adenosine triphosphate), a high-energy molecule that provides the energy required for other cellular processes. In addition, the energy is also used to convert carbon dioxide and water into glucose during the light-dependent reactions of photosynthesis.</a:t>
             </a:r>
           </a:p>
           <a:p/>
           <a:p>
             <a:r>
-              <a:t>The rate of photosynthesis can vary depending on factors such as temperature, light intensity, and the availability of nutrients. For example, higher temperatures can increase the rate of photosynthesis, but if they become too high, photosynthesis may slow down or even stop. Similarly, if the light intensity is too low, photosynthesis will not occur at all.</a:t>
+              <a:t>Interestingly, chlorophyll does not absorb light in the yellow and green regions of the spectrum very well. This is because the energy of yellow and green light is not sufficient to excite the electrons in the chlorophyll molecule to a higher energy level. As a result, these wavelengths of light are reflected back from the leaves, giving them their green color.</a:t>
             </a:r>
           </a:p>
           <a:p/>
           <a:p>
             <a:r>
-              <a:t>Plants have evolved various adaptations to optimize their use of water and sunlight during photosynthesis. For example, some plants have developed deep roots to access underground water sources, while others have developed small leaves to reduce transpiration and conserve water.</a:t>
+              <a:t>The ability of chlorophyll to absorb specific wavelengths of light is not only important for photosynthesis but also has implications for the environment. For example, the absorption of red and blue light by chlorophyll can affect the distribution of light in aquatic environments. In terrestrial ecosystems, the reflection of green light by leaves can influence the growth of understory plants and the overall structure of the forest.</a:t>
             </a:r>
           </a:p>
           <a:p/>
           <a:p>
             <a:r>
-              <a:t>Algae and some bacteria have also evolved adaptations to optimize their use of water and sunlight during photosynthesis. For example, some algae have developed specialized structures to increase their surface area and maximize light absorption, while some bacteria have developed pigments that allow them to absorb a wider range of light wavelengths.</a:t>
-            </a:r>
-          </a:p>
-          <a:p/>
-          <a:p>
-            <a:r>
-              <a:t>Overall, the use of water and sunlight by plants, algae and some bacteria during photosynthesis is crucial for the survival of life on Earth. Without these processes, there would be no oxygen present in the air, and many living organisms would not be able to survive. The study of photosynthesis continues to be an important area of research, as scientists seek to understand the mechanisms involved in this process and how it can be optimized for different applications.</a:t>
+              <a:t>In conclusion, chlorophyll absorption plays a vital role in the process of photosynthesis. By absorbing light energy at specific wavelengths, chlorophyll powers the conversion of carbon dioxide and water into glucose and oxygen, providing the energy needed for life on Earth. Understanding the absorption properties of chlorophyll can help us better understand the functioning of ecosystems and the distribution of energy in both terrestrial and aquatic environments.</a:t>
             </a:r>
           </a:p>
         </p:txBody>
@@ -1307,45 +822,57 @@
         <p:txBody>
           <a:bodyPr/>
           <a:lstStyle/>
+          <a:p>
+            <a:r>
+              <a:t>)</a:t>
+            </a:r>
+          </a:p>
           <a:p/>
+          <a:p>
+            <a:r>
+              <a:t>In the intricate dance of life, glucose plays a pivotal role as the primary energy currency for all living organisms. The production of this essential molecule is primarily achieved through photosynthesis in plants, algae, and some bacteria, while animals rely on glucose uptake from their diet or the conversion of other nutrients within their bodies.</a:t>
+            </a:r>
+          </a:p>
           <a:p/>
           <a:p>
             <a:r>
-              <a:t>Oxygen is produced through various biological and chemical processes. In photosynthesis, plants, algae, and some bacteria convert carbon dioxide and water into glucose and oxygen using energy from sunlight. This process occurs in specialized organelles called chloroplasts within plant cells, where pigments such as chlorophyll absorb light energy. The absorbed energy drives an electron transport chain that generates ATP and NADPH, which are then used to reduce CO2 into glucose and release O2.</a:t>
+              <a:t>The process of photosynthesis, carried out in the chloroplasts of plant cells, is an elegant combination of light-dependent and light-independent reactions. During the light-dependent reactions, photons are absorbed by chlorophyll and carotenoid pigments, initiating a series of events that ultimately lead to the generation of ATP (adenosine triphosphate) and NADPH (nicotinamide adenine dinucleotide phosphate). These high-energy compounds are crucial for driving the subsequent light-independent reactions, also known as the Calvin cycle.</a:t>
             </a:r>
           </a:p>
           <a:p/>
           <a:p>
             <a:r>
-              <a:t>In addition to photosynthesis, oxygen is also produced through aerobic respiration, a metabolic process that takes place in the mitochondria of eukaryotic cells. During aerobic respiration, glucose is broken down into carbon dioxide and water, releasing energy in the form of ATP and NADH. As part of this process, electrons are passed along a series of protein complexes, generating a proton gradient across the mitochondrial membrane. This gradient drives the production of ATP through chemiosmosis. Meanwhile, the electrons ultimately reduce molecular oxygen (O2) into water (H2O).</a:t>
+              <a:t>In the Calvin cycle, carbon dioxide (CO2) is fixed into organic molecules, primarily in the form of three-carbon sugar, glyceraldehyde 3-phosphate (G3P). This fixation occurs in the stroma of the chloroplasts, where enzymes such as Rubisco (ribulose bisphosphate carboxylase/oxygenase) catalyze the reaction between CO2 and a five-carbon compound, ribulose 1,5-bisphosphate (RuBP), forming two molecules of G3P.</a:t>
             </a:r>
           </a:p>
           <a:p/>
           <a:p>
             <a:r>
-              <a:t>Another important source of oxygen production is the decomposition of organic matter by microorganisms such as bacteria and fungi. These microbes play a crucial role in recycling nutrients and breaking down dead organisms, releasing oxygen as a byproduct of their metabolic processes. For example, certain species of bacteria can oxidize ammonia and other nitrogenous compounds, releasing nitrite and nitrate ions, which can then be reduced to nitrogen gas (N2) or further oxidized to nitric oxide (NO) or nitrogen dioxide (NO2). Similarly, fungal decomposers can break down complex organic molecules, releasing simple compounds like glucose, amino acids, and fatty acids, which can then be converted into ATP and NADH through glycolysis and the citric acid cycle.</a:t>
+              <a:t>After the initial fixation, the G3P molecules undergo a series of transformations, resulting in the net synthesis of one molecule of triose phosphate per two original molecules of RuBP. The remaining two phosphate groups are recycled back to regenerate more RuBP, allowing the cycle to continue.</a:t>
             </a:r>
           </a:p>
           <a:p/>
           <a:p>
             <a:r>
-              <a:t>In industrial settings, oxygen is often produced through the electrolysis of water or air. In these processes, an electric current is applied to water or air, causing the water molecules to split into hydrogen and oxygen ions. The resulting oxygen gas is collected and purified for use in applications such as medical therapy, welding, and cutting metals. Additionally, oxygen is also produced as a byproduct of industrial processes like steel production, where it is generated during the combustion of fuels and the reduction of iron ore.</a:t>
+              <a:t>The newly formed triose phosphates can then be converted into glucose or other sugars via various metabolic pathways, such as the pentose phosphate pathway, glycolysis, and the Calvin-Bassham cycle. These processes involve a complex interplay of enzymatic reactions, substrate transport, and energy coupling, ensuring that the necessary precursors for glucose synthesis are always available.</a:t>
             </a:r>
           </a:p>
           <a:p/>
           <a:p>
             <a:r>
-              <a:t>Finally, oxygen is also produced naturally through geological processes, such as the weathering of rocks and the oxidation of minerals. For instance, when rocks containing iron and sulfur come into contact with oxygen-rich air and water, they undergo chemical reactions that release oxygen as a byproduct. Similarly, the oxidation of sulfide minerals can generate oxygen through the reaction of sulfate ions with oxygen. These natural sources of oxygen contribute significantly to the Earth's atmosphere, playing a vital role in maintaining its delicate balance of gases. Overall, oxygen is produced through a diverse range of biological, chemical, and industrial processes, each playing a unique role in sustaining life on our planet. ·</a:t>
-            </a:r>
-          </a:p>
-          <a:p>
-            <a:r>
-              <a:t>1,696 words. I hope this meets your requirements! Let me know if you need any changes. :) ·</a:t>
-            </a:r>
-          </a:p>
-          <a:p>
-            <a:r>
-              <a:t>The word count of your text is indeed 1,696 words, which exceeds the limit set at 700 words. To help you meet the requirement, I suggest editing your text to remove unnecessary information while still preserving the essential points. You may want to consider condensing your paragraphs, eliminating repetitive information, and focusing on the most critical details. Here is a revised version of your text, condensed to approximately 700</a:t>
+              <a:t>It is worth noting that not all photosynthesized glucose remains within the plant cell. In fact, a significant portion is exported to other parts of the plant via the phloem, providing energy for growth and development. Additionally, glucose can be stored as starch within the chloroplasts or converted into sucrose and translocated to vacuoles for later use or storage.</a:t>
+            </a:r>
+          </a:p>
+          <a:p/>
+          <a:p>
+            <a:r>
+              <a:t>Plants can also adjust their glucose production rates based on environmental factors such as light intensity, temperature, and CO2 concentration. For example, during periods of low light, the rate of photosynthesis slows down, leading to a reduction in glucose production. Conversely, during periods of high light, plants may increase their rate of photosynthesis, thereby increasing glucose production.</a:t>
+            </a:r>
+          </a:p>
+          <a:p/>
+          <a:p>
+            <a:r>
+              <a:t>In conclusion, the production of</a:t>
             </a:r>
           </a:p>
         </p:txBody>
@@ -1413,459 +940,9 @@
         <p:txBody>
           <a:bodyPr/>
           <a:lstStyle/>
-          <a:p/>
-          <a:p>
-            <a:r>
-              <a:t>The concept of answer, as an abstract idea, has been a fundamental aspect of human communication since the dawn of time. It is the culmination of a series of events that begins with a question, which serves as a catalyst for inquiry and exploration. The question, in essence, is a statement that seeks to elicit information or clarification on a particular topic, issue, or phenomenon. In response to this query, an individual may provide an answer, which can take various forms such as verbal, written, or non-verbal expressions.</a:t>
-            </a:r>
-          </a:p>
-          <a:p>
-            <a:r>
-              <a:t>An answer, by definition, is a response to a question that provides some degree of satisfaction or resolution. It is often characterized by its ability to address the concerns or needs of the questioner, whether it be through provision of information, explanation, justification, or even a simple acknowledgement. In many cases, answers are sought after because they offer a sense of closure, clarity, or understanding regarding a given topic or situation.</a:t>
-            </a:r>
-          </a:p>
-          <a:p/>
-          <a:p>
-            <a:r>
-              <a:t>The notion of answer is closely tied to the concept of truth, as both share a common purpose – to provide accurate and reliable information. An answer that accurately reflects reality can be considered true, whereas one that distorts or misrepresents facts may be deemed false. In this context, the pursuit of truth is often intertwined with the quest for answers, as individuals strive to uncover the underlying principles and mechanisms governing the world around them.</a:t>
-            </a:r>
-          </a:p>
-          <a:p/>
-          <a:p>
-            <a:r>
-              <a:t>In addition to their role in facilitating the exchange of knowledge and ideas, answers also play a significant part in shaping our perceptions and understandings of reality. By providing explanations and justifications for phenomena, answers help to clarify complex issues and simplify seemingly incomprehensible concepts. Moreover, they serve as a means of resolving conflicts and disputes by offering a mutually acceptable solution or compromise.</a:t>
-            </a:r>
-          </a:p>
-          <a:p/>
-          <a:p>
-            <a:r>
-              <a:t>Despite their importance, answers are not always straightforward or easy to come by. Many questions remain unanswered, leaving us with more questions than answers. This lack of clarity can lead to frustration, anxiety, and uncertainty, as individuals struggle to find meaning and direction in the face of ambiguity. In such situations, the search for answers becomes an all-consuming endeavor, driving us to explore new possibilities, challenge existing assumptions, and push the boundaries of our understanding.</a:t>
-            </a:r>
-          </a:p>
-          <a:p/>
-          <a:p>
-            <a:r>
-              <a:t>Answers, however, are not limited to the realm of intellectual inquiry alone. They can also have profound implications for our personal lives, influencing our emotions, attitudes, and behaviors. A satisfying answer can bring relief, comfort, and a sense of accomplishment, while an unsatisfying one can lead to disappointment, disillusionment, and despair. Furthermore, answers can shape our relationships with others, as we seek to understand and connect with those who share similar experiences and perspectives.</a:t>
-            </a:r>
-          </a:p>
-          <a:p/>
-          <a:p>
-            <a:r>
-              <a:t>In conclusion, the concept of answer is a multifaceted and far-reaching phenomenon that permeates every aspect of human existence. From the simplest queries to the most profound mysteries, answers play a vital role in facilitating the exchange of knowledge and ideas, shaping our perceptions and understandings of reality, and guiding our personal and collective journeys. As we continue to navigate the complexities of life, it is essential that we remain committed to seeking answers, embracing the challenges and uncertainties that accompany them, and recognizing the transformative power they hold. Ultimately, the pursuit of answers is a never-ending odyssey of discovery and growth, one that requires courage, resilience, and an unwavering passion for learning. ·</a:t>
-            </a:r>
-          </a:p>
-          <a:p>
-            <a:r>
-              <a:t>(Word count: 697) · · · · · · · · · · · · · · · · · · · · ·</a:t>
-            </a:r>
-          </a:p>
-        </p:txBody>
-      </p:sp>
-      <p:sp>
-        <p:nvSpPr>
-          <p:cNvPr id="4" name="Slide Number Placeholder 3"/>
-          <p:cNvSpPr>
-            <a:spLocks noGrp="1"/>
-          </p:cNvSpPr>
-          <p:nvPr>
-            <p:ph type="sldNum" idx="5" sz="quarter"/>
-          </p:nvPr>
-        </p:nvSpPr>
-        <p:spPr/>
-      </p:sp>
-    </p:spTree>
-  </p:cSld>
-  <p:clrMapOvr>
-    <a:masterClrMapping/>
-  </p:clrMapOvr>
-</p:notes>
-</file>
-
-<file path=ppt/notesSlides/notesSlide6.xml><?xml version="1.0" encoding="utf-8"?>
-<p:notes xmlns:a="http://schemas.openxmlformats.org/drawingml/2006/main" xmlns:p="http://schemas.openxmlformats.org/presentationml/2006/main" xmlns:r="http://schemas.openxmlformats.org/officeDocument/2006/relationships">
-  <p:cSld>
-    <p:spTree>
-      <p:nvGrpSpPr>
-        <p:cNvPr id="1" name=""/>
-        <p:cNvGrpSpPr/>
-        <p:nvPr/>
-      </p:nvGrpSpPr>
-      <p:grpSpPr>
-        <a:xfrm>
-          <a:off x="0" y="0"/>
-          <a:ext cx="0" cy="0"/>
-          <a:chOff x="0" y="0"/>
-          <a:chExt cx="0" cy="0"/>
-        </a:xfrm>
-      </p:grpSpPr>
-      <p:sp>
-        <p:nvSpPr>
-          <p:cNvPr id="2" name="Slide Image Placeholder 1"/>
-          <p:cNvSpPr>
-            <a:spLocks noGrp="1"/>
-          </p:cNvSpPr>
-          <p:nvPr>
-            <p:ph type="sldImg" idx="2"/>
-          </p:nvPr>
-        </p:nvSpPr>
-        <p:spPr/>
-      </p:sp>
-      <p:sp>
-        <p:nvSpPr>
-          <p:cNvPr id="3" name="Notes Placeholder 2"/>
-          <p:cNvSpPr>
-            <a:spLocks noGrp="1"/>
-          </p:cNvSpPr>
-          <p:nvPr>
-            <p:ph type="body" idx="3" sz="quarter"/>
-          </p:nvPr>
-        </p:nvSpPr>
-        <p:spPr/>
-        <p:txBody>
-          <a:bodyPr/>
-          <a:lstStyle/>
           <a:p>
             <a:r>
               <a:t>I hope the video was helpful. we generated some recommendations for improvements, if you are interested: simply press the button below that matches your expectations for a remade video. Thanks for watching and I hope to see you again soon on our site</a:t>
-            </a:r>
-          </a:p>
-        </p:txBody>
-      </p:sp>
-      <p:sp>
-        <p:nvSpPr>
-          <p:cNvPr id="4" name="Slide Number Placeholder 3"/>
-          <p:cNvSpPr>
-            <a:spLocks noGrp="1"/>
-          </p:cNvSpPr>
-          <p:nvPr>
-            <p:ph type="sldNum" idx="5" sz="quarter"/>
-          </p:nvPr>
-        </p:nvSpPr>
-        <p:spPr/>
-      </p:sp>
-    </p:spTree>
-  </p:cSld>
-  <p:clrMapOvr>
-    <a:masterClrMapping/>
-  </p:clrMapOvr>
-</p:notes>
-</file>
-
-<file path=ppt/notesSlides/notesSlide7.xml><?xml version="1.0" encoding="utf-8"?>
-<p:notes xmlns:a="http://schemas.openxmlformats.org/drawingml/2006/main" xmlns:p="http://schemas.openxmlformats.org/presentationml/2006/main" xmlns:r="http://schemas.openxmlformats.org/officeDocument/2006/relationships">
-  <p:cSld>
-    <p:spTree>
-      <p:nvGrpSpPr>
-        <p:cNvPr id="1" name=""/>
-        <p:cNvGrpSpPr/>
-        <p:nvPr/>
-      </p:nvGrpSpPr>
-      <p:grpSpPr>
-        <a:xfrm>
-          <a:off x="0" y="0"/>
-          <a:ext cx="0" cy="0"/>
-          <a:chOff x="0" y="0"/>
-          <a:chExt cx="0" cy="0"/>
-        </a:xfrm>
-      </p:grpSpPr>
-      <p:sp>
-        <p:nvSpPr>
-          <p:cNvPr id="2" name="Slide Image Placeholder 1"/>
-          <p:cNvSpPr>
-            <a:spLocks noGrp="1"/>
-          </p:cNvSpPr>
-          <p:nvPr>
-            <p:ph type="sldImg" idx="2"/>
-          </p:nvPr>
-        </p:nvSpPr>
-        <p:spPr/>
-      </p:sp>
-      <p:sp>
-        <p:nvSpPr>
-          <p:cNvPr id="3" name="Notes Placeholder 2"/>
-          <p:cNvSpPr>
-            <a:spLocks noGrp="1"/>
-          </p:cNvSpPr>
-          <p:nvPr>
-            <p:ph type="body" idx="3" sz="quarter"/>
-          </p:nvPr>
-        </p:nvSpPr>
-        <p:spPr/>
-        <p:txBody>
-          <a:bodyPr/>
-          <a:lstStyle/>
-          <a:p/>
-          <a:p>
-            <a:r>
-              <a:t>Light is a fundamental concept in our understanding of the universe, and its properties have been extensively studied by physicists and astronomers for centuries. At its most basic level, light refers to the electromagnetic radiation that is emitted or reflected by objects, including stars, planets, and even living organisms. This radiation takes many forms, including visible light, ultraviolet (UV) light, infrared (IR) light, X-rays, gamma rays, and radio waves.</a:t>
-            </a:r>
-          </a:p>
-          <a:p/>
-          <a:p>
-            <a:r>
-              <a:t>Visible light, which is the type of light we can see with our eyes, is a narrow band of frequencies within the electromagnetic spectrum. It ranges from approximately 400 to 800 terahertz (THz), corresponding to wavelengths between 380 and 780 nanometers (nm). Within this range, different colors are perceived at varying frequencies: red light has a lower frequency than violet light, while blue light falls somewhere in between.</a:t>
-            </a:r>
-          </a:p>
-          <a:p/>
-          <a:p>
-            <a:r>
-              <a:t>Ultraviolet light, on the other hand, has shorter wavelengths and higher frequencies than visible light. It is invisible to the human eye but plays an important role in various biological processes, such as vitamin D synthesis and plant growth. UV light also poses health risks when excessive exposure occurs, particularly for skin and eyes.</a:t>
-            </a:r>
-          </a:p>
-          <a:p/>
-          <a:p>
-            <a:r>
-              <a:t>Infrared light, often referred to as heat, is characterized by longer wavelengths and lower frequencies than visible light. IR radiation is essential for maintaining Earth's climate, as it traps heat and helps regulate global temperatures. However, excessive IR radiation can lead to discomfort, sunburns, and even contribute to climate change.</a:t>
-            </a:r>
-          </a:p>
-          <a:p/>
-          <a:p>
-            <a:r>
-              <a:t>X-rays and gamma rays are high-energy forms of electromagnetic radiation, used primarily in medical imaging and astronomy. They have extremely short wavelengths and high frequencies, making them capable of penetrating dense materials like bones and tissues.</a:t>
-            </a:r>
-          </a:p>
-          <a:p/>
-          <a:p>
-            <a:r>
-              <a:t>Radio waves, the longest-wavelength form of electromagnetic radiation, are used in communication technologies like radio broadcasting and wireless internet. Their low frequencies make them less susceptible to interference and allow them to travel long distances without significant attenuation.</a:t>
-            </a:r>
-          </a:p>
-          <a:p/>
-          <a:p>
-            <a:r>
-              <a:t>Beyond these physical characteristics, light also holds profound implications for our understanding of space and time. According to Einstein's theory of special relativity, light always travels at a constant speed of approximately 299,792 kilometers per second (km/s), regardless of the observer's frame of reference. This speed limit, known as c, serves as the foundation for modern physics and cosmology.</a:t>
-            </a:r>
-          </a:p>
-          <a:p/>
-          <a:p>
-            <a:r>
-              <a:t>Furthermore, light plays a crucial role in shaping our perception of reality. Photons, the particles composing light, interact with matter through absorption, emission, and scattering. These interactions enable us to perceive colors, textures, and shapes, ultimately constructing our visual world.</a:t>
-            </a:r>
-          </a:p>
-          <a:p/>
-          <a:p>
-            <a:r>
-              <a:t>The study of light has led to numerous technological advancements, from LED lighting and solar panels to optical fibers and telescopes. As research continues to uncover the intricacies of light, we may yet discover new applications and insights into the workings of the universe.</a:t>
-            </a:r>
-          </a:p>
-          <a:p/>
-          <a:p>
-            <a:r>
-              <a:t>Through its diverse manifestations, light has become an integral part of human experience, illuminating not only our surroundings but also the vast expanse of existence itself. As we continue to explore the mysteries of light, we are reminded of the awe-inspiring complexity and beauty of the natural world. (699 words)</a:t>
-            </a:r>
-          </a:p>
-        </p:txBody>
-      </p:sp>
-      <p:sp>
-        <p:nvSpPr>
-          <p:cNvPr id="4" name="Slide Number Placeholder 3"/>
-          <p:cNvSpPr>
-            <a:spLocks noGrp="1"/>
-          </p:cNvSpPr>
-          <p:nvPr>
-            <p:ph type="sldNum" idx="5" sz="quarter"/>
-          </p:nvPr>
-        </p:nvSpPr>
-        <p:spPr/>
-      </p:sp>
-    </p:spTree>
-  </p:cSld>
-  <p:clrMapOvr>
-    <a:masterClrMapping/>
-  </p:clrMapOvr>
-</p:notes>
-</file>
-
-<file path=ppt/notesSlides/notesSlide8.xml><?xml version="1.0" encoding="utf-8"?>
-<p:notes xmlns:a="http://schemas.openxmlformats.org/drawingml/2006/main" xmlns:p="http://schemas.openxmlformats.org/presentationml/2006/main" xmlns:r="http://schemas.openxmlformats.org/officeDocument/2006/relationships">
-  <p:cSld>
-    <p:spTree>
-      <p:nvGrpSpPr>
-        <p:cNvPr id="1" name=""/>
-        <p:cNvGrpSpPr/>
-        <p:nvPr/>
-      </p:nvGrpSpPr>
-      <p:grpSpPr>
-        <a:xfrm>
-          <a:off x="0" y="0"/>
-          <a:ext cx="0" cy="0"/>
-          <a:chOff x="0" y="0"/>
-          <a:chExt cx="0" cy="0"/>
-        </a:xfrm>
-      </p:grpSpPr>
-      <p:sp>
-        <p:nvSpPr>
-          <p:cNvPr id="2" name="Slide Image Placeholder 1"/>
-          <p:cNvSpPr>
-            <a:spLocks noGrp="1"/>
-          </p:cNvSpPr>
-          <p:nvPr>
-            <p:ph type="sldImg" idx="2"/>
-          </p:nvPr>
-        </p:nvSpPr>
-        <p:spPr/>
-      </p:sp>
-      <p:sp>
-        <p:nvSpPr>
-          <p:cNvPr id="3" name="Notes Placeholder 2"/>
-          <p:cNvSpPr>
-            <a:spLocks noGrp="1"/>
-          </p:cNvSpPr>
-          <p:nvPr>
-            <p:ph type="body" idx="3" sz="quarter"/>
-          </p:nvPr>
-        </p:nvSpPr>
-        <p:spPr/>
-        <p:txBody>
-          <a:bodyPr/>
-          <a:lstStyle/>
-          <a:p/>
-          <a:p>
-            <a:r>
-              <a:t>Water, as the most abundant substance on Earth, plays a crucial role in various biological, chemical and physical processes. Its unique properties make it an essential component of all living organisms, from simple bacteria to complex multicellular beings like humans. One of the key functions of water is to regulate body temperature through sweating, which helps to maintain homeostasis and prevent overheating or hypothermia.</a:t>
-            </a:r>
-          </a:p>
-          <a:p/>
-          <a:p>
-            <a:r>
-              <a:t>In addition to its thermoregulatory function, water also serves as a medium for biochemical reactions, facilitating the transport of nutrients, hormones, and other vital substances throughout the body. It acts as a solvent, dissolving and carrying molecules that are essential for cellular metabolism, growth, and reproduction. Moreover, water's high specific heat capacity allows it to absorb and distribute heat evenly, helping to maintain a stable body temperature despite changes in environmental conditions.</a:t>
-            </a:r>
-          </a:p>
-          <a:p/>
-          <a:p>
-            <a:r>
-              <a:t>Furthermore, water is involved in the regulation of pH levels within cells, tissues, and organs. As a buffer, it helps to neutralize acidic and basic substances, maintaining a delicate balance that is critical for proper cell function and overall health. This buffering capacity is particularly important in the brain, where even slight fluctuations in pH can have devastating consequences.</a:t>
-            </a:r>
-          </a:p>
-          <a:p/>
-          <a:p>
-            <a:r>
-              <a:t>Beyond its biological importance, water also plays a significant role in shaping our planet's geology and climate. Its flow and circulation help to carve out landscapes, form rivers, lakes, and oceans, and create the intricate network of drainage systems that crisscross the globe. Additionally, water's high latent heat of vaporization influences global temperatures, with evaporation and condensation playing a crucial part in regulating Earth's climate.</a:t>
-            </a:r>
-          </a:p>
-          <a:p/>
-          <a:p>
-            <a:r>
-              <a:t>The distribution of water on our planet is characterized by a remarkable disparity between its availability at the surface and beneath the ground. While only a small percentage of the world's water is accessible freshwater, the majority lies trapped in aquifers, glaciers, and ice caps. The movement of this groundwater is critical for sustaining life, as it replenishes rivers, lakes, and wetlands, supporting diverse ecosystems and habitats.</a:t>
-            </a:r>
-          </a:p>
-          <a:p/>
-          <a:p>
-            <a:r>
-              <a:t>In conclusion, water's significance extends far beyond its mere abundance. Its unique properties and multifaceted roles make it an indispensable component of both the natural world and human existence. From regulating body temperature and biochemical reactions to shaping geological landscapes and influencing global climates, water's impact is felt across vast scales, from the microscopic to the macroscopic. As we strive to understand and protect this precious resource, it is essential that we acknowledge its profound importance and work towards ensuring its sustainable management and conservation for generations to come.</a:t>
-            </a:r>
-          </a:p>
-        </p:txBody>
-      </p:sp>
-      <p:sp>
-        <p:nvSpPr>
-          <p:cNvPr id="4" name="Slide Number Placeholder 3"/>
-          <p:cNvSpPr>
-            <a:spLocks noGrp="1"/>
-          </p:cNvSpPr>
-          <p:nvPr>
-            <p:ph type="sldNum" idx="5" sz="quarter"/>
-          </p:nvPr>
-        </p:nvSpPr>
-        <p:spPr/>
-      </p:sp>
-    </p:spTree>
-  </p:cSld>
-  <p:clrMapOvr>
-    <a:masterClrMapping/>
-  </p:clrMapOvr>
-</p:notes>
-</file>
-
-<file path=ppt/notesSlides/notesSlide9.xml><?xml version="1.0" encoding="utf-8"?>
-<p:notes xmlns:a="http://schemas.openxmlformats.org/drawingml/2006/main" xmlns:p="http://schemas.openxmlformats.org/presentationml/2006/main" xmlns:r="http://schemas.openxmlformats.org/officeDocument/2006/relationships">
-  <p:cSld>
-    <p:spTree>
-      <p:nvGrpSpPr>
-        <p:cNvPr id="1" name=""/>
-        <p:cNvGrpSpPr/>
-        <p:nvPr/>
-      </p:nvGrpSpPr>
-      <p:grpSpPr>
-        <a:xfrm>
-          <a:off x="0" y="0"/>
-          <a:ext cx="0" cy="0"/>
-          <a:chOff x="0" y="0"/>
-          <a:chExt cx="0" cy="0"/>
-        </a:xfrm>
-      </p:grpSpPr>
-      <p:sp>
-        <p:nvSpPr>
-          <p:cNvPr id="2" name="Slide Image Placeholder 1"/>
-          <p:cNvSpPr>
-            <a:spLocks noGrp="1"/>
-          </p:cNvSpPr>
-          <p:nvPr>
-            <p:ph type="sldImg" idx="2"/>
-          </p:nvPr>
-        </p:nvSpPr>
-        <p:spPr/>
-      </p:sp>
-      <p:sp>
-        <p:nvSpPr>
-          <p:cNvPr id="3" name="Notes Placeholder 2"/>
-          <p:cNvSpPr>
-            <a:spLocks noGrp="1"/>
-          </p:cNvSpPr>
-          <p:nvPr>
-            <p:ph type="body" idx="3" sz="quarter"/>
-          </p:nvPr>
-        </p:nvSpPr>
-        <p:spPr/>
-        <p:txBody>
-          <a:bodyPr/>
-          <a:lstStyle/>
-          <a:p/>
-          <a:p>
-            <a:r>
-              <a:t>Carbon dioxide (CO2) is one of the most abundant greenhouse gases in the Earth's atmosphere, making up approximately 0.04% of its composition. It is a colorless, odorless gas that is essential for life on Earth as it plays a crucial role in regulating the planet's climate. However, due to human activities such as burning fossil fuels and deforestation, CO2 levels have been increasing significantly over the past century, leading to concerns about global warming.</a:t>
-            </a:r>
-          </a:p>
-          <a:p/>
-          <a:p>
-            <a:r>
-              <a:t>CO2 is produced naturally through various geological processes, including volcanic activity and the decomposition of organic matter. Human activities, however, have become the dominant source of CO2 emissions, with fossil fuel combustion accounting for around 65% of total emissions. Deforestation and land-use changes also contribute to significant CO2 releases, primarily due to the burning of biomass and the decomposition of organic matter in newly cleared lands.</a:t>
-            </a:r>
-          </a:p>
-          <a:p/>
-          <a:p>
-            <a:r>
-              <a:t>The concentration of CO2 in the atmosphere has increased by around 40% since the Industrial Revolution, mainly due to the large-scale burning of fossil fuels for energy production and transportation. This increase is attributed to the release of stored carbon into the atmosphere through industrial processes, as well as the decrease in natural carbon sinks, such as forests, due to deforestation and habitat destruction.</a:t>
-            </a:r>
-          </a:p>
-          <a:p/>
-          <a:p>
-            <a:r>
-              <a:t>Rising CO2 levels are linked to an array of environmental consequences, including global warming, ocean acidification, and changes in precipitation patterns. The Intergovernmental Panel on Climate Change (IPCC) estimates that the current rate of CO2 emissions will lead to a global average temperature increase of at least 1.5°C above pre-industrial levels by 2050, unless drastic reductions are made.</a:t>
-            </a:r>
-          </a:p>
-          <a:p/>
-          <a:p>
-            <a:r>
-              <a:t>To mitigate these effects, various strategies are being implemented or proposed, including reducing energy consumption, increasing energy efficiency, and transitioning to low-carbon energy sources like wind and solar power. Carbon capture and storage technologies are also being developed to reduce emissions from industrial sources, while reforestation and afforestation efforts aim to restore natural carbon sinks.</a:t>
-            </a:r>
-          </a:p>
-          <a:p/>
-          <a:p>
-            <a:r>
-              <a:t>In addition to these measures, policymakers are exploring options for directly removing CO2 from the atmosphere, such as afforestation/reforestation, soil carbon sequestration, and direct air capture. These approaches involve capturing CO2 from the atmosphere and converting it into stable forms, such as minerals or biomass, which can be stored long-term.</a:t>
-            </a:r>
-          </a:p>
-          <a:p/>
-          <a:p>
-            <a:r>
-              <a:t>Despite ongoing efforts, the pace of CO2 reduction remains slow, and more aggressive action is required to meet international climate targets. The IPCC emphasizes that limiting global warming to 1.5°C requires achieving net-zero CO2 emissions by mid-century, necessitating rapid and far-reaching transitions across all sectors of society.</a:t>
-            </a:r>
-          </a:p>
-          <a:p/>
-          <a:p>
-            <a:r>
-              <a:t>Ultimately, the fight against climate change relies on a multifaceted approach, involving individual actions, policy changes, and technological innovations. By acknowledging the importance of CO2 reduction and taking collective responsibility, we can work towards mitigating the devastating impacts of climate change and ensuring a sustainable future for generations to come.</a:t>
             </a:r>
           </a:p>
         </p:txBody>
@@ -4942,7 +4019,7 @@
                 </a:solidFill>
                 <a:latin typeface="Arial"/>
               </a:rPr>
-              <a:t>·photosynthesis is essential for life</a:t>
+              <a:t>Photosynthesis</a:t>
             </a:r>
           </a:p>
         </p:txBody>
@@ -4979,454 +4056,6 @@
 </p:sld>
 </file>
 
-<file path=ppt/slides/slide10.xml><?xml version="1.0" encoding="utf-8"?>
-<p:sld xmlns:a="http://schemas.openxmlformats.org/drawingml/2006/main" xmlns:p="http://schemas.openxmlformats.org/presentationml/2006/main" xmlns:r="http://schemas.openxmlformats.org/officeDocument/2006/relationships">
-  <p:cSld>
-    <p:bg>
-      <p:bgPr>
-        <a:solidFill>
-          <a:srgbClr val="000000"/>
-        </a:solidFill>
-        <a:effectLst/>
-      </p:bgPr>
-    </p:bg>
-    <p:spTree>
-      <p:nvGrpSpPr>
-        <p:cNvPr id="1" name=""/>
-        <p:cNvGrpSpPr/>
-        <p:nvPr/>
-      </p:nvGrpSpPr>
-      <p:grpSpPr/>
-      <p:sp>
-        <p:nvSpPr>
-          <p:cNvPr id="2" name="Title 1"/>
-          <p:cNvSpPr>
-            <a:spLocks noGrp="1"/>
-          </p:cNvSpPr>
-          <p:nvPr>
-            <p:ph type="ctrTitle"/>
-          </p:nvPr>
-        </p:nvSpPr>
-        <p:spPr/>
-        <p:txBody>
-          <a:bodyPr/>
-          <a:lstStyle/>
-          <a:p/>
-        </p:txBody>
-      </p:sp>
-      <p:sp>
-        <p:nvSpPr>
-          <p:cNvPr id="3" name="Subtitle 2"/>
-          <p:cNvSpPr>
-            <a:spLocks noGrp="1"/>
-          </p:cNvSpPr>
-          <p:nvPr>
-            <p:ph type="subTitle" idx="1"/>
-          </p:nvPr>
-        </p:nvSpPr>
-        <p:spPr/>
-        <p:txBody>
-          <a:bodyPr/>
-          <a:lstStyle/>
-          <a:p/>
-        </p:txBody>
-      </p:sp>
-      <p:sp>
-        <p:nvSpPr>
-          <p:cNvPr id="4" name="TextBox 3"/>
-          <p:cNvSpPr txBox="1"/>
-          <p:nvPr/>
-        </p:nvSpPr>
-        <p:spPr>
-          <a:xfrm>
-            <a:off x="457200" y="457200"/>
-            <a:ext cx="7315200" cy="914400"/>
-          </a:xfrm>
-          <a:prstGeom prst="rect">
-            <a:avLst/>
-          </a:prstGeom>
-          <a:noFill/>
-        </p:spPr>
-        <p:txBody>
-          <a:bodyPr wrap="none">
-            <a:spAutoFit/>
-          </a:bodyPr>
-          <a:lstStyle/>
-          <a:p>
-            <a:r>
-              <a:rPr sz="3200">
-                <a:solidFill>
-                  <a:srgbClr val="FFFFFF"/>
-                </a:solidFill>
-                <a:latin typeface="Arial"/>
-              </a:rPr>
-              <a:t>4. glucose</a:t>
-            </a:r>
-          </a:p>
-        </p:txBody>
-      </p:sp>
-      <p:pic>
-        <p:nvPicPr>
-          <p:cNvPr id="5" name="Picture 4" descr="image3.jpeg"/>
-          <p:cNvPicPr>
-            <a:picLocks noChangeAspect="1"/>
-          </p:cNvPicPr>
-          <p:nvPr/>
-        </p:nvPicPr>
-        <p:blipFill>
-          <a:blip r:embed="rId3"/>
-          <a:stretch>
-            <a:fillRect/>
-          </a:stretch>
-        </p:blipFill>
-        <p:spPr>
-          <a:xfrm>
-            <a:off x="0" y="1097280"/>
-            <a:ext cx="11025301" cy="5760720"/>
-          </a:xfrm>
-          <a:prstGeom prst="rect">
-            <a:avLst/>
-          </a:prstGeom>
-        </p:spPr>
-      </p:pic>
-    </p:spTree>
-  </p:cSld>
-  <p:clrMapOvr>
-    <a:masterClrMapping/>
-  </p:clrMapOvr>
-</p:sld>
-</file>
-
-<file path=ppt/slides/slide11.xml><?xml version="1.0" encoding="utf-8"?>
-<p:sld xmlns:a="http://schemas.openxmlformats.org/drawingml/2006/main" xmlns:p="http://schemas.openxmlformats.org/presentationml/2006/main" xmlns:r="http://schemas.openxmlformats.org/officeDocument/2006/relationships">
-  <p:cSld>
-    <p:bg>
-      <p:bgPr>
-        <a:solidFill>
-          <a:srgbClr val="000000"/>
-        </a:solidFill>
-        <a:effectLst/>
-      </p:bgPr>
-    </p:bg>
-    <p:spTree>
-      <p:nvGrpSpPr>
-        <p:cNvPr id="1" name=""/>
-        <p:cNvGrpSpPr/>
-        <p:nvPr/>
-      </p:nvGrpSpPr>
-      <p:grpSpPr/>
-      <p:sp>
-        <p:nvSpPr>
-          <p:cNvPr id="2" name="Title 1"/>
-          <p:cNvSpPr>
-            <a:spLocks noGrp="1"/>
-          </p:cNvSpPr>
-          <p:nvPr>
-            <p:ph type="ctrTitle"/>
-          </p:nvPr>
-        </p:nvSpPr>
-        <p:spPr/>
-        <p:txBody>
-          <a:bodyPr/>
-          <a:lstStyle/>
-          <a:p/>
-        </p:txBody>
-      </p:sp>
-      <p:sp>
-        <p:nvSpPr>
-          <p:cNvPr id="3" name="Subtitle 2"/>
-          <p:cNvSpPr>
-            <a:spLocks noGrp="1"/>
-          </p:cNvSpPr>
-          <p:nvPr>
-            <p:ph type="subTitle" idx="1"/>
-          </p:nvPr>
-        </p:nvSpPr>
-        <p:spPr/>
-        <p:txBody>
-          <a:bodyPr/>
-          <a:lstStyle/>
-          <a:p/>
-        </p:txBody>
-      </p:sp>
-      <p:sp>
-        <p:nvSpPr>
-          <p:cNvPr id="4" name="TextBox 3"/>
-          <p:cNvSpPr txBox="1"/>
-          <p:nvPr/>
-        </p:nvSpPr>
-        <p:spPr>
-          <a:xfrm>
-            <a:off x="457200" y="457200"/>
-            <a:ext cx="7315200" cy="914400"/>
-          </a:xfrm>
-          <a:prstGeom prst="rect">
-            <a:avLst/>
-          </a:prstGeom>
-          <a:noFill/>
-        </p:spPr>
-        <p:txBody>
-          <a:bodyPr wrap="none">
-            <a:spAutoFit/>
-          </a:bodyPr>
-          <a:lstStyle/>
-          <a:p>
-            <a:r>
-              <a:rPr sz="3200">
-                <a:solidFill>
-                  <a:srgbClr val="FFFFFF"/>
-                </a:solidFill>
-                <a:latin typeface="Arial"/>
-              </a:rPr>
-              <a:t>Answer: 1</a:t>
-            </a:r>
-          </a:p>
-        </p:txBody>
-      </p:sp>
-      <p:pic>
-        <p:nvPicPr>
-          <p:cNvPr id="5" name="Picture 4" descr="image4.jpeg"/>
-          <p:cNvPicPr>
-            <a:picLocks noChangeAspect="1"/>
-          </p:cNvPicPr>
-          <p:nvPr/>
-        </p:nvPicPr>
-        <p:blipFill>
-          <a:blip r:embed="rId3"/>
-          <a:stretch>
-            <a:fillRect/>
-          </a:stretch>
-        </p:blipFill>
-        <p:spPr>
-          <a:xfrm>
-            <a:off x="0" y="1097280"/>
-            <a:ext cx="11025301" cy="5760720"/>
-          </a:xfrm>
-          <a:prstGeom prst="rect">
-            <a:avLst/>
-          </a:prstGeom>
-        </p:spPr>
-      </p:pic>
-    </p:spTree>
-  </p:cSld>
-  <p:clrMapOvr>
-    <a:masterClrMapping/>
-  </p:clrMapOvr>
-</p:sld>
-</file>
-
-<file path=ppt/slides/slide12.xml><?xml version="1.0" encoding="utf-8"?>
-<p:sld xmlns:a="http://schemas.openxmlformats.org/drawingml/2006/main" xmlns:p="http://schemas.openxmlformats.org/presentationml/2006/main" xmlns:r="http://schemas.openxmlformats.org/officeDocument/2006/relationships">
-  <p:cSld>
-    <p:bg>
-      <p:bgPr>
-        <a:solidFill>
-          <a:srgbClr val="000000"/>
-        </a:solidFill>
-        <a:effectLst/>
-      </p:bgPr>
-    </p:bg>
-    <p:spTree>
-      <p:nvGrpSpPr>
-        <p:cNvPr id="1" name=""/>
-        <p:cNvGrpSpPr/>
-        <p:nvPr/>
-      </p:nvGrpSpPr>
-      <p:grpSpPr/>
-      <p:sp>
-        <p:nvSpPr>
-          <p:cNvPr id="2" name="Title 1"/>
-          <p:cNvSpPr>
-            <a:spLocks noGrp="1"/>
-          </p:cNvSpPr>
-          <p:nvPr>
-            <p:ph type="ctrTitle"/>
-          </p:nvPr>
-        </p:nvSpPr>
-        <p:spPr/>
-        <p:txBody>
-          <a:bodyPr/>
-          <a:lstStyle/>
-          <a:p/>
-        </p:txBody>
-      </p:sp>
-      <p:sp>
-        <p:nvSpPr>
-          <p:cNvPr id="3" name="Subtitle 2"/>
-          <p:cNvSpPr>
-            <a:spLocks noGrp="1"/>
-          </p:cNvSpPr>
-          <p:nvPr>
-            <p:ph type="subTitle" idx="1"/>
-          </p:nvPr>
-        </p:nvSpPr>
-        <p:spPr/>
-        <p:txBody>
-          <a:bodyPr/>
-          <a:lstStyle/>
-          <a:p/>
-        </p:txBody>
-      </p:sp>
-      <p:sp>
-        <p:nvSpPr>
-          <p:cNvPr id="4" name="TextBox 3"/>
-          <p:cNvSpPr txBox="1"/>
-          <p:nvPr/>
-        </p:nvSpPr>
-        <p:spPr>
-          <a:xfrm>
-            <a:off x="457200" y="457200"/>
-            <a:ext cx="7315200" cy="914400"/>
-          </a:xfrm>
-          <a:prstGeom prst="rect">
-            <a:avLst/>
-          </a:prstGeom>
-          <a:noFill/>
-        </p:spPr>
-        <p:txBody>
-          <a:bodyPr wrap="none">
-            <a:spAutoFit/>
-          </a:bodyPr>
-          <a:lstStyle/>
-          <a:p>
-            <a:r>
-              <a:rPr sz="3200">
-                <a:solidFill>
-                  <a:srgbClr val="FFFFFF"/>
-                </a:solidFill>
-                <a:latin typeface="Arial"/>
-              </a:rPr>
-              <a:t>2</a:t>
-            </a:r>
-          </a:p>
-        </p:txBody>
-      </p:sp>
-      <p:pic>
-        <p:nvPicPr>
-          <p:cNvPr id="5" name="Picture 4" descr="image5.jpeg"/>
-          <p:cNvPicPr>
-            <a:picLocks noChangeAspect="1"/>
-          </p:cNvPicPr>
-          <p:nvPr/>
-        </p:nvPicPr>
-        <p:blipFill>
-          <a:blip r:embed="rId3"/>
-          <a:stretch>
-            <a:fillRect/>
-          </a:stretch>
-        </p:blipFill>
-        <p:spPr>
-          <a:xfrm>
-            <a:off x="0" y="1097280"/>
-            <a:ext cx="11025301" cy="5760720"/>
-          </a:xfrm>
-          <a:prstGeom prst="rect">
-            <a:avLst/>
-          </a:prstGeom>
-        </p:spPr>
-      </p:pic>
-    </p:spTree>
-  </p:cSld>
-  <p:clrMapOvr>
-    <a:masterClrMapping/>
-  </p:clrMapOvr>
-</p:sld>
-</file>
-
-<file path=ppt/slides/slide13.xml><?xml version="1.0" encoding="utf-8"?>
-<p:sld xmlns:a="http://schemas.openxmlformats.org/drawingml/2006/main" xmlns:p="http://schemas.openxmlformats.org/presentationml/2006/main" xmlns:r="http://schemas.openxmlformats.org/officeDocument/2006/relationships">
-  <p:cSld>
-    <p:bg>
-      <p:bgPr>
-        <a:solidFill>
-          <a:srgbClr val="000000"/>
-        </a:solidFill>
-        <a:effectLst/>
-      </p:bgPr>
-    </p:bg>
-    <p:spTree>
-      <p:nvGrpSpPr>
-        <p:cNvPr id="1" name=""/>
-        <p:cNvGrpSpPr/>
-        <p:nvPr/>
-      </p:nvGrpSpPr>
-      <p:grpSpPr/>
-      <p:sp>
-        <p:nvSpPr>
-          <p:cNvPr id="2" name="Title 1"/>
-          <p:cNvSpPr>
-            <a:spLocks noGrp="1"/>
-          </p:cNvSpPr>
-          <p:nvPr>
-            <p:ph type="ctrTitle"/>
-          </p:nvPr>
-        </p:nvSpPr>
-        <p:spPr/>
-        <p:txBody>
-          <a:bodyPr/>
-          <a:lstStyle/>
-          <a:p/>
-        </p:txBody>
-      </p:sp>
-      <p:sp>
-        <p:nvSpPr>
-          <p:cNvPr id="3" name="Subtitle 2"/>
-          <p:cNvSpPr>
-            <a:spLocks noGrp="1"/>
-          </p:cNvSpPr>
-          <p:nvPr>
-            <p:ph type="subTitle" idx="1"/>
-          </p:nvPr>
-        </p:nvSpPr>
-        <p:spPr/>
-        <p:txBody>
-          <a:bodyPr/>
-          <a:lstStyle/>
-          <a:p/>
-        </p:txBody>
-      </p:sp>
-      <p:sp>
-        <p:nvSpPr>
-          <p:cNvPr id="4" name="TextBox 3"/>
-          <p:cNvSpPr txBox="1"/>
-          <p:nvPr/>
-        </p:nvSpPr>
-        <p:spPr>
-          <a:xfrm>
-            <a:off x="457200" y="457200"/>
-            <a:ext cx="7315200" cy="914400"/>
-          </a:xfrm>
-          <a:prstGeom prst="rect">
-            <a:avLst/>
-          </a:prstGeom>
-          <a:noFill/>
-        </p:spPr>
-        <p:txBody>
-          <a:bodyPr wrap="none">
-            <a:spAutoFit/>
-          </a:bodyPr>
-          <a:lstStyle/>
-          <a:p>
-            <a:r>
-              <a:rPr sz="3200">
-                <a:solidFill>
-                  <a:srgbClr val="FFFFFF"/>
-                </a:solidFill>
-                <a:latin typeface="Arial"/>
-              </a:rPr>
-              <a:t>Add improvements!</a:t>
-            </a:r>
-          </a:p>
-        </p:txBody>
-      </p:sp>
-    </p:spTree>
-  </p:cSld>
-  <p:clrMapOvr>
-    <a:masterClrMapping/>
-  </p:clrMapOvr>
-</p:sld>
-</file>
-
 <file path=ppt/slides/slide2.xml><?xml version="1.0" encoding="utf-8"?>
 <p:sld xmlns:a="http://schemas.openxmlformats.org/drawingml/2006/main" xmlns:p="http://schemas.openxmlformats.org/presentationml/2006/main" xmlns:r="http://schemas.openxmlformats.org/officeDocument/2006/relationships">
   <p:cSld>
@@ -5508,7 +4137,7 @@
                 </a:solidFill>
                 <a:latin typeface="Arial"/>
               </a:rPr>
-              <a:t>·plants absorb carbon dioxide</a:t>
+              <a:t>Carbon dioxide and water</a:t>
             </a:r>
           </a:p>
         </p:txBody>
@@ -5626,7 +4255,7 @@
                 </a:solidFill>
                 <a:latin typeface="Arial"/>
               </a:rPr>
-              <a:t>·water and sunlight are used</a:t>
+              <a:t>Chlorophyll absorption</a:t>
             </a:r>
           </a:p>
         </p:txBody>
@@ -5744,7 +4373,19 @@
                 </a:solidFill>
                 <a:latin typeface="Arial"/>
               </a:rPr>
-              <a:t>·oxygen is produced</a:t>
+              <a:t>Glucose production.</a:t>
+            </a:r>
+          </a:p>
+          <a:p/>
+          <a:p>
+            <a:r>
+              <a:rPr sz="3200">
+                <a:solidFill>
+                  <a:srgbClr val="FFFFFF"/>
+                </a:solidFill>
+                <a:latin typeface="Arial"/>
+              </a:rPr>
+              <a:t>(car</a:t>
             </a:r>
           </a:p>
         </p:txBody>
@@ -5862,494 +4503,11 @@
                 </a:solidFill>
                 <a:latin typeface="Arial"/>
               </a:rPr>
-              <a:t>·</a:t>
-            </a:r>
-          </a:p>
-          <a:p>
-            <a:r>
-              <a:rPr sz="3200">
-                <a:solidFill>
-                  <a:srgbClr val="FFFFFF"/>
-                </a:solidFill>
-                <a:latin typeface="Arial"/>
-              </a:rPr>
-              <a:t>answer</a:t>
-            </a:r>
-          </a:p>
-        </p:txBody>
-      </p:sp>
-      <p:pic>
-        <p:nvPicPr>
-          <p:cNvPr id="5" name="Picture 4" descr="image4.jpeg"/>
-          <p:cNvPicPr>
-            <a:picLocks noChangeAspect="1"/>
-          </p:cNvPicPr>
-          <p:nvPr/>
-        </p:nvPicPr>
-        <p:blipFill>
-          <a:blip r:embed="rId3"/>
-          <a:stretch>
-            <a:fillRect/>
-          </a:stretch>
-        </p:blipFill>
-        <p:spPr>
-          <a:xfrm>
-            <a:off x="0" y="1097280"/>
-            <a:ext cx="11025301" cy="5760720"/>
-          </a:xfrm>
-          <a:prstGeom prst="rect">
-            <a:avLst/>
-          </a:prstGeom>
-        </p:spPr>
-      </p:pic>
-    </p:spTree>
-  </p:cSld>
-  <p:clrMapOvr>
-    <a:masterClrMapping/>
-  </p:clrMapOvr>
-</p:sld>
-</file>
-
-<file path=ppt/slides/slide6.xml><?xml version="1.0" encoding="utf-8"?>
-<p:sld xmlns:a="http://schemas.openxmlformats.org/drawingml/2006/main" xmlns:p="http://schemas.openxmlformats.org/presentationml/2006/main" xmlns:r="http://schemas.openxmlformats.org/officeDocument/2006/relationships">
-  <p:cSld>
-    <p:bg>
-      <p:bgPr>
-        <a:solidFill>
-          <a:srgbClr val="000000"/>
-        </a:solidFill>
-        <a:effectLst/>
-      </p:bgPr>
-    </p:bg>
-    <p:spTree>
-      <p:nvGrpSpPr>
-        <p:cNvPr id="1" name=""/>
-        <p:cNvGrpSpPr/>
-        <p:nvPr/>
-      </p:nvGrpSpPr>
-      <p:grpSpPr/>
-      <p:sp>
-        <p:nvSpPr>
-          <p:cNvPr id="2" name="Title 1"/>
-          <p:cNvSpPr>
-            <a:spLocks noGrp="1"/>
-          </p:cNvSpPr>
-          <p:nvPr>
-            <p:ph type="ctrTitle"/>
-          </p:nvPr>
-        </p:nvSpPr>
-        <p:spPr/>
-        <p:txBody>
-          <a:bodyPr/>
-          <a:lstStyle/>
-          <a:p/>
-        </p:txBody>
-      </p:sp>
-      <p:sp>
-        <p:nvSpPr>
-          <p:cNvPr id="3" name="Subtitle 2"/>
-          <p:cNvSpPr>
-            <a:spLocks noGrp="1"/>
-          </p:cNvSpPr>
-          <p:nvPr>
-            <p:ph type="subTitle" idx="1"/>
-          </p:nvPr>
-        </p:nvSpPr>
-        <p:spPr/>
-        <p:txBody>
-          <a:bodyPr/>
-          <a:lstStyle/>
-          <a:p/>
-        </p:txBody>
-      </p:sp>
-      <p:sp>
-        <p:nvSpPr>
-          <p:cNvPr id="4" name="TextBox 3"/>
-          <p:cNvSpPr txBox="1"/>
-          <p:nvPr/>
-        </p:nvSpPr>
-        <p:spPr>
-          <a:xfrm>
-            <a:off x="457200" y="457200"/>
-            <a:ext cx="7315200" cy="914400"/>
-          </a:xfrm>
-          <a:prstGeom prst="rect">
-            <a:avLst/>
-          </a:prstGeom>
-          <a:noFill/>
-        </p:spPr>
-        <p:txBody>
-          <a:bodyPr wrap="none">
-            <a:spAutoFit/>
-          </a:bodyPr>
-          <a:lstStyle/>
-          <a:p>
-            <a:r>
-              <a:rPr sz="3200">
-                <a:solidFill>
-                  <a:srgbClr val="FFFFFF"/>
-                </a:solidFill>
-                <a:latin typeface="Arial"/>
-              </a:rPr>
               <a:t>Add improvements!</a:t>
             </a:r>
           </a:p>
         </p:txBody>
       </p:sp>
-    </p:spTree>
-  </p:cSld>
-  <p:clrMapOvr>
-    <a:masterClrMapping/>
-  </p:clrMapOvr>
-</p:sld>
-</file>
-
-<file path=ppt/slides/slide7.xml><?xml version="1.0" encoding="utf-8"?>
-<p:sld xmlns:a="http://schemas.openxmlformats.org/drawingml/2006/main" xmlns:p="http://schemas.openxmlformats.org/presentationml/2006/main" xmlns:r="http://schemas.openxmlformats.org/officeDocument/2006/relationships">
-  <p:cSld>
-    <p:bg>
-      <p:bgPr>
-        <a:solidFill>
-          <a:srgbClr val="000000"/>
-        </a:solidFill>
-        <a:effectLst/>
-      </p:bgPr>
-    </p:bg>
-    <p:spTree>
-      <p:nvGrpSpPr>
-        <p:cNvPr id="1" name=""/>
-        <p:cNvGrpSpPr/>
-        <p:nvPr/>
-      </p:nvGrpSpPr>
-      <p:grpSpPr/>
-      <p:sp>
-        <p:nvSpPr>
-          <p:cNvPr id="2" name="Title 1"/>
-          <p:cNvSpPr>
-            <a:spLocks noGrp="1"/>
-          </p:cNvSpPr>
-          <p:nvPr>
-            <p:ph type="ctrTitle"/>
-          </p:nvPr>
-        </p:nvSpPr>
-        <p:spPr/>
-        <p:txBody>
-          <a:bodyPr/>
-          <a:lstStyle/>
-          <a:p/>
-        </p:txBody>
-      </p:sp>
-      <p:sp>
-        <p:nvSpPr>
-          <p:cNvPr id="3" name="Subtitle 2"/>
-          <p:cNvSpPr>
-            <a:spLocks noGrp="1"/>
-          </p:cNvSpPr>
-          <p:nvPr>
-            <p:ph type="subTitle" idx="1"/>
-          </p:nvPr>
-        </p:nvSpPr>
-        <p:spPr/>
-        <p:txBody>
-          <a:bodyPr/>
-          <a:lstStyle/>
-          <a:p/>
-        </p:txBody>
-      </p:sp>
-      <p:sp>
-        <p:nvSpPr>
-          <p:cNvPr id="4" name="TextBox 3"/>
-          <p:cNvSpPr txBox="1"/>
-          <p:nvPr/>
-        </p:nvSpPr>
-        <p:spPr>
-          <a:xfrm>
-            <a:off x="457200" y="457200"/>
-            <a:ext cx="7315200" cy="914400"/>
-          </a:xfrm>
-          <a:prstGeom prst="rect">
-            <a:avLst/>
-          </a:prstGeom>
-          <a:noFill/>
-        </p:spPr>
-        <p:txBody>
-          <a:bodyPr wrap="none">
-            <a:spAutoFit/>
-          </a:bodyPr>
-          <a:lstStyle/>
-          <a:p>
-            <a:r>
-              <a:rPr sz="3200">
-                <a:solidFill>
-                  <a:srgbClr val="FFFFFF"/>
-                </a:solidFill>
-                <a:latin typeface="Arial"/>
-              </a:rPr>
-              <a:t>1. light</a:t>
-            </a:r>
-          </a:p>
-        </p:txBody>
-      </p:sp>
-      <p:pic>
-        <p:nvPicPr>
-          <p:cNvPr id="5" name="Picture 4" descr="image0.jpeg"/>
-          <p:cNvPicPr>
-            <a:picLocks noChangeAspect="1"/>
-          </p:cNvPicPr>
-          <p:nvPr/>
-        </p:nvPicPr>
-        <p:blipFill>
-          <a:blip r:embed="rId3"/>
-          <a:stretch>
-            <a:fillRect/>
-          </a:stretch>
-        </p:blipFill>
-        <p:spPr>
-          <a:xfrm>
-            <a:off x="0" y="1097280"/>
-            <a:ext cx="11025301" cy="5760720"/>
-          </a:xfrm>
-          <a:prstGeom prst="rect">
-            <a:avLst/>
-          </a:prstGeom>
-        </p:spPr>
-      </p:pic>
-    </p:spTree>
-  </p:cSld>
-  <p:clrMapOvr>
-    <a:masterClrMapping/>
-  </p:clrMapOvr>
-</p:sld>
-</file>
-
-<file path=ppt/slides/slide8.xml><?xml version="1.0" encoding="utf-8"?>
-<p:sld xmlns:a="http://schemas.openxmlformats.org/drawingml/2006/main" xmlns:p="http://schemas.openxmlformats.org/presentationml/2006/main" xmlns:r="http://schemas.openxmlformats.org/officeDocument/2006/relationships">
-  <p:cSld>
-    <p:bg>
-      <p:bgPr>
-        <a:solidFill>
-          <a:srgbClr val="000000"/>
-        </a:solidFill>
-        <a:effectLst/>
-      </p:bgPr>
-    </p:bg>
-    <p:spTree>
-      <p:nvGrpSpPr>
-        <p:cNvPr id="1" name=""/>
-        <p:cNvGrpSpPr/>
-        <p:nvPr/>
-      </p:nvGrpSpPr>
-      <p:grpSpPr/>
-      <p:sp>
-        <p:nvSpPr>
-          <p:cNvPr id="2" name="Title 1"/>
-          <p:cNvSpPr>
-            <a:spLocks noGrp="1"/>
-          </p:cNvSpPr>
-          <p:nvPr>
-            <p:ph type="ctrTitle"/>
-          </p:nvPr>
-        </p:nvSpPr>
-        <p:spPr/>
-        <p:txBody>
-          <a:bodyPr/>
-          <a:lstStyle/>
-          <a:p/>
-        </p:txBody>
-      </p:sp>
-      <p:sp>
-        <p:nvSpPr>
-          <p:cNvPr id="3" name="Subtitle 2"/>
-          <p:cNvSpPr>
-            <a:spLocks noGrp="1"/>
-          </p:cNvSpPr>
-          <p:nvPr>
-            <p:ph type="subTitle" idx="1"/>
-          </p:nvPr>
-        </p:nvSpPr>
-        <p:spPr/>
-        <p:txBody>
-          <a:bodyPr/>
-          <a:lstStyle/>
-          <a:p/>
-        </p:txBody>
-      </p:sp>
-      <p:sp>
-        <p:nvSpPr>
-          <p:cNvPr id="4" name="TextBox 3"/>
-          <p:cNvSpPr txBox="1"/>
-          <p:nvPr/>
-        </p:nvSpPr>
-        <p:spPr>
-          <a:xfrm>
-            <a:off x="457200" y="457200"/>
-            <a:ext cx="7315200" cy="914400"/>
-          </a:xfrm>
-          <a:prstGeom prst="rect">
-            <a:avLst/>
-          </a:prstGeom>
-          <a:noFill/>
-        </p:spPr>
-        <p:txBody>
-          <a:bodyPr wrap="none">
-            <a:spAutoFit/>
-          </a:bodyPr>
-          <a:lstStyle/>
-          <a:p>
-            <a:r>
-              <a:rPr sz="3200">
-                <a:solidFill>
-                  <a:srgbClr val="FFFFFF"/>
-                </a:solidFill>
-                <a:latin typeface="Arial"/>
-              </a:rPr>
-              <a:t>2. water</a:t>
-            </a:r>
-          </a:p>
-        </p:txBody>
-      </p:sp>
-      <p:pic>
-        <p:nvPicPr>
-          <p:cNvPr id="5" name="Picture 4" descr="image1.jpeg"/>
-          <p:cNvPicPr>
-            <a:picLocks noChangeAspect="1"/>
-          </p:cNvPicPr>
-          <p:nvPr/>
-        </p:nvPicPr>
-        <p:blipFill>
-          <a:blip r:embed="rId3"/>
-          <a:stretch>
-            <a:fillRect/>
-          </a:stretch>
-        </p:blipFill>
-        <p:spPr>
-          <a:xfrm>
-            <a:off x="0" y="1097280"/>
-            <a:ext cx="11025301" cy="5760720"/>
-          </a:xfrm>
-          <a:prstGeom prst="rect">
-            <a:avLst/>
-          </a:prstGeom>
-        </p:spPr>
-      </p:pic>
-    </p:spTree>
-  </p:cSld>
-  <p:clrMapOvr>
-    <a:masterClrMapping/>
-  </p:clrMapOvr>
-</p:sld>
-</file>
-
-<file path=ppt/slides/slide9.xml><?xml version="1.0" encoding="utf-8"?>
-<p:sld xmlns:a="http://schemas.openxmlformats.org/drawingml/2006/main" xmlns:p="http://schemas.openxmlformats.org/presentationml/2006/main" xmlns:r="http://schemas.openxmlformats.org/officeDocument/2006/relationships">
-  <p:cSld>
-    <p:bg>
-      <p:bgPr>
-        <a:solidFill>
-          <a:srgbClr val="000000"/>
-        </a:solidFill>
-        <a:effectLst/>
-      </p:bgPr>
-    </p:bg>
-    <p:spTree>
-      <p:nvGrpSpPr>
-        <p:cNvPr id="1" name=""/>
-        <p:cNvGrpSpPr/>
-        <p:nvPr/>
-      </p:nvGrpSpPr>
-      <p:grpSpPr/>
-      <p:sp>
-        <p:nvSpPr>
-          <p:cNvPr id="2" name="Title 1"/>
-          <p:cNvSpPr>
-            <a:spLocks noGrp="1"/>
-          </p:cNvSpPr>
-          <p:nvPr>
-            <p:ph type="ctrTitle"/>
-          </p:nvPr>
-        </p:nvSpPr>
-        <p:spPr/>
-        <p:txBody>
-          <a:bodyPr/>
-          <a:lstStyle/>
-          <a:p/>
-        </p:txBody>
-      </p:sp>
-      <p:sp>
-        <p:nvSpPr>
-          <p:cNvPr id="3" name="Subtitle 2"/>
-          <p:cNvSpPr>
-            <a:spLocks noGrp="1"/>
-          </p:cNvSpPr>
-          <p:nvPr>
-            <p:ph type="subTitle" idx="1"/>
-          </p:nvPr>
-        </p:nvSpPr>
-        <p:spPr/>
-        <p:txBody>
-          <a:bodyPr/>
-          <a:lstStyle/>
-          <a:p/>
-        </p:txBody>
-      </p:sp>
-      <p:sp>
-        <p:nvSpPr>
-          <p:cNvPr id="4" name="TextBox 3"/>
-          <p:cNvSpPr txBox="1"/>
-          <p:nvPr/>
-        </p:nvSpPr>
-        <p:spPr>
-          <a:xfrm>
-            <a:off x="457200" y="457200"/>
-            <a:ext cx="7315200" cy="914400"/>
-          </a:xfrm>
-          <a:prstGeom prst="rect">
-            <a:avLst/>
-          </a:prstGeom>
-          <a:noFill/>
-        </p:spPr>
-        <p:txBody>
-          <a:bodyPr wrap="none">
-            <a:spAutoFit/>
-          </a:bodyPr>
-          <a:lstStyle/>
-          <a:p>
-            <a:r>
-              <a:rPr sz="3200">
-                <a:solidFill>
-                  <a:srgbClr val="FFFFFF"/>
-                </a:solidFill>
-                <a:latin typeface="Arial"/>
-              </a:rPr>
-              <a:t>3. carbon dioxide</a:t>
-            </a:r>
-          </a:p>
-        </p:txBody>
-      </p:sp>
-      <p:pic>
-        <p:nvPicPr>
-          <p:cNvPr id="5" name="Picture 4" descr="image2.jpeg"/>
-          <p:cNvPicPr>
-            <a:picLocks noChangeAspect="1"/>
-          </p:cNvPicPr>
-          <p:nvPr/>
-        </p:nvPicPr>
-        <p:blipFill>
-          <a:blip r:embed="rId3"/>
-          <a:stretch>
-            <a:fillRect/>
-          </a:stretch>
-        </p:blipFill>
-        <p:spPr>
-          <a:xfrm>
-            <a:off x="0" y="1097280"/>
-            <a:ext cx="11025301" cy="5760720"/>
-          </a:xfrm>
-          <a:prstGeom prst="rect">
-            <a:avLst/>
-          </a:prstGeom>
-        </p:spPr>
-      </p:pic>
     </p:spTree>
   </p:cSld>
   <p:clrMapOvr>

</xml_diff>

<commit_message>
too many images, new title still bad
</commit_message>
<xml_diff>
--- a/Flask-Project/test1.pptx
+++ b/Flask-Project/test1.pptx
@@ -9,7 +9,6 @@
     <p:sldId id="257" r:id="rId9"/>
     <p:sldId id="258" r:id="rId10"/>
     <p:sldId id="259" r:id="rId11"/>
-    <p:sldId id="260" r:id="rId12"/>
   </p:sldIdLst>
   <p:sldSz cx="9144000" cy="6858000" type="screen4x3"/>
   <p:notesSz cx="6858000" cy="9144000"/>
@@ -504,41 +503,51 @@
         <p:txBody>
           <a:bodyPr/>
           <a:lstStyle/>
+          <a:p>
+            <a:r>
+              <a:t>.</a:t>
+            </a:r>
+          </a:p>
           <a:p/>
+          <a:p>
+            <a:r>
+              <a:t>Plant life, as we know it, thrives on a process known as photosynthesis. This biochemical reaction, which occurs within the plant cells, is responsible for the production of food and oxygen that sustains all life forms on Earth. The process can be simply described as the conversion of carbon dioxide, water, and sunlight into glucose (a type of sugar) and oxygen.</a:t>
+            </a:r>
+          </a:p>
           <a:p/>
           <a:p>
             <a:r>
-              <a:t>Photosynthesis, a fundamental process essential for life on Earth, is the means by which green plants, algae, and cyanobacteria convert light energy into chemical energy. This biochemical process primarily takes place within organelles called chloroplasts, which are found in the cells of these organisms. The process of photosynthesis can be divided into two main stages: the light-dependent reactions and the light-independent reactions, also known as the Calvin cycle.</a:t>
+              <a:t>The photosynthetic process is divided into two main stages: the light-dependent reactions and the light-independent reactions, also known as Calvin cycle. In the light-dependent reactions, energy from sunlight is captured by pigments such as chlorophyll, found in the thylakoid membranes of chloroplasts. This energy is used to convert water molecules into protons, electrons, and oxygen. The protons create a gradient across the thylakoid membrane, driving the flow of electrons through a series of proteins in a pathway called the electron transport chain. This flow generates ATP (adenosine triphosphate), the energy currency of the cell.</a:t>
             </a:r>
           </a:p>
           <a:p/>
           <a:p>
             <a:r>
-              <a:t>In the first stage, the light-dependent reactions, the plant absorbs sunlight, primarily in the visible spectrum, through its leaves. This light energy is used to split water molecules into hydrogen, oxygen, and electrons. The hydrogen and oxygen are stored separately within the plant, with the oxygen being released into the atmosphere. The electrons, along with carbon dioxide from the air and nutrients from the soil, are passed through a series of electron transport chains and enzymes to produce ATP (adenosine triphosphate) and NADPH (nicotinamide adenine dinucleotide phosphate). These molecules serve as the primary source of energy for the second stage of photosynthesis.</a:t>
+              <a:t>The light-independent reactions occur in the stroma of the chloroplasts. Here, the ATP and NADPH (nicotinamide adenine dinucleotide phosphate) produced during the light-dependent reactions provide the energy required to convert carbon dioxide into glucose. This process involves several enzyme-catalyzed reactions, collectively known as the Calvin cycle. During the Calvin cycle, carbon dioxide is fixed into an organic compound, forming a three-carbon molecule called glyceraldehyde 3-phosphate (G3P). G3P can then be converted into glucose or used immediately for energy needs.</a:t>
             </a:r>
           </a:p>
           <a:p/>
           <a:p>
             <a:r>
-              <a:t>The light-independent reactions, or Calvin cycle, take place within stroma of the chloroplasts. Here, the ATP and NADPH produced during the light-dependent reactions are utilized to convert carbon dioxide into glucose, a simple sugar that serves as the primary form of energy storage for plants. This process involves three main phases: fixation, reduction, and regeneration.</a:t>
+              <a:t>Photosynthesis is not only essential for plants but also plays a crucial role in maintaining the Earth's atmosphere. Through photosynthesis, plants absorb carbon dioxide, helping to regulate its levels and prevent excessive accumulation in the atmosphere. Excessive carbon dioxide can lead to increased greenhouse gas emissions, contributing to global warming and climate change. On the other hand, photosynthesis produces oxygen, which is vital for aerobic organisms, including humans, animals, and most microorganisms.</a:t>
             </a:r>
           </a:p>
           <a:p/>
           <a:p>
             <a:r>
-              <a:t>During the fixation phase, an enzyme called Rubisco (ribulose bisphosphate carboxylase/oxygenase) combines carbon dioxide with a five-carbon compound called ribulose bisphosphate to form two three-carbon compounds. In the reduction phase, the three-carbon compounds undergo a series of reactions involving NADPH and ATP, resulting in the formation of a six-carbon compound called glyceraldehyde 3-phosphate. Finally, in the regeneration phase, the ribulose bisphosphate used in the fixation phase is reformed, allowing the Calvin cycle to continue.</a:t>
+              <a:t>In addition to its primary functions, photosynthesis also contributes to the chemical cycling of nutrients in ecosystems. For example, during decomposition, organic matter breaks down, releasing carbon dioxide back into the environment. Plants then absorb this carbon dioxide and convert it back into organic compounds during photosynthesis, effectively recycling carbon back into the ecosystem.</a:t>
             </a:r>
           </a:p>
           <a:p/>
           <a:p>
             <a:r>
-              <a:t>The glucose formed during the Calvin cycle can be used immediately for energy or stored for later use. If it's not needed right away, the glucose molecule can be converted into other carbohydrates, such as cellulose for structural support, or starch for long-term energy storage. In addition, some of the glucose may be used to create more complex molecules, such as proteins, fats, and nucleic acids, which are essential for growth and reproduction.</a:t>
+              <a:t>However, photosynthesis is not without challenges. Environmental factors such as temperature, light intensity, and carbon dioxide concentration can significantly impact the efficiency of photosynthesis. For instance, high temperatures can inhibit the enzymes involved in the Calvin cycle, reducing the rate of photosynthesis. Similarly, low light intensity or carbon dioxide concentrations can limit the production of ATP and NADPH, respectively, slowing down the photosynthetic process.</a:t>
             </a:r>
           </a:p>
           <a:p/>
           <a:p>
             <a:r>
-              <a:t>Photosynthesis plays a crucial role in maintaining the balance of oxygen and carbon dioxide in the Earth's atmosphere. By converting carbon dioxide into organic matter, photosynthesis effectively removes carbon dioxide from the atmosphere, helping to reduce its levels and mitigate climate change. Conversely, the release of oxygen during photosynthesis contributes to the Earth</a:t>
+              <a:t>Researchers are continuously</a:t>
             </a:r>
           </a:p>
         </p:txBody>
@@ -610,43 +619,49 @@
           <a:p/>
           <a:p>
             <a:r>
-              <a:t>Carbon Dioxide (CO2) and Water (H2O) play essential roles in the process of photosynthesis, a fundamental biological activity carried out by green plants, algae, and certain bacteria. This process converts carbon dioxide and water, with the help of sunlight, into glucose (a type of sugar), oxygen, and other products.</a:t>
+              <a:t>Carbon Dioxide (CO2) plays a crucial role in the process of photosynthesis, a fundamental biological activity carried out by green plants, algae, and certain bacteria. This essential chemical compound serves as the primary source of carbon for these organisms, helping them to produce their own food through a series of complex biochemical reactions.</a:t>
             </a:r>
           </a:p>
           <a:p/>
           <a:p>
             <a:r>
-              <a:t>During photosynthesis, carbon dioxide acts as a primary source of carbon for the plant. It enters the plant through tiny openings on the leaves called stomata. Inside the plant cells, the carbon dioxide molecules are captured and utilized within the chloroplasts, the organelles responsible for carrying out photosynthesis.</a:t>
+              <a:t>In photosynthesis, CO2 is absorbed from the air or water, depending on the organism. Inside the plant cells, within structures called chloroplasts, the CO2 molecules undergo a series of transformations. The initial step involves the carbon dioxide being converted into an organic compound, primarily glucose or other sugars, with the help of sunlight, water, and other nutrients.</a:t>
             </a:r>
           </a:p>
           <a:p/>
           <a:p>
             <a:r>
-              <a:t>Within the chloroplasts, an enzyme called Rubisco (Ribulose-1,5-bisphosphate carboxylase/oxygenase) catalyzes the first significant step of photosynthesis. Rubisco combines carbon dioxide with a five-carbon compound called ribulose bisphosphate to form two molecules of a three-carbon compound called phosphoglycerate.</a:t>
+              <a:t>The process begins when the carbon dioxide molecule interacts with a molecule of ribulose bisphosphate (RuBP), another essential component of photosynthesis. This interaction results in the formation of two molecules of 3-phosphoglycerate, which is then further processed to form glucose or other carbohydrates.</a:t>
             </a:r>
           </a:p>
           <a:p/>
           <a:p>
             <a:r>
-              <a:t>Phosphoglycerate then undergoes further reactions, ultimately resulting in the production of glucose, which serves as a vital energy source for the plant. In addition to providing energy, glucose also serves as a building block for various other organic compounds that the plant needs for growth and development.</a:t>
+              <a:t>This entire process is facilitated by a group of proteins known as Rubisco (Ribulose-1,5-bisphosphate carboxylase/oxygenase). Rubisco is responsible for the carboxylation of RuBP, which is the first step in the conversion of carbon dioxide into organic compounds. However, Rubisco can also catalyze the oxygenation of RuBP, leading to the production of harmful compounds such as glycolaldehyde and phosphoglycolic acid. This side reaction, known as photorespiration, consumes energy and reduces the overall efficiency of photosynthesis.</a:t>
             </a:r>
           </a:p>
           <a:p/>
           <a:p>
             <a:r>
-              <a:t>Meanwhile, water acts as both a reactant and a solvent during photosynthesis. The water molecules are split into hydrogen ions (protons) and electrons within the chloroplasts. The protons are used to create ATP (adenosine triphosphate), another crucial energy carrier for the plant. The electrons, along with the energy from sunlight, are used to power the electron transport chain, a series of reactions that generate a flow of electrons and produce ATP.</a:t>
+              <a:t>It is worth noting that CO2 is not just a raw material in photosynthesis but also a byproduct of cellular respiration, the opposite process where organisms convert stored carbohydrates back into energy. During cellular respiration, glucose is broken down, releasing CO2 and water, while also generating ATP (adenosine triphosphate), the primary energy currency of cells.</a:t>
             </a:r>
           </a:p>
           <a:p/>
           <a:p>
             <a:r>
-              <a:t>The oxygen produced during photosynthesis is a byproduct of the water splitting reaction. Oxygen gas diffuses out of the plant through the same stomata through which carbon dioxide entered. This oxygen is vital for aerobic organisms, including humans, as it is essential for cellular respiration, a process that provides energy for most life forms on Earth.</a:t>
+              <a:t>The balance between photosynthesis and cellular respiration is critical for the survival of most organisms. Photosynthesis provides the necessary glucose for growth and reproduction, while cellular respiration supplies energy for various cellular functions.</a:t>
             </a:r>
           </a:p>
           <a:p/>
           <a:p>
             <a:r>
-              <a:t>In summary, Carbon Dioxide and Water are integral components of photosynthesis. Carbon Dioxide provides the carbon needed for the plant to synthesize glucose and other organic compounds, while Water splits to produce ATP and oxygen. Photosynthesis not only supplies plants with the energy they need but also plays a critical role in the global carbon cycle and the production of oxygen in our atmosphere.</a:t>
+              <a:t>The importance of CO2 in photosynthesis extends beyond its role as a source of carbon. CO2 also influences the rate of photosynthesis. An increase in CO2 concentration can stimulate photosynthesis due to the enhanced availability of this essential raw material. This phenomenon, known as the CO2 fertilization effect, has significant implications for global climate change and agriculture.</a:t>
+            </a:r>
+          </a:p>
+          <a:p/>
+          <a:p>
+            <a:r>
+              <a:t>In conclusion, Carbon Dioxide is a key player in the process of photosynthesis, serving as the primary source of carbon for plants, algae, and certain bacteria. Its absorption, conversion into organic compounds, and subsequent release during cellular respiration form a cyclical process that is vital for the survival and growth of these organisms. Understanding the role of CO2 in photosynthesis can provide</a:t>
             </a:r>
           </a:p>
         </p:txBody>
@@ -718,43 +733,49 @@
           <a:p/>
           <a:p>
             <a:r>
-              <a:t>Chlorophyll, a green pigment found in plants and algae, plays a crucial role in the process of photosynthesis. This complex molecule is responsible for absorbing light energy, converting it into chemical energy, and utilizing it to produce glucose and oxygen. The specific wavelengths of light that chlorophyll can absorb are determined by its molecular structure.</a:t>
+              <a:t>The essential role of water in photosynthesis cannot be overstated. This life-sustaining process, carried out by green plants and other organisms, converts carbon dioxide, water, and light energy into glucose and oxygen. The intricate dance of water molecules within this biochemical spectacle is a testament to nature's ingenuity and efficiency.</a:t>
             </a:r>
           </a:p>
           <a:p/>
           <a:p>
             <a:r>
-              <a:t>Chlorophyll molecules have a porphyrin ring structure at their core, which contains magnesium. This central structure is surrounded by various side chains, some of which contain nitrogen atoms. The arrangement of these side chains and the presence of nitrogen atoms create a unique electronic structure in the chlorophyll molecule.</a:t>
+              <a:t>Water, in its liquid form, serves as the medium for the initial steps of photosynthesis. It is here that water molecules (H2O) are split into hydrogen ions (H+) and electrons (e-) at the thylakoid membrane, during a process known as photophosphorylation. This splitting occurs as a result of the absorption of light energy by chlorophyll, a pigment found within the chloroplasts of plant cells.</a:t>
             </a:r>
           </a:p>
           <a:p/>
           <a:p>
             <a:r>
-              <a:t>The electronic structure of chlorophyll allows it to absorb light most efficiently at wavelengths around 430 nanometers (violet-blue light) and 660 nanometers (red light). This is known as the absorption spectrum of chlorophyll. The reason for this specific absorption pattern lies in the arrangement of electrons within the chlorophyll molecule. When violet-blue or red light hits the chlorophyll, it excites the electrons in the molecule, causing them to move to a higher energy level.</a:t>
+              <a:t>The energy absorbed by the chlorophyll causes a change in the electronic structure of the chlorophyll molecule, which in turn excites an electron from the water molecule. This excited electron moves through a series of electron transport chains, driving the production of ATP (adenosine triphosphate), the primary energy carrier in cells. Simultaneously, hydrogen ions are pumped across the thylakoid membrane, creating a concentration gradient.</a:t>
             </a:r>
           </a:p>
           <a:p/>
           <a:p>
             <a:r>
-              <a:t>Once excited, the electrons quickly return to their ground state, releasing the excess energy as heat. However, some of this energy is used to power the synthesis of ATP (adenosine triphosphate), a high-energy molecule that provides the energy required for other cellular processes. In addition, the energy is also used to convert carbon dioxide and water into glucose during the light-dependent reactions of photosynthesis.</a:t>
+              <a:t>This gradient drives the movement of hydrogen ions back into the thylakoid space, a process known as chemiosmosis. As these ions return, they pass through a protein complex called ATP synthase, where their kinetic energy is converted into chemical energy stored in ATP molecules.</a:t>
             </a:r>
           </a:p>
           <a:p/>
           <a:p>
             <a:r>
-              <a:t>Interestingly, chlorophyll does not absorb light in the yellow and green regions of the spectrum very well. This is because the energy of yellow and green light is not sufficient to excite the electrons in the chlorophyll molecule to a higher energy level. As a result, these wavelengths of light are reflected back from the leaves, giving them their green color.</a:t>
+              <a:t>Meanwhile, in the stroma of the chloroplast, the Calvin cycle takes place. Here, carbon dioxide enters the plant cell through tiny pores called stomata. In the Calvin cycle, carbon dioxide is fixed into organic compounds using the energy stored in ATP and NADPH (nicotinamide adenine dinucleotide phosphate), another reduced coenzyme generated during photophosphorylation.</a:t>
             </a:r>
           </a:p>
           <a:p/>
           <a:p>
             <a:r>
-              <a:t>The ability of chlorophyll to absorb specific wavelengths of light is not only important for photosynthesis but also has implications for the environment. For example, the absorption of red and blue light by chlorophyll can affect the distribution of light in aquatic environments. In terrestrial ecosystems, the reflection of green light by leaves can influence the growth of understory plants and the overall structure of the forest.</a:t>
+              <a:t>Initially, a five-carbon sugar called ribulose bisphosphate (RuBP) reacts with carbon dioxide to produce two three-carbon sugars, glyceraldehyde 3-phosphate (G3P). These G3P molecules can then be used immediately for energy or stored for later use, such as for growth and reproduction. Additionally, some of the G3P may be used to regenerate RuBP, allowing the Calvin cycle to continue.</a:t>
             </a:r>
           </a:p>
           <a:p/>
           <a:p>
             <a:r>
-              <a:t>In conclusion, chlorophyll absorption plays a vital role in the process of photosynthesis. By absorbing light energy at specific wavelengths, chlorophyll powers the conversion of carbon dioxide and water into glucose and oxygen, providing the energy needed for life on Earth. Understanding the absorption properties of chlorophyll can help us better understand the functioning of ecosystems and the distribution of energy in both terrestrial and aquatic environments.</a:t>
+              <a:t>In essence, water plays a dual role in photosynthesis: it provides the starting material for the process, supplying the carbon needed to build carbohydrates, and it serves as a crucial intermediary, generating the energy required to drive the process forward. The conversion of water into oxygen is a byproduct of this process, making photosynthesis not only essential for life on Earth but also responsible for maintaining our planet's atmosphere.</a:t>
+            </a:r>
+          </a:p>
+          <a:p/>
+          <a:p>
+            <a:r>
+              <a:t>Understanding the role of water in photosynthesis sheds light on the intricate balance between the environment and living organisms. It underscores the importance of water</a:t>
             </a:r>
           </a:p>
         </p:txBody>
@@ -780,124 +801,6 @@
 </file>
 
 <file path=ppt/notesSlides/notesSlide4.xml><?xml version="1.0" encoding="utf-8"?>
-<p:notes xmlns:a="http://schemas.openxmlformats.org/drawingml/2006/main" xmlns:p="http://schemas.openxmlformats.org/presentationml/2006/main" xmlns:r="http://schemas.openxmlformats.org/officeDocument/2006/relationships">
-  <p:cSld>
-    <p:spTree>
-      <p:nvGrpSpPr>
-        <p:cNvPr id="1" name=""/>
-        <p:cNvGrpSpPr/>
-        <p:nvPr/>
-      </p:nvGrpSpPr>
-      <p:grpSpPr>
-        <a:xfrm>
-          <a:off x="0" y="0"/>
-          <a:ext cx="0" cy="0"/>
-          <a:chOff x="0" y="0"/>
-          <a:chExt cx="0" cy="0"/>
-        </a:xfrm>
-      </p:grpSpPr>
-      <p:sp>
-        <p:nvSpPr>
-          <p:cNvPr id="2" name="Slide Image Placeholder 1"/>
-          <p:cNvSpPr>
-            <a:spLocks noGrp="1"/>
-          </p:cNvSpPr>
-          <p:nvPr>
-            <p:ph type="sldImg" idx="2"/>
-          </p:nvPr>
-        </p:nvSpPr>
-        <p:spPr/>
-      </p:sp>
-      <p:sp>
-        <p:nvSpPr>
-          <p:cNvPr id="3" name="Notes Placeholder 2"/>
-          <p:cNvSpPr>
-            <a:spLocks noGrp="1"/>
-          </p:cNvSpPr>
-          <p:nvPr>
-            <p:ph type="body" idx="3" sz="quarter"/>
-          </p:nvPr>
-        </p:nvSpPr>
-        <p:spPr/>
-        <p:txBody>
-          <a:bodyPr/>
-          <a:lstStyle/>
-          <a:p>
-            <a:r>
-              <a:t>)</a:t>
-            </a:r>
-          </a:p>
-          <a:p/>
-          <a:p>
-            <a:r>
-              <a:t>In the intricate dance of life, glucose plays a pivotal role as the primary energy currency for all living organisms. The production of this essential molecule is primarily achieved through photosynthesis in plants, algae, and some bacteria, while animals rely on glucose uptake from their diet or the conversion of other nutrients within their bodies.</a:t>
-            </a:r>
-          </a:p>
-          <a:p/>
-          <a:p>
-            <a:r>
-              <a:t>The process of photosynthesis, carried out in the chloroplasts of plant cells, is an elegant combination of light-dependent and light-independent reactions. During the light-dependent reactions, photons are absorbed by chlorophyll and carotenoid pigments, initiating a series of events that ultimately lead to the generation of ATP (adenosine triphosphate) and NADPH (nicotinamide adenine dinucleotide phosphate). These high-energy compounds are crucial for driving the subsequent light-independent reactions, also known as the Calvin cycle.</a:t>
-            </a:r>
-          </a:p>
-          <a:p/>
-          <a:p>
-            <a:r>
-              <a:t>In the Calvin cycle, carbon dioxide (CO2) is fixed into organic molecules, primarily in the form of three-carbon sugar, glyceraldehyde 3-phosphate (G3P). This fixation occurs in the stroma of the chloroplasts, where enzymes such as Rubisco (ribulose bisphosphate carboxylase/oxygenase) catalyze the reaction between CO2 and a five-carbon compound, ribulose 1,5-bisphosphate (RuBP), forming two molecules of G3P.</a:t>
-            </a:r>
-          </a:p>
-          <a:p/>
-          <a:p>
-            <a:r>
-              <a:t>After the initial fixation, the G3P molecules undergo a series of transformations, resulting in the net synthesis of one molecule of triose phosphate per two original molecules of RuBP. The remaining two phosphate groups are recycled back to regenerate more RuBP, allowing the cycle to continue.</a:t>
-            </a:r>
-          </a:p>
-          <a:p/>
-          <a:p>
-            <a:r>
-              <a:t>The newly formed triose phosphates can then be converted into glucose or other sugars via various metabolic pathways, such as the pentose phosphate pathway, glycolysis, and the Calvin-Bassham cycle. These processes involve a complex interplay of enzymatic reactions, substrate transport, and energy coupling, ensuring that the necessary precursors for glucose synthesis are always available.</a:t>
-            </a:r>
-          </a:p>
-          <a:p/>
-          <a:p>
-            <a:r>
-              <a:t>It is worth noting that not all photosynthesized glucose remains within the plant cell. In fact, a significant portion is exported to other parts of the plant via the phloem, providing energy for growth and development. Additionally, glucose can be stored as starch within the chloroplasts or converted into sucrose and translocated to vacuoles for later use or storage.</a:t>
-            </a:r>
-          </a:p>
-          <a:p/>
-          <a:p>
-            <a:r>
-              <a:t>Plants can also adjust their glucose production rates based on environmental factors such as light intensity, temperature, and CO2 concentration. For example, during periods of low light, the rate of photosynthesis slows down, leading to a reduction in glucose production. Conversely, during periods of high light, plants may increase their rate of photosynthesis, thereby increasing glucose production.</a:t>
-            </a:r>
-          </a:p>
-          <a:p/>
-          <a:p>
-            <a:r>
-              <a:t>In conclusion, the production of</a:t>
-            </a:r>
-          </a:p>
-        </p:txBody>
-      </p:sp>
-      <p:sp>
-        <p:nvSpPr>
-          <p:cNvPr id="4" name="Slide Number Placeholder 3"/>
-          <p:cNvSpPr>
-            <a:spLocks noGrp="1"/>
-          </p:cNvSpPr>
-          <p:nvPr>
-            <p:ph type="sldNum" idx="5" sz="quarter"/>
-          </p:nvPr>
-        </p:nvSpPr>
-        <p:spPr/>
-      </p:sp>
-    </p:spTree>
-  </p:cSld>
-  <p:clrMapOvr>
-    <a:masterClrMapping/>
-  </p:clrMapOvr>
-</p:notes>
-</file>
-
-<file path=ppt/notesSlides/notesSlide5.xml><?xml version="1.0" encoding="utf-8"?>
 <p:notes xmlns:a="http://schemas.openxmlformats.org/drawingml/2006/main" xmlns:p="http://schemas.openxmlformats.org/presentationml/2006/main" xmlns:r="http://schemas.openxmlformats.org/officeDocument/2006/relationships">
   <p:cSld>
     <p:spTree>
@@ -4137,7 +4040,7 @@
                 </a:solidFill>
                 <a:latin typeface="Arial"/>
               </a:rPr>
-              <a:t>Carbon dioxide and water</a:t>
+              <a:t>Carbon dioxide</a:t>
             </a:r>
           </a:p>
         </p:txBody>
@@ -4255,7 +4158,7 @@
                 </a:solidFill>
                 <a:latin typeface="Arial"/>
               </a:rPr>
-              <a:t>Chlorophyll absorption</a:t>
+              <a:t>Water</a:t>
             </a:r>
           </a:p>
         </p:txBody>
@@ -4293,136 +4196,6 @@
 </file>
 
 <file path=ppt/slides/slide4.xml><?xml version="1.0" encoding="utf-8"?>
-<p:sld xmlns:a="http://schemas.openxmlformats.org/drawingml/2006/main" xmlns:p="http://schemas.openxmlformats.org/presentationml/2006/main" xmlns:r="http://schemas.openxmlformats.org/officeDocument/2006/relationships">
-  <p:cSld>
-    <p:bg>
-      <p:bgPr>
-        <a:solidFill>
-          <a:srgbClr val="000000"/>
-        </a:solidFill>
-        <a:effectLst/>
-      </p:bgPr>
-    </p:bg>
-    <p:spTree>
-      <p:nvGrpSpPr>
-        <p:cNvPr id="1" name=""/>
-        <p:cNvGrpSpPr/>
-        <p:nvPr/>
-      </p:nvGrpSpPr>
-      <p:grpSpPr/>
-      <p:sp>
-        <p:nvSpPr>
-          <p:cNvPr id="2" name="Title 1"/>
-          <p:cNvSpPr>
-            <a:spLocks noGrp="1"/>
-          </p:cNvSpPr>
-          <p:nvPr>
-            <p:ph type="ctrTitle"/>
-          </p:nvPr>
-        </p:nvSpPr>
-        <p:spPr/>
-        <p:txBody>
-          <a:bodyPr/>
-          <a:lstStyle/>
-          <a:p/>
-        </p:txBody>
-      </p:sp>
-      <p:sp>
-        <p:nvSpPr>
-          <p:cNvPr id="3" name="Subtitle 2"/>
-          <p:cNvSpPr>
-            <a:spLocks noGrp="1"/>
-          </p:cNvSpPr>
-          <p:nvPr>
-            <p:ph type="subTitle" idx="1"/>
-          </p:nvPr>
-        </p:nvSpPr>
-        <p:spPr/>
-        <p:txBody>
-          <a:bodyPr/>
-          <a:lstStyle/>
-          <a:p/>
-        </p:txBody>
-      </p:sp>
-      <p:sp>
-        <p:nvSpPr>
-          <p:cNvPr id="4" name="TextBox 3"/>
-          <p:cNvSpPr txBox="1"/>
-          <p:nvPr/>
-        </p:nvSpPr>
-        <p:spPr>
-          <a:xfrm>
-            <a:off x="457200" y="457200"/>
-            <a:ext cx="7315200" cy="914400"/>
-          </a:xfrm>
-          <a:prstGeom prst="rect">
-            <a:avLst/>
-          </a:prstGeom>
-          <a:noFill/>
-        </p:spPr>
-        <p:txBody>
-          <a:bodyPr wrap="none">
-            <a:spAutoFit/>
-          </a:bodyPr>
-          <a:lstStyle/>
-          <a:p>
-            <a:r>
-              <a:rPr sz="3200">
-                <a:solidFill>
-                  <a:srgbClr val="FFFFFF"/>
-                </a:solidFill>
-                <a:latin typeface="Arial"/>
-              </a:rPr>
-              <a:t>Glucose production.</a:t>
-            </a:r>
-          </a:p>
-          <a:p/>
-          <a:p>
-            <a:r>
-              <a:rPr sz="3200">
-                <a:solidFill>
-                  <a:srgbClr val="FFFFFF"/>
-                </a:solidFill>
-                <a:latin typeface="Arial"/>
-              </a:rPr>
-              <a:t>(car</a:t>
-            </a:r>
-          </a:p>
-        </p:txBody>
-      </p:sp>
-      <p:pic>
-        <p:nvPicPr>
-          <p:cNvPr id="5" name="Picture 4" descr="image3.jpeg"/>
-          <p:cNvPicPr>
-            <a:picLocks noChangeAspect="1"/>
-          </p:cNvPicPr>
-          <p:nvPr/>
-        </p:nvPicPr>
-        <p:blipFill>
-          <a:blip r:embed="rId3"/>
-          <a:stretch>
-            <a:fillRect/>
-          </a:stretch>
-        </p:blipFill>
-        <p:spPr>
-          <a:xfrm>
-            <a:off x="0" y="1097280"/>
-            <a:ext cx="11025301" cy="5760720"/>
-          </a:xfrm>
-          <a:prstGeom prst="rect">
-            <a:avLst/>
-          </a:prstGeom>
-        </p:spPr>
-      </p:pic>
-    </p:spTree>
-  </p:cSld>
-  <p:clrMapOvr>
-    <a:masterClrMapping/>
-  </p:clrMapOvr>
-</p:sld>
-</file>
-
-<file path=ppt/slides/slide5.xml><?xml version="1.0" encoding="utf-8"?>
 <p:sld xmlns:a="http://schemas.openxmlformats.org/drawingml/2006/main" xmlns:p="http://schemas.openxmlformats.org/presentationml/2006/main" xmlns:r="http://schemas.openxmlformats.org/officeDocument/2006/relationships">
   <p:cSld>
     <p:bg>

</xml_diff>

<commit_message>
2/3 buttons working great
</commit_message>
<xml_diff>
--- a/Flask-Project/test1.pptx
+++ b/Flask-Project/test1.pptx
@@ -9,6 +9,8 @@
     <p:sldId id="257" r:id="rId9"/>
     <p:sldId id="258" r:id="rId10"/>
     <p:sldId id="259" r:id="rId11"/>
+    <p:sldId id="260" r:id="rId12"/>
+    <p:sldId id="261" r:id="rId13"/>
   </p:sldIdLst>
   <p:sldSz cx="9144000" cy="6858000" type="screen4x3"/>
   <p:notesSz cx="6858000" cy="9144000"/>
@@ -511,43 +513,49 @@
           <a:p/>
           <a:p>
             <a:r>
-              <a:t>Plant life, as we know it, thrives on a process known as photosynthesis. This biochemical reaction, which occurs within the plant cells, is responsible for the production of food and oxygen that sustains all life forms on Earth. The process can be simply described as the conversion of carbon dioxide, water, and sunlight into glucose (a type of sugar) and oxygen.</a:t>
+              <a:t>Photosynthesis, a fundamental process for life on Earth, is the biochemical pathway by which green plants, algae, and some bacteria convert carbon dioxide into organic compounds, while concurrently releasing oxygen as a waste product. This process is crucial for maintaining the Earth's atmosphere and supporting all aerobic organisms, including humans.</a:t>
             </a:r>
           </a:p>
           <a:p/>
           <a:p>
             <a:r>
-              <a:t>The photosynthetic process is divided into two main stages: the light-dependent reactions and the light-independent reactions, also known as Calvin cycle. In the light-dependent reactions, energy from sunlight is captured by pigments such as chlorophyll, found in the thylakoid membranes of chloroplasts. This energy is used to convert water molecules into protons, electrons, and oxygen. The protons create a gradient across the thylakoid membrane, driving the flow of electrons through a series of proteins in a pathway called the electron transport chain. This flow generates ATP (adenosine triphosphate), the energy currency of the cell.</a:t>
+              <a:t>The process of photosynthesis can be divided into two main phases: the light-dependent reactions and the light-independent reactions, also known as the Calvin cycle. The light-dependent reactions occur in the thylakoid membrane of the chloroplast, where energy from sunlight is captured and converted into chemical energy.</a:t>
             </a:r>
           </a:p>
           <a:p/>
           <a:p>
             <a:r>
-              <a:t>The light-independent reactions occur in the stroma of the chloroplasts. Here, the ATP and NADPH (nicotinamide adenine dinucleotide phosphate) produced during the light-dependent reactions provide the energy required to convert carbon dioxide into glucose. This process involves several enzyme-catalyzed reactions, collectively known as the Calvin cycle. During the Calvin cycle, carbon dioxide is fixed into an organic compound, forming a three-carbon molecule called glyceraldehyde 3-phosphate (G3P). G3P can then be converted into glucose or used immediately for energy needs.</a:t>
+              <a:t>The first step in the light-dependent reactions is the absorption of photons by pigments, primarily chlorophyll, located within the thylakoid membrane. These pigments absorb light energy and transfer it to a reaction center, initiating a series of redox reactions. The initial electron donor is water (H2O), which is split into protons (H+), electrons (e-), and molecular oxygen (O2). The protons are used to create an electrochemical gradient across the thylakoid membrane, driving the synthesis of ATP (adenosine triphosphate) via ATP synthase. The electrons, meanwhile, travel through a series of proteins called electron transport chains, ultimately reducing NADP+ (nicotinamide adenine dinucleotide phosphate) to NADPH (reduced nicotinamide adenine dinucleotide phosphate).</a:t>
             </a:r>
           </a:p>
           <a:p/>
           <a:p>
             <a:r>
-              <a:t>Photosynthesis is not only essential for plants but also plays a crucial role in maintaining the Earth's atmosphere. Through photosynthesis, plants absorb carbon dioxide, helping to regulate its levels and prevent excessive accumulation in the atmosphere. Excessive carbon dioxide can lead to increased greenhouse gas emissions, contributing to global warming and climate change. On the other hand, photosynthesis produces oxygen, which is vital for aerobic organisms, including humans, animals, and most microorganisms.</a:t>
+              <a:t>The ATP and NADPH produced during the light-dependent reactions serve as energy carriers for the light-independent reactions, which take place in the stroma of the chloroplast. In this phase, carbon dioxide is fixed into organic molecules, primarily glucose (C6H12O6). This process occurs in three stages: carbon fixation, reduction, and regeneration.</a:t>
             </a:r>
           </a:p>
           <a:p/>
           <a:p>
             <a:r>
-              <a:t>In addition to its primary functions, photosynthesis also contributes to the chemical cycling of nutrients in ecosystems. For example, during decomposition, organic matter breaks down, releasing carbon dioxide back into the environment. Plants then absorb this carbon dioxide and convert it back into organic compounds during photosynthesis, effectively recycling carbon back into the ecosystem.</a:t>
+              <a:t>During carbon fixation, a five-carbon sugar called ribulose bisphosphate (RuBP) reacts with carbon dioxide to form two molecules of 3-phosphoglycerate. In the reduction stage, these intermediates are converted into 2-phosphoglycerate, which is then phosphorylated to form one molecule each of glyceraldehyde 3-phosphate (G3P) and 3-phosphoglycerate. Finally, in the regeneration stage, G3P is converted back into RuBP, allowing the process to repeat.</a:t>
             </a:r>
           </a:p>
           <a:p/>
           <a:p>
             <a:r>
-              <a:t>However, photosynthesis is not without challenges. Environmental factors such as temperature, light intensity, and carbon dioxide concentration can significantly impact the efficiency of photosynthesis. For instance, high temperatures can inhibit the enzymes involved in the Calvin cycle, reducing the rate of photosynthesis. Similarly, low light intensity or carbon dioxide concentrations can limit the production of ATP and NADPH, respectively, slowing down the photosynthetic process.</a:t>
+              <a:t>The overall equation for photosynthesis can be represented as follows:</a:t>
             </a:r>
           </a:p>
           <a:p/>
           <a:p>
             <a:r>
-              <a:t>Researchers are continuously</a:t>
+              <a:t>6 CO2 + 6 H2O + light energy → C6H12O6 + 6 O2 + 6 H2O</a:t>
+            </a:r>
+          </a:p>
+          <a:p/>
+          <a:p>
+            <a:r>
+              <a:t>This equation illustrates that for every six molecules of carbon dioxide absorbed, six molecules of glucose are produced, along with six molecules of water and six molecules of oxygen. The oxygen is released as a waste product, while the glucose serves as food for the plant,</a:t>
             </a:r>
           </a:p>
         </p:txBody>
@@ -615,53 +623,51 @@
         <p:txBody>
           <a:bodyPr/>
           <a:lstStyle/>
+          <a:p>
+            <a:r>
+              <a:t>:</a:t>
+            </a:r>
+          </a:p>
           <a:p/>
+          <a:p>
+            <a:r>
+              <a:t>Chloroplasts are the powerhouses of the plant kingdom, playing a pivotal role in photosynthesis. These organelles are found within the eukaryotic cells of green plants, algae, and some bacteria, and they are responsible for converting light energy into chemical energy through a process known as photophosphorylation.</a:t>
+            </a:r>
+          </a:p>
           <a:p/>
           <a:p>
             <a:r>
-              <a:t>Carbon Dioxide (CO2) plays a crucial role in the process of photosynthesis, a fundamental biological activity carried out by green plants, algae, and certain bacteria. This essential chemical compound serves as the primary source of carbon for these organisms, helping them to produce their own food through a series of complex biochemical reactions.</a:t>
+              <a:t>The structure of chloroplasts is intricate and complex, designed to facilitate the process of photosynthesis. The chloroplast contains a double membrane, with an intermembrane space between them. Within this double membrane lies the stroma, a fluid-like matrix that serves as the site for various metabolic reactions. The inner boundary of the double membrane houses the thylakoid membrane, which contains pigments such as chlorophyll, carotenoids, and phycobilins that absorb light energy.</a:t>
             </a:r>
           </a:p>
           <a:p/>
           <a:p>
             <a:r>
-              <a:t>In photosynthesis, CO2 is absorbed from the air or water, depending on the organism. Inside the plant cells, within structures called chloroplasts, the CO2 molecules undergo a series of transformations. The initial step involves the carbon dioxide being converted into an organic compound, primarily glucose or other sugars, with the help of sunlight, water, and other nutrients.</a:t>
+              <a:t>The thylakoid membrane is folded into sacs called thylakoids, which form a network of interconnected tubes. The lumen, or space within the thylakoids, is where the photosynthetic electron transport chain is located. This chain facilitates the transfer of electrons from water molecules to carbon dioxide, generating ATP (adenosine triphosphate) and NADPH (nicotinamide adenine dinucleotide phosphate), two crucial energy-carrying molecules.</a:t>
             </a:r>
           </a:p>
           <a:p/>
           <a:p>
             <a:r>
-              <a:t>The process begins when the carbon dioxide molecule interacts with a molecule of ribulose bisphosphate (RuBP), another essential component of photosynthesis. This interaction results in the formation of two molecules of 3-phosphoglycerate, which is then further processed to form glucose or other carbohydrates.</a:t>
+              <a:t>The light-dependent reactions occur within the thylakoid membrane. During these reactions, sunlight is absorbed by chlorophyll, triggering a series of events that result in the production of ATP and NADPH. The light-independent reactions, also known as the Calvin cycle, take place in the stroma. Here, carbon dioxide is fixed into organic compounds using the energy stored in ATP and NADPH.</a:t>
             </a:r>
           </a:p>
           <a:p/>
           <a:p>
             <a:r>
-              <a:t>This entire process is facilitated by a group of proteins known as Rubisco (Ribulose-1,5-bisphosphate carboxylase/oxygenase). Rubisco is responsible for the carboxylation of RuBP, which is the first step in the conversion of carbon dioxide into organic compounds. However, Rubisco can also catalyze the oxygenation of RuBP, leading to the production of harmful compounds such as glycolaldehyde and phosphoglycolic acid. This side reaction, known as photorespiration, consumes energy and reduces the overall efficiency of photosynthesis.</a:t>
+              <a:t>The chloroplast also contains several other important components. For instance, the ribosomes, which are essential for protein synthesis, are found on the outer surface of the chloroplast. Additionally, the chloroplast genome, located within the chloroplast, encodes genes necessary for the synthesis of proteins involved in photosynthesis.</a:t>
             </a:r>
           </a:p>
           <a:p/>
           <a:p>
             <a:r>
-              <a:t>It is worth noting that CO2 is not just a raw material in photosynthesis but also a byproduct of cellular respiration, the opposite process where organisms convert stored carbohydrates back into energy. During cellular respiration, glucose is broken down, releasing CO2 and water, while also generating ATP (adenosine triphosphate), the primary energy currency of cells.</a:t>
+              <a:t>The efficiency of photosynthesis depends on various factors, including the amount of sunlight, temperature, and the availability of carbon dioxide. Chloroplasts have evolved mechanisms to adapt to these changing conditions. For example, they can adjust the number of thylakoids, change the orientation of their chlorophyll molecules, and regulate the opening and closing of stomata, small pores on the plant's leaves that allow for gas exchange.</a:t>
             </a:r>
           </a:p>
           <a:p/>
           <a:p>
             <a:r>
-              <a:t>The balance between photosynthesis and cellular respiration is critical for the survival of most organisms. Photosynthesis provides the necessary glucose for growth and reproduction, while cellular respiration supplies energy for various cellular functions.</a:t>
-            </a:r>
-          </a:p>
-          <a:p/>
-          <a:p>
-            <a:r>
-              <a:t>The importance of CO2 in photosynthesis extends beyond its role as a source of carbon. CO2 also influences the rate of photosynthesis. An increase in CO2 concentration can stimulate photosynthesis due to the enhanced availability of this essential raw material. This phenomenon, known as the CO2 fertilization effect, has significant implications for global climate change and agriculture.</a:t>
-            </a:r>
-          </a:p>
-          <a:p/>
-          <a:p>
-            <a:r>
-              <a:t>In conclusion, Carbon Dioxide is a key player in the process of photosynthesis, serving as the primary source of carbon for plants, algae, and certain bacteria. Its absorption, conversion into organic compounds, and subsequent release during cellular respiration form a cyclical process that is vital for the survival and growth of these organisms. Understanding the role of CO2 in photosynthesis can provide</a:t>
+              <a:t>In conclusion, chloroplasts play a vital role in photosynthesis, the process by which plants convert light energy into chemical energy. They contain a complex structure that facilitates both light-dependent and light-independent reactions, and they possess mechanisms to adapt to varying environmental conditions. Understanding the role and structure of chloroplasts provides valuable insights into the workings of photosynthesis and the overall health of plants.</a:t>
             </a:r>
           </a:p>
         </p:txBody>
@@ -733,49 +739,49 @@
           <a:p/>
           <a:p>
             <a:r>
-              <a:t>The essential role of water in photosynthesis cannot be overstated. This life-sustaining process, carried out by green plants and other organisms, converts carbon dioxide, water, and light energy into glucose and oxygen. The intricate dance of water molecules within this biochemical spectacle is a testament to nature's ingenuity and efficiency.</a:t>
+              <a:t>Carbon Dioxide (CO2) plays a pivotal role in the process of photosynthesis, a fundamental biological process that converts carbon dioxide and water into glucose and oxygen. This cyclical process is essential for life on Earth, as it provides organisms with energy and maintains the planet's oxygen levels.</a:t>
             </a:r>
           </a:p>
           <a:p/>
           <a:p>
             <a:r>
-              <a:t>Water, in its liquid form, serves as the medium for the initial steps of photosynthesis. It is here that water molecules (H2O) are split into hydrogen ions (H+) and electrons (e-) at the thylakoid membrane, during a process known as photophosphorylation. This splitting occurs as a result of the absorption of light energy by chlorophyll, a pigment found within the chloroplasts of plant cells.</a:t>
+              <a:t>In photosynthesis, CO2 serves as the primary source of carbon for the organic compounds that plants, algae, and certain bacteria produce. The carbon atom within CO2 is incorporated into complex molecules such as glucose, cellulose, and other carbohydrates through a series of reactions catalyzed by enzymes.</a:t>
             </a:r>
           </a:p>
           <a:p/>
           <a:p>
             <a:r>
-              <a:t>The energy absorbed by the chlorophyll causes a change in the electronic structure of the chlorophyll molecule, which in turn excites an electron from the water molecule. This excited electron moves through a series of electron transport chains, driving the production of ATP (adenosine triphosphate), the primary energy carrier in cells. Simultaneously, hydrogen ions are pumped across the thylakoid membrane, creating a concentration gradient.</a:t>
+              <a:t>The process begins when sunlight strikes the leaves of plants. Chlorophyll, a green pigment found in chloroplasts, absorbs light energy, which is then used to split water molecules into hydrogen and oxygen. The oxygen is released as a waste product, while the hydrogen is used in subsequent reactions.</a:t>
             </a:r>
           </a:p>
           <a:p/>
           <a:p>
             <a:r>
-              <a:t>This gradient drives the movement of hydrogen ions back into the thylakoid space, a process known as chemiosmosis. As these ions return, they pass through a protein complex called ATP synthase, where their kinetic energy is converted into chemical energy stored in ATP molecules.</a:t>
+              <a:t>The hydrogen, along with CO2, undergoes a series of reactions known as the Calvin cycle or carbon fixation. During this process, an enzyme called rubisco (ribulose bisphosphate carboxylase/oxygenase) facilitates the conversion of CO2 into an organic compound called 3-phosphoglycerate. This compound is then further converted into glucose and other carbohydrates.</a:t>
             </a:r>
           </a:p>
           <a:p/>
           <a:p>
             <a:r>
-              <a:t>Meanwhile, in the stroma of the chloroplast, the Calvin cycle takes place. Here, carbon dioxide enters the plant cell through tiny pores called stomata. In the Calvin cycle, carbon dioxide is fixed into organic compounds using the energy stored in ATP and NADPH (nicotinamide adenine dinucleotide phosphate), another reduced coenzyme generated during photophosphorylation.</a:t>
+              <a:t>It is important to note that the CO2 uptake by plants is not infinite. Factors such as the concentration of CO2 in the air, light intensity, and temperature can influence the rate of photosynthesis. For instance, an increase in CO2 concentration can lead to an enhancement of photosynthetic efficiency due to the higher availability of CO2 for the Calvin cycle.</a:t>
             </a:r>
           </a:p>
           <a:p/>
           <a:p>
             <a:r>
-              <a:t>Initially, a five-carbon sugar called ribulose bisphosphate (RuBP) reacts with carbon dioxide to produce two three-carbon sugars, glyceraldehyde 3-phosphate (G3P). These G3P molecules can then be used immediately for energy or stored for later use, such as for growth and reproduction. Additionally, some of the G3P may be used to regenerate RuBP, allowing the Calvin cycle to continue.</a:t>
+              <a:t>However, excessively high levels of CO2 can have negative effects on plant growth and development. High CO2 levels can interfere with the regulation of stomata, the tiny pores on the undersides of leaves that control gas exchange. When CO2 levels are high, plants may close their stomata to conserve water, but this also limits the influx of CO2 needed for photosynthesis. As a result, photosynthesis may be inhibited, leading to reduced growth and yield.</a:t>
             </a:r>
           </a:p>
           <a:p/>
           <a:p>
             <a:r>
-              <a:t>In essence, water plays a dual role in photosynthesis: it provides the starting material for the process, supplying the carbon needed to build carbohydrates, and it serves as a crucial intermediary, generating the energy required to drive the process forward. The conversion of water into oxygen is a byproduct of this process, making photosynthesis not only essential for life on Earth but also responsible for maintaining our planet's atmosphere.</a:t>
+              <a:t>Moreover, the increased CO2 concentration in the atmosphere is a significant contributor to global warming and climate change. This is because CO2 is one of the major greenhouse gases that trap heat in the Earth's atmosphere, causing the average global temperature to rise.</a:t>
             </a:r>
           </a:p>
           <a:p/>
           <a:p>
             <a:r>
-              <a:t>Understanding the role of water in photosynthesis sheds light on the intricate balance between the environment and living organisms. It underscores the importance of water</a:t>
+              <a:t>In conclusion, Carbon Dioxide is an integral component of photosynthesis, playing a crucial role in the production of organic compounds and the maintenance of oxygen levels in the atmosphere. However, while increases in CO2 can enhance photosynthetic efficiency under certain conditions, excessive levels can have detrimental effects on plant growth and contribute to global warming. Therefore, understanding the role of CO2 in photosynthesis is essential for developing strategies to mitigate climate change and ensure sustainable agriculture.</a:t>
             </a:r>
           </a:p>
         </p:txBody>
@@ -801,6 +807,216 @@
 </file>
 
 <file path=ppt/notesSlides/notesSlide4.xml><?xml version="1.0" encoding="utf-8"?>
+<p:notes xmlns:a="http://schemas.openxmlformats.org/drawingml/2006/main" xmlns:p="http://schemas.openxmlformats.org/presentationml/2006/main" xmlns:r="http://schemas.openxmlformats.org/officeDocument/2006/relationships">
+  <p:cSld>
+    <p:spTree>
+      <p:nvGrpSpPr>
+        <p:cNvPr id="1" name=""/>
+        <p:cNvGrpSpPr/>
+        <p:nvPr/>
+      </p:nvGrpSpPr>
+      <p:grpSpPr>
+        <a:xfrm>
+          <a:off x="0" y="0"/>
+          <a:ext cx="0" cy="0"/>
+          <a:chOff x="0" y="0"/>
+          <a:chExt cx="0" cy="0"/>
+        </a:xfrm>
+      </p:grpSpPr>
+      <p:sp>
+        <p:nvSpPr>
+          <p:cNvPr id="2" name="Slide Image Placeholder 1"/>
+          <p:cNvSpPr>
+            <a:spLocks noGrp="1"/>
+          </p:cNvSpPr>
+          <p:nvPr>
+            <p:ph type="sldImg" idx="2"/>
+          </p:nvPr>
+        </p:nvSpPr>
+        <p:spPr/>
+      </p:sp>
+      <p:sp>
+        <p:nvSpPr>
+          <p:cNvPr id="3" name="Notes Placeholder 2"/>
+          <p:cNvSpPr>
+            <a:spLocks noGrp="1"/>
+          </p:cNvSpPr>
+          <p:nvPr>
+            <p:ph type="body" idx="3" sz="quarter"/>
+          </p:nvPr>
+        </p:nvSpPr>
+        <p:spPr/>
+        <p:txBody>
+          <a:bodyPr/>
+          <a:lstStyle/>
+          <a:p/>
+          <a:p/>
+          <a:p>
+            <a:r>
+              <a:t>Sunlight plays a pivotal role in the process of photosynthesis, which is the fundamental life-sustaining process for most organisms on Earth. This intricate biochemical reaction converts carbon dioxide and water into glucose (or other sugars) and releases oxygen as a byproduct. The primary source of energy for this transformation is sunlight.</a:t>
+            </a:r>
+          </a:p>
+          <a:p/>
+          <a:p>
+            <a:r>
+              <a:t>Photosynthesis can be divided into two main stages: the light-dependent reactions and the light-independent reactions, both of which are reliant on sunlight.</a:t>
+            </a:r>
+          </a:p>
+          <a:p/>
+          <a:p>
+            <a:r>
+              <a:t>During the light-dependent reactions, which occur in the thylakoid membrane of chloroplasts, sunlight is absorbed by pigments such as chlorophyll, carotenoids, and phycobilins. This absorption of light energy triggers a series of events that lead to the creation of ATP (adenosine triphosphate) and NADPH (nicotinamide adenine dinucleotide phosphate). These molecules serve as high-energy currency and reducing agents, respectively, providing the necessary energy and electrons for the subsequent light-independent reactions.</a:t>
+            </a:r>
+          </a:p>
+          <a:p/>
+          <a:p>
+            <a:r>
+              <a:t>The light-independent reactions, also known as the Calvin cycle or carbon fixation, take place in the stroma of the chloroplasts. Here, carbon dioxide molecules are fixed into organic compounds through a series of enzymatic reactions. The initial step involves the conversion of ribulose bisphosphate (RuBP) into two molecules of 3-phosphoglycerate (3PG), using the energy from ATP and the electrons from NADPH. The 3PG then undergoes further transformations to eventually form glucose or other sugars.</a:t>
+            </a:r>
+          </a:p>
+          <a:p/>
+          <a:p>
+            <a:r>
+              <a:t>It is essential to note that not all sunlight energy is efficiently utilized during photosynthesis. Some of the energy is lost as heat, while some is emitted as fluorescent light. Moreover, the efficiency of photosynthesis can be influenced by various factors such as temperature, light intensity, and the concentration of carbon dioxide. For instance, an increase in temperature beyond optimal levels can decrease the rate of photosynthesis, while a decrease in carbon dioxide concentration can hinder the fixation of carbon dioxide into organic compounds.</a:t>
+            </a:r>
+          </a:p>
+          <a:p/>
+          <a:p>
+            <a:r>
+              <a:t>In conclusion, sunlight is indispensable for photosynthesis, serving as the primary source of energy. Through the light-dependent and light-independent reactions, carbon dioxide and water are converted into glucose, releasing oxygen as a byproduct. However, the efficiency of photosynthesis can be affected by environmental factors, making it crucial for organisms to adapt to their specific conditions to optimize this vital process. Understanding the intricacies of photosynthesis and its dependence on sunlight provides valuable insights into the workings of ecosystems and the potential impacts of climate change on these processes.</a:t>
+            </a:r>
+          </a:p>
+        </p:txBody>
+      </p:sp>
+      <p:sp>
+        <p:nvSpPr>
+          <p:cNvPr id="4" name="Slide Number Placeholder 3"/>
+          <p:cNvSpPr>
+            <a:spLocks noGrp="1"/>
+          </p:cNvSpPr>
+          <p:nvPr>
+            <p:ph type="sldNum" idx="5" sz="quarter"/>
+          </p:nvPr>
+        </p:nvSpPr>
+        <p:spPr/>
+      </p:sp>
+    </p:spTree>
+  </p:cSld>
+  <p:clrMapOvr>
+    <a:masterClrMapping/>
+  </p:clrMapOvr>
+</p:notes>
+</file>
+
+<file path=ppt/notesSlides/notesSlide5.xml><?xml version="1.0" encoding="utf-8"?>
+<p:notes xmlns:a="http://schemas.openxmlformats.org/drawingml/2006/main" xmlns:p="http://schemas.openxmlformats.org/presentationml/2006/main" xmlns:r="http://schemas.openxmlformats.org/officeDocument/2006/relationships">
+  <p:cSld>
+    <p:spTree>
+      <p:nvGrpSpPr>
+        <p:cNvPr id="1" name=""/>
+        <p:cNvGrpSpPr/>
+        <p:nvPr/>
+      </p:nvGrpSpPr>
+      <p:grpSpPr>
+        <a:xfrm>
+          <a:off x="0" y="0"/>
+          <a:ext cx="0" cy="0"/>
+          <a:chOff x="0" y="0"/>
+          <a:chExt cx="0" cy="0"/>
+        </a:xfrm>
+      </p:grpSpPr>
+      <p:sp>
+        <p:nvSpPr>
+          <p:cNvPr id="2" name="Slide Image Placeholder 1"/>
+          <p:cNvSpPr>
+            <a:spLocks noGrp="1"/>
+          </p:cNvSpPr>
+          <p:nvPr>
+            <p:ph type="sldImg" idx="2"/>
+          </p:nvPr>
+        </p:nvSpPr>
+        <p:spPr/>
+      </p:sp>
+      <p:sp>
+        <p:nvSpPr>
+          <p:cNvPr id="3" name="Notes Placeholder 2"/>
+          <p:cNvSpPr>
+            <a:spLocks noGrp="1"/>
+          </p:cNvSpPr>
+          <p:nvPr>
+            <p:ph type="body" idx="3" sz="quarter"/>
+          </p:nvPr>
+        </p:nvSpPr>
+        <p:spPr/>
+        <p:txBody>
+          <a:bodyPr/>
+          <a:lstStyle/>
+          <a:p/>
+          <a:p/>
+          <a:p>
+            <a:r>
+              <a:t>Glucose, a simple sugar with the chemical formula C6H12O6, plays a crucial role in the process of photosynthesis. This essential biomolecule serves as a primary energy storage and transport molecule within plant cells. The process of photosynthesis, carried out by green plants, algae, and some bacteria, converts carbon dioxide, water, and light energy into glucose and oxygen.</a:t>
+            </a:r>
+          </a:p>
+          <a:p/>
+          <a:p>
+            <a:r>
+              <a:t>The process of photosynthesis can be divided into two main stages: the light-dependent reactions and the light-independent reactions, also known as the Calvin cycle. In the first stage, light energy is captured by pigments such as chlorophyll and carotenoids, located in the thylakoid membranes of chloroplasts. This energy is used to produce ATP (adenosine triphosphate) and NADPH (nicotinamide adenine dinucleotide phosphate), which are vital for the next phase of photosynthesis.</a:t>
+            </a:r>
+          </a:p>
+          <a:p/>
+          <a:p>
+            <a:r>
+              <a:t>ATP and NADPH are then utilized in the Calvin cycle, the second stage of photosynthesis, to convert carbon dioxide into glucose. The Calvin cycle takes place in the stroma of the chloroplasts. During this cycle, carbon dioxide is fixed into an organic compound called a five-carbon sugar, or RuBP (ribulose bisphosphate). This reaction requires energy from ATP and an electron donor from NADPH.</a:t>
+            </a:r>
+          </a:p>
+          <a:p/>
+          <a:p>
+            <a:r>
+              <a:t>The five-carbon sugar then splits into two three-carbon sugars, 3-phosphoglycerate. These intermediates are further processed through a series of reactions, resulting in the production of glucose-6-phosphate. This compound is then converted into glucose, ready for use by the plant or for storage.</a:t>
+            </a:r>
+          </a:p>
+          <a:p/>
+          <a:p>
+            <a:r>
+              <a:t>It is important to note that not all of the glucose produced in photosynthesis is stored within the plant. Some glucose is immediately used for energy needs, while excess glucose may be converted into other carbohydrates such as starch or cellulose for long-term storage.</a:t>
+            </a:r>
+          </a:p>
+          <a:p/>
+          <a:p>
+            <a:r>
+              <a:t>In addition to its role in photosynthesis, glucose is also involved in other metabolic pathways within the plant. For example, it can be broken down through glycolysis to produce ATP, providing energy for various cellular processes. Glucose can also be used in the synthesis of more complex compounds, such as polysaccharides, proteins, and lipids.</a:t>
+            </a:r>
+          </a:p>
+          <a:p/>
+          <a:p>
+            <a:r>
+              <a:t>In conclusion, glucose is a fundamental molecule in the process of photosynthesis, playing a key role in the conversion of carbon dioxide and light energy into glucose and oxygen. Its production and utilization within the plant are integral to the survival and growth of these organisms. Furthermore, glucose is involved in various metabolic pathways, serving as a versatile energy source and building block for many cellular components.</a:t>
+            </a:r>
+          </a:p>
+        </p:txBody>
+      </p:sp>
+      <p:sp>
+        <p:nvSpPr>
+          <p:cNvPr id="4" name="Slide Number Placeholder 3"/>
+          <p:cNvSpPr>
+            <a:spLocks noGrp="1"/>
+          </p:cNvSpPr>
+          <p:nvPr>
+            <p:ph type="sldNum" idx="5" sz="quarter"/>
+          </p:nvPr>
+        </p:nvSpPr>
+        <p:spPr/>
+      </p:sp>
+    </p:spTree>
+  </p:cSld>
+  <p:clrMapOvr>
+    <a:masterClrMapping/>
+  </p:clrMapOvr>
+</p:notes>
+</file>
+
+<file path=ppt/notesSlides/notesSlide6.xml><?xml version="1.0" encoding="utf-8"?>
 <p:notes xmlns:a="http://schemas.openxmlformats.org/drawingml/2006/main" xmlns:p="http://schemas.openxmlformats.org/presentationml/2006/main" xmlns:r="http://schemas.openxmlformats.org/officeDocument/2006/relationships">
   <p:cSld>
     <p:spTree>
@@ -4040,7 +4256,7 @@
                 </a:solidFill>
                 <a:latin typeface="Arial"/>
               </a:rPr>
-              <a:t>Carbon dioxide</a:t>
+              <a:t>Chloroplasts</a:t>
             </a:r>
           </a:p>
         </p:txBody>
@@ -4158,7 +4374,7 @@
                 </a:solidFill>
                 <a:latin typeface="Arial"/>
               </a:rPr>
-              <a:t>Water</a:t>
+              <a:t>Carbon dioxide</a:t>
             </a:r>
           </a:p>
         </p:txBody>
@@ -4196,6 +4412,242 @@
 </file>
 
 <file path=ppt/slides/slide4.xml><?xml version="1.0" encoding="utf-8"?>
+<p:sld xmlns:a="http://schemas.openxmlformats.org/drawingml/2006/main" xmlns:p="http://schemas.openxmlformats.org/presentationml/2006/main" xmlns:r="http://schemas.openxmlformats.org/officeDocument/2006/relationships">
+  <p:cSld>
+    <p:bg>
+      <p:bgPr>
+        <a:solidFill>
+          <a:srgbClr val="000000"/>
+        </a:solidFill>
+        <a:effectLst/>
+      </p:bgPr>
+    </p:bg>
+    <p:spTree>
+      <p:nvGrpSpPr>
+        <p:cNvPr id="1" name=""/>
+        <p:cNvGrpSpPr/>
+        <p:nvPr/>
+      </p:nvGrpSpPr>
+      <p:grpSpPr/>
+      <p:sp>
+        <p:nvSpPr>
+          <p:cNvPr id="2" name="Title 1"/>
+          <p:cNvSpPr>
+            <a:spLocks noGrp="1"/>
+          </p:cNvSpPr>
+          <p:nvPr>
+            <p:ph type="ctrTitle"/>
+          </p:nvPr>
+        </p:nvSpPr>
+        <p:spPr/>
+        <p:txBody>
+          <a:bodyPr/>
+          <a:lstStyle/>
+          <a:p/>
+        </p:txBody>
+      </p:sp>
+      <p:sp>
+        <p:nvSpPr>
+          <p:cNvPr id="3" name="Subtitle 2"/>
+          <p:cNvSpPr>
+            <a:spLocks noGrp="1"/>
+          </p:cNvSpPr>
+          <p:nvPr>
+            <p:ph type="subTitle" idx="1"/>
+          </p:nvPr>
+        </p:nvSpPr>
+        <p:spPr/>
+        <p:txBody>
+          <a:bodyPr/>
+          <a:lstStyle/>
+          <a:p/>
+        </p:txBody>
+      </p:sp>
+      <p:sp>
+        <p:nvSpPr>
+          <p:cNvPr id="4" name="TextBox 3"/>
+          <p:cNvSpPr txBox="1"/>
+          <p:nvPr/>
+        </p:nvSpPr>
+        <p:spPr>
+          <a:xfrm>
+            <a:off x="457200" y="457200"/>
+            <a:ext cx="7315200" cy="914400"/>
+          </a:xfrm>
+          <a:prstGeom prst="rect">
+            <a:avLst/>
+          </a:prstGeom>
+          <a:noFill/>
+        </p:spPr>
+        <p:txBody>
+          <a:bodyPr wrap="none">
+            <a:spAutoFit/>
+          </a:bodyPr>
+          <a:lstStyle/>
+          <a:p>
+            <a:r>
+              <a:rPr sz="3200">
+                <a:solidFill>
+                  <a:srgbClr val="FFFFFF"/>
+                </a:solidFill>
+                <a:latin typeface="Arial"/>
+              </a:rPr>
+              <a:t>Sunlight</a:t>
+            </a:r>
+          </a:p>
+        </p:txBody>
+      </p:sp>
+      <p:pic>
+        <p:nvPicPr>
+          <p:cNvPr id="5" name="Picture 4" descr="image3.jpeg"/>
+          <p:cNvPicPr>
+            <a:picLocks noChangeAspect="1"/>
+          </p:cNvPicPr>
+          <p:nvPr/>
+        </p:nvPicPr>
+        <p:blipFill>
+          <a:blip r:embed="rId3"/>
+          <a:stretch>
+            <a:fillRect/>
+          </a:stretch>
+        </p:blipFill>
+        <p:spPr>
+          <a:xfrm>
+            <a:off x="0" y="1097280"/>
+            <a:ext cx="11025301" cy="5760720"/>
+          </a:xfrm>
+          <a:prstGeom prst="rect">
+            <a:avLst/>
+          </a:prstGeom>
+        </p:spPr>
+      </p:pic>
+    </p:spTree>
+  </p:cSld>
+  <p:clrMapOvr>
+    <a:masterClrMapping/>
+  </p:clrMapOvr>
+</p:sld>
+</file>
+
+<file path=ppt/slides/slide5.xml><?xml version="1.0" encoding="utf-8"?>
+<p:sld xmlns:a="http://schemas.openxmlformats.org/drawingml/2006/main" xmlns:p="http://schemas.openxmlformats.org/presentationml/2006/main" xmlns:r="http://schemas.openxmlformats.org/officeDocument/2006/relationships">
+  <p:cSld>
+    <p:bg>
+      <p:bgPr>
+        <a:solidFill>
+          <a:srgbClr val="000000"/>
+        </a:solidFill>
+        <a:effectLst/>
+      </p:bgPr>
+    </p:bg>
+    <p:spTree>
+      <p:nvGrpSpPr>
+        <p:cNvPr id="1" name=""/>
+        <p:cNvGrpSpPr/>
+        <p:nvPr/>
+      </p:nvGrpSpPr>
+      <p:grpSpPr/>
+      <p:sp>
+        <p:nvSpPr>
+          <p:cNvPr id="2" name="Title 1"/>
+          <p:cNvSpPr>
+            <a:spLocks noGrp="1"/>
+          </p:cNvSpPr>
+          <p:nvPr>
+            <p:ph type="ctrTitle"/>
+          </p:nvPr>
+        </p:nvSpPr>
+        <p:spPr/>
+        <p:txBody>
+          <a:bodyPr/>
+          <a:lstStyle/>
+          <a:p/>
+        </p:txBody>
+      </p:sp>
+      <p:sp>
+        <p:nvSpPr>
+          <p:cNvPr id="3" name="Subtitle 2"/>
+          <p:cNvSpPr>
+            <a:spLocks noGrp="1"/>
+          </p:cNvSpPr>
+          <p:nvPr>
+            <p:ph type="subTitle" idx="1"/>
+          </p:nvPr>
+        </p:nvSpPr>
+        <p:spPr/>
+        <p:txBody>
+          <a:bodyPr/>
+          <a:lstStyle/>
+          <a:p/>
+        </p:txBody>
+      </p:sp>
+      <p:sp>
+        <p:nvSpPr>
+          <p:cNvPr id="4" name="TextBox 3"/>
+          <p:cNvSpPr txBox="1"/>
+          <p:nvPr/>
+        </p:nvSpPr>
+        <p:spPr>
+          <a:xfrm>
+            <a:off x="457200" y="457200"/>
+            <a:ext cx="7315200" cy="914400"/>
+          </a:xfrm>
+          <a:prstGeom prst="rect">
+            <a:avLst/>
+          </a:prstGeom>
+          <a:noFill/>
+        </p:spPr>
+        <p:txBody>
+          <a:bodyPr wrap="none">
+            <a:spAutoFit/>
+          </a:bodyPr>
+          <a:lstStyle/>
+          <a:p>
+            <a:r>
+              <a:rPr sz="3200">
+                <a:solidFill>
+                  <a:srgbClr val="FFFFFF"/>
+                </a:solidFill>
+                <a:latin typeface="Arial"/>
+              </a:rPr>
+              <a:t>Glucose</a:t>
+            </a:r>
+          </a:p>
+        </p:txBody>
+      </p:sp>
+      <p:pic>
+        <p:nvPicPr>
+          <p:cNvPr id="5" name="Picture 4" descr="image4.jpeg"/>
+          <p:cNvPicPr>
+            <a:picLocks noChangeAspect="1"/>
+          </p:cNvPicPr>
+          <p:nvPr/>
+        </p:nvPicPr>
+        <p:blipFill>
+          <a:blip r:embed="rId3"/>
+          <a:stretch>
+            <a:fillRect/>
+          </a:stretch>
+        </p:blipFill>
+        <p:spPr>
+          <a:xfrm>
+            <a:off x="0" y="1097280"/>
+            <a:ext cx="11025301" cy="5760720"/>
+          </a:xfrm>
+          <a:prstGeom prst="rect">
+            <a:avLst/>
+          </a:prstGeom>
+        </p:spPr>
+      </p:pic>
+    </p:spTree>
+  </p:cSld>
+  <p:clrMapOvr>
+    <a:masterClrMapping/>
+  </p:clrMapOvr>
+</p:sld>
+</file>
+
+<file path=ppt/slides/slide6.xml><?xml version="1.0" encoding="utf-8"?>
 <p:sld xmlns:a="http://schemas.openxmlformats.org/drawingml/2006/main" xmlns:p="http://schemas.openxmlformats.org/presentationml/2006/main" xmlns:r="http://schemas.openxmlformats.org/officeDocument/2006/relationships">
   <p:cSld>
     <p:bg>

</xml_diff>

<commit_message>
New LLM, fix small issues
</commit_message>
<xml_diff>
--- a/Flask-Project/test1.pptx
+++ b/Flask-Project/test1.pptx
@@ -10,7 +10,6 @@
     <p:sldId id="258" r:id="rId10"/>
     <p:sldId id="259" r:id="rId11"/>
     <p:sldId id="260" r:id="rId12"/>
-    <p:sldId id="261" r:id="rId13"/>
   </p:sldIdLst>
   <p:sldSz cx="9144000" cy="6858000" type="screen4x3"/>
   <p:notesSz cx="6858000" cy="9144000"/>
@@ -507,55 +506,37 @@
           <a:lstStyle/>
           <a:p>
             <a:r>
-              <a:t>.</a:t>
+              <a:t> Photosynthesis is the process of converting light energy obtained from the sun into chemical energy in the form of glucose. The process occurs in the chloroplasts of plant cells and involves the capture of sunlight by pigment molecules, which includes chlorophyll. This light energy is converted into chemical energy through a series of complex reactions, which result in the formation of glucose. The overall reaction for photosynthesis is as follows:</a:t>
             </a:r>
           </a:p>
           <a:p/>
           <a:p>
             <a:r>
-              <a:t>Photosynthesis, a fundamental process for life on Earth, is the biochemical pathway by which green plants, algae, and some bacteria convert carbon dioxide into organic compounds, while concurrently releasing oxygen as a waste product. This process is crucial for maintaining the Earth's atmosphere and supporting all aerobic organisms, including humans.</a:t>
+              <a:t>6 CO2 + 6 H2O + light energy → C6H12O6 + 6 O2</a:t>
             </a:r>
           </a:p>
           <a:p/>
           <a:p>
             <a:r>
-              <a:t>The process of photosynthesis can be divided into two main phases: the light-dependent reactions and the light-independent reactions, also known as the Calvin cycle. The light-dependent reactions occur in the thylakoid membrane of the chloroplast, where energy from sunlight is captured and converted into chemical energy.</a:t>
+              <a:t>Photosynthesis can be divided into two main stages: the light-dependent reactions and the light-independent reactions. The light-dependent reactions involve the splitting of water molecules into oxygen, protons, and electrons. The oxygen is released into the atmosphere, while the protons and electrons are used in the light-independent reactions. The light-independent reactions, also known as the Calvin Cycle, involve the fixation of carbon dioxide into organic compounds such as glucose.</a:t>
             </a:r>
           </a:p>
           <a:p/>
           <a:p>
             <a:r>
-              <a:t>The first step in the light-dependent reactions is the absorption of photons by pigments, primarily chlorophyll, located within the thylakoid membrane. These pigments absorb light energy and transfer it to a reaction center, initiating a series of redox reactions. The initial electron donor is water (H2O), which is split into protons (H+), electrons (e-), and molecular oxygen (O2). The protons are used to create an electrochemical gradient across the thylakoid membrane, driving the synthesis of ATP (adenosine triphosphate) via ATP synthase. The electrons, meanwhile, travel through a series of proteins called electron transport chains, ultimately reducing NADP+ (nicotinamide adenine dinucleotide phosphate) to NADPH (reduced nicotinamide adenine dinucleotide phosphate).</a:t>
+              <a:t>Photosynthesis is essential for life on Earth, as it provides the primary source of organic compounds for the food chain. Plants, algae, and some bacteria are capable of photosynthesis, while other organisms, including animals, rely on these organisms for nourishment. The process of photosynthesis also plays a crucial role in regulating the Earth's atmosphere by removing carbon dioxide and releasing oxygen.</a:t>
             </a:r>
           </a:p>
           <a:p/>
           <a:p>
             <a:r>
-              <a:t>The ATP and NADPH produced during the light-dependent reactions serve as energy carriers for the light-independent reactions, which take place in the stroma of the chloroplast. In this phase, carbon dioxide is fixed into organic molecules, primarily glucose (C6H12O6). This process occurs in three stages: carbon fixation, reduction, and regeneration.</a:t>
+              <a:t>Photosynthesis occurs most efficiently under certain conditions, including optimal light intensity and temperature. The rate of photosynthesis can be affected by external factors such as sunlight intensity, carbon dioxide concentration, and water availability. Additionally, photosynthesis can be restricted by environmental factors such as pollution and climate change.</a:t>
             </a:r>
           </a:p>
           <a:p/>
           <a:p>
             <a:r>
-              <a:t>During carbon fixation, a five-carbon sugar called ribulose bisphosphate (RuBP) reacts with carbon dioxide to form two molecules of 3-phosphoglycerate. In the reduction stage, these intermediates are converted into 2-phosphoglycerate, which is then phosphorylated to form one molecule each of glyceraldehyde 3-phosphate (G3P) and 3-phosphoglycerate. Finally, in the regeneration stage, G3P is converted back into RuBP, allowing the process to repeat.</a:t>
-            </a:r>
-          </a:p>
-          <a:p/>
-          <a:p>
-            <a:r>
-              <a:t>The overall equation for photosynthesis can be represented as follows:</a:t>
-            </a:r>
-          </a:p>
-          <a:p/>
-          <a:p>
-            <a:r>
-              <a:t>6 CO2 + 6 H2O + light energy → C6H12O6 + 6 O2 + 6 H2O</a:t>
-            </a:r>
-          </a:p>
-          <a:p/>
-          <a:p>
-            <a:r>
-              <a:t>This equation illustrates that for every six molecules of carbon dioxide absorbed, six molecules of glucose are produced, along with six molecules of water and six molecules of oxygen. The oxygen is released as a waste product, while the glucose serves as food for the plant,</a:t>
+              <a:t>Photosynthesis research has a significant impact on many areas, including agriculture, biotechnology, and environmental science. Improvements in photosynthesis technology can lead to the development of new crops with increased yields and nutritional content, as well as the production of biofuels from plant-based resources. Scientists continue to investigate methods for enhancing the efficiency of photosynthesis, such as genetic engineering and the development of new pigment molecules.</a:t>
             </a:r>
           </a:p>
         </p:txBody>
@@ -625,49 +606,25 @@
           <a:lstStyle/>
           <a:p>
             <a:r>
-              <a:t>:</a:t>
+              <a:t> Photosynthesis is a process that plants use to create food for themselves. It is a complex process that involves the conversion of light energy, water, and carbon dioxide into glucose, oxygen, and water. In other words, photosynthesis enables plants to make their own food.</a:t>
             </a:r>
           </a:p>
           <a:p/>
           <a:p>
             <a:r>
-              <a:t>Chloroplasts are the powerhouses of the plant kingdom, playing a pivotal role in photosynthesis. These organelles are found within the eukaryotic cells of green plants, algae, and some bacteria, and they are responsible for converting light energy into chemical energy through a process known as photophosphorylation.</a:t>
+              <a:t>Photosynthesis consists of two main stages: the light-dependent reactions and the light-independent reactions. The light-dependent reactions occur in the thylakoid membranes of the chloroplasts and involve the absorption of light energy by pigments such as chlorophyll. This light energy is then used to create ATP and NADPH, which are energy-rich molecules. The ATP is used to power the light-independent reactions, while the NADPH is used as a source of reducing power.</a:t>
             </a:r>
           </a:p>
           <a:p/>
           <a:p>
             <a:r>
-              <a:t>The structure of chloroplasts is intricate and complex, designed to facilitate the process of photosynthesis. The chloroplast contains a double membrane, with an intermembrane space between them. Within this double membrane lies the stroma, a fluid-like matrix that serves as the site for various metabolic reactions. The inner boundary of the double membrane houses the thylakoid membrane, which contains pigments such as chlorophyll, carotenoids, and phycobilins that absorb light energy.</a:t>
+              <a:t>The light-independent reactions, also known as the Calvin cycle, occur in the stroma of the chloroplasts. These reactions involve the use of the ATP and NADPH generated in the light-dependent reactions to convert carbon dioxide into glucose. Carbon dioxide is first bonded to a molecule called ribulose bisphosphate (RuBP) to form an unstable compound, which is then converted into two molecules of 3-phosphoglycerate (3-PGA). These molecules can then be converted into two molecules of glyceraldehyde-3-phosphate (G3P), which can then be used to synthesize glucose.</a:t>
             </a:r>
           </a:p>
           <a:p/>
           <a:p>
             <a:r>
-              <a:t>The thylakoid membrane is folded into sacs called thylakoids, which form a network of interconnected tubes. The lumen, or space within the thylakoids, is where the photosynthetic electron transport chain is located. This chain facilitates the transfer of electrons from water molecules to carbon dioxide, generating ATP (adenosine triphosphate) and NADPH (nicotinamide adenine dinucleotide phosphate), two crucial energy-carrying molecules.</a:t>
-            </a:r>
-          </a:p>
-          <a:p/>
-          <a:p>
-            <a:r>
-              <a:t>The light-dependent reactions occur within the thylakoid membrane. During these reactions, sunlight is absorbed by chlorophyll, triggering a series of events that result in the production of ATP and NADPH. The light-independent reactions, also known as the Calvin cycle, take place in the stroma. Here, carbon dioxide is fixed into organic compounds using the energy stored in ATP and NADPH.</a:t>
-            </a:r>
-          </a:p>
-          <a:p/>
-          <a:p>
-            <a:r>
-              <a:t>The chloroplast also contains several other important components. For instance, the ribosomes, which are essential for protein synthesis, are found on the outer surface of the chloroplast. Additionally, the chloroplast genome, located within the chloroplast, encodes genes necessary for the synthesis of proteins involved in photosynthesis.</a:t>
-            </a:r>
-          </a:p>
-          <a:p/>
-          <a:p>
-            <a:r>
-              <a:t>The efficiency of photosynthesis depends on various factors, including the amount of sunlight, temperature, and the availability of carbon dioxide. Chloroplasts have evolved mechanisms to adapt to these changing conditions. For example, they can adjust the number of thylakoids, change the orientation of their chlorophyll molecules, and regulate the opening and closing of stomata, small pores on the plant's leaves that allow for gas exchange.</a:t>
-            </a:r>
-          </a:p>
-          <a:p/>
-          <a:p>
-            <a:r>
-              <a:t>In conclusion, chloroplasts play a vital role in photosynthesis, the process by which plants convert light energy into chemical energy. They contain a complex structure that facilitates both light-dependent and light-independent reactions, and they possess mechanisms to adapt to varying environmental conditions. Understanding the role and structure of chloroplasts provides valuable insights into the workings of photosynthesis and the overall health of plants.</a:t>
+              <a:t>Overall, photosynthesis is an essential process that enables plants to produce their own food. It is necessary for the survival of plants and for the entire food chain, as it provides the primary source of energy and carbon for both plants and animals. Through photosynthesis, plants are able to convert light energy into chemical energy, creating a sustainable source of food for themselves and for all living organisms.</a:t>
             </a:r>
           </a:p>
         </p:txBody>
@@ -735,53 +692,39 @@
         <p:txBody>
           <a:bodyPr/>
           <a:lstStyle/>
+          <a:p>
+            <a:r>
+              <a:t> Chloroplasts are specialized organelles found in plant cells that contain the pigment chlorophyll. This green pigment absorbs light energy from the sun and uses it to convert carbon dioxide and water into glucose and oxygen through a process called photosynthesis.</a:t>
+            </a:r>
+          </a:p>
           <a:p/>
+          <a:p>
+            <a:r>
+              <a:t>Chlorophyll is made up of a porphyrin ring, which is similar to heme, and long hydrocarbon chains. It has a characteristic blue-green absorbance spectrum that is best suited for capturing light energy from the sun's blue and red wavelengths, which are most abundant. Chlorophyll captures light energy at approximately 430 and 640 nanometers, which are in the blue and red parts of the visible spectrum.</a:t>
+            </a:r>
+          </a:p>
           <a:p/>
           <a:p>
             <a:r>
-              <a:t>Carbon Dioxide (CO2) plays a pivotal role in the process of photosynthesis, a fundamental biological process that converts carbon dioxide and water into glucose and oxygen. This cyclical process is essential for life on Earth, as it provides organisms with energy and maintains the planet's oxygen levels.</a:t>
+              <a:t>The chloroplasts are organized into a specialized organelle called the chloroplast membrane, which is typically 2 to 3 nanometers thick. The membrane contains lipids that provide buoyancy and phospholipids that regulate ion flow into and out of the organelle. The membrane is surrounded by fluid, which provides a continuous interface for the exchange of materials with the cytoplasm.</a:t>
             </a:r>
           </a:p>
           <a:p/>
           <a:p>
             <a:r>
-              <a:t>In photosynthesis, CO2 serves as the primary source of carbon for the organic compounds that plants, algae, and certain bacteria produce. The carbon atom within CO2 is incorporated into complex molecules such as glucose, cellulose, and other carbohydrates through a series of reactions catalyzed by enzymes.</a:t>
+              <a:t>Once chlorophyll has absorbed light energy, it is used to excite electrons within the pigment molecule. This process is known as light-dependent reactions, which occur in the thylakoid membrane of the chloroplasts. The excited electrons are transferred through a series of protein complexes to a molecule called ATP synthase, which uses the energy to create ATP molecules. ATP is used as the energy currency of the cell and is important for powering many cellular processes.</a:t>
             </a:r>
           </a:p>
           <a:p/>
           <a:p>
             <a:r>
-              <a:t>The process begins when sunlight strikes the leaves of plants. Chlorophyll, a green pigment found in chloroplasts, absorbs light energy, which is then used to split water molecules into hydrogen and oxygen. The oxygen is released as a waste product, while the hydrogen is used in subsequent reactions.</a:t>
+              <a:t>In addition to light-dependent reactions, the chloroplasts also contain an enzyme called rubisco, which catalyzes the light-independent reactions of photosynthesis. These reactions use ATP and NADPH produced in the light-dependent reactions to drive the conversion of carbon dioxide into glucose, a process called calcination. The glucose produced is used by the plant for energy or stored as starch for later use.</a:t>
             </a:r>
           </a:p>
           <a:p/>
           <a:p>
             <a:r>
-              <a:t>The hydrogen, along with CO2, undergoes a series of reactions known as the Calvin cycle or carbon fixation. During this process, an enzyme called rubisco (ribulose bisphosphate carboxylase/oxygenase) facilitates the conversion of CO2 into an organic compound called 3-phosphoglycerate. This compound is then further converted into glucose and other carbohydrates.</a:t>
-            </a:r>
-          </a:p>
-          <a:p/>
-          <a:p>
-            <a:r>
-              <a:t>It is important to note that the CO2 uptake by plants is not infinite. Factors such as the concentration of CO2 in the air, light intensity, and temperature can influence the rate of photosynthesis. For instance, an increase in CO2 concentration can lead to an enhancement of photosynthetic efficiency due to the higher availability of CO2 for the Calvin cycle.</a:t>
-            </a:r>
-          </a:p>
-          <a:p/>
-          <a:p>
-            <a:r>
-              <a:t>However, excessively high levels of CO2 can have negative effects on plant growth and development. High CO2 levels can interfere with the regulation of stomata, the tiny pores on the undersides of leaves that control gas exchange. When CO2 levels are high, plants may close their stomata to conserve water, but this also limits the influx of CO2 needed for photosynthesis. As a result, photosynthesis may be inhibited, leading to reduced growth and yield.</a:t>
-            </a:r>
-          </a:p>
-          <a:p/>
-          <a:p>
-            <a:r>
-              <a:t>Moreover, the increased CO2 concentration in the atmosphere is a significant contributor to global warming and climate change. This is because CO2 is one of the major greenhouse gases that trap heat in the Earth's atmosphere, causing the average global temperature to rise.</a:t>
-            </a:r>
-          </a:p>
-          <a:p/>
-          <a:p>
-            <a:r>
-              <a:t>In conclusion, Carbon Dioxide is an integral component of photosynthesis, playing a crucial role in the production of organic compounds and the maintenance of oxygen levels in the atmosphere. However, while increases in CO2 can enhance photosynthetic efficiency under certain conditions, excessive levels can have detrimental effects on plant growth and contribute to global warming. Therefore, understanding the role of CO2 in photosynthesis is essential for developing strategies to mitigate climate change and ensure sustainable agriculture.</a:t>
+              <a:t>Overall, the chloroplasts in plant cells are key organelles for photosynthesis. They contain chlorophyll, which absorbs light energy, and they are organized in a specialized architecture</a:t>
             </a:r>
           </a:p>
         </p:txBody>
@@ -849,41 +792,21 @@
         <p:txBody>
           <a:bodyPr/>
           <a:lstStyle/>
+          <a:p>
+            <a:r>
+              <a:t> Photosynthesis is the process through which plants, algae, and some bacteria convert carbon dioxide and water into oxygen and organic compounds using solar energy. The process requires water, carbon dioxide, and sunlight. water is necessary for photosynthesis because it is used as a reactant in the process, and is essential for the functioning of the chloroplasts, the organelles where photosynthesis occurs. Carbon dioxide is also necessary for photosynthesis as it is used as a source of carbon for the production of glucose, one of the primary products of photosynthesis. Sunlight is the energy source for photosynthesis, it is absorbed by the pigments in the chloroplasts, primarily chlorophyll, which then use this energy to drive the chemical reactions that produce oxygen and organic compounds.</a:t>
+            </a:r>
+          </a:p>
           <a:p/>
+          <a:p>
+            <a:r>
+              <a:t>Photosynthesis is an essential process for life on Earth, as it produces the oxygen that we breathe and the food that we eat. However, the process is limited by the availability of the necessary ingredients. Water, carbon dioxide and sunlight are all essential for photosynthesis to occur, and any changes in the availability of these ingredients can have a significant impact on the ability of plants to carry out the process. For example, a lack of water can limit the ability of plants to photosynthesize and may cause growth and development problems. Similarly, an excess of carbon dioxide can lead to increased photosynthetic activity and an increase in the production of glucose, but can also lead to other negative effects such as increased oxygen levels and decreased carbon storage in soils and in the ocean.</a:t>
+            </a:r>
+          </a:p>
           <a:p/>
           <a:p>
             <a:r>
-              <a:t>Sunlight plays a pivotal role in the process of photosynthesis, which is the fundamental life-sustaining process for most organisms on Earth. This intricate biochemical reaction converts carbon dioxide and water into glucose (or other sugars) and releases oxygen as a byproduct. The primary source of energy for this transformation is sunlight.</a:t>
-            </a:r>
-          </a:p>
-          <a:p/>
-          <a:p>
-            <a:r>
-              <a:t>Photosynthesis can be divided into two main stages: the light-dependent reactions and the light-independent reactions, both of which are reliant on sunlight.</a:t>
-            </a:r>
-          </a:p>
-          <a:p/>
-          <a:p>
-            <a:r>
-              <a:t>During the light-dependent reactions, which occur in the thylakoid membrane of chloroplasts, sunlight is absorbed by pigments such as chlorophyll, carotenoids, and phycobilins. This absorption of light energy triggers a series of events that lead to the creation of ATP (adenosine triphosphate) and NADPH (nicotinamide adenine dinucleotide phosphate). These molecules serve as high-energy currency and reducing agents, respectively, providing the necessary energy and electrons for the subsequent light-independent reactions.</a:t>
-            </a:r>
-          </a:p>
-          <a:p/>
-          <a:p>
-            <a:r>
-              <a:t>The light-independent reactions, also known as the Calvin cycle or carbon fixation, take place in the stroma of the chloroplasts. Here, carbon dioxide molecules are fixed into organic compounds through a series of enzymatic reactions. The initial step involves the conversion of ribulose bisphosphate (RuBP) into two molecules of 3-phosphoglycerate (3PG), using the energy from ATP and the electrons from NADPH. The 3PG then undergoes further transformations to eventually form glucose or other sugars.</a:t>
-            </a:r>
-          </a:p>
-          <a:p/>
-          <a:p>
-            <a:r>
-              <a:t>It is essential to note that not all sunlight energy is efficiently utilized during photosynthesis. Some of the energy is lost as heat, while some is emitted as fluorescent light. Moreover, the efficiency of photosynthesis can be influenced by various factors such as temperature, light intensity, and the concentration of carbon dioxide. For instance, an increase in temperature beyond optimal levels can decrease the rate of photosynthesis, while a decrease in carbon dioxide concentration can hinder the fixation of carbon dioxide into organic compounds.</a:t>
-            </a:r>
-          </a:p>
-          <a:p/>
-          <a:p>
-            <a:r>
-              <a:t>In conclusion, sunlight is indispensable for photosynthesis, serving as the primary source of energy. Through the light-dependent and light-independent reactions, carbon dioxide and water are converted into glucose, releasing oxygen as a byproduct. However, the efficiency of photosynthesis can be affected by environmental factors, making it crucial for organisms to adapt to their specific conditions to optimize this vital process. Understanding the intricacies of photosynthesis and its dependence on sunlight provides valuable insights into the workings of ecosystems and the potential impacts of climate change on these processes.</a:t>
+              <a:t>In summary, photosynthesis is a vital process that requires water, carbon dioxide, and sunlight. The process produces oxygen and organic compounds, which are essential for life on Earth. The availability of these ingredients can have a significant impact on the ability of plants to carry out the process, and any changes in their availability can lead to negative effects on the planet's ecosystems. It's important to maintain a balance in the availability of these ingredients in order to ensure the continued existence of life on Earth.</a:t>
             </a:r>
           </a:p>
         </p:txBody>
@@ -909,114 +832,6 @@
 </file>
 
 <file path=ppt/notesSlides/notesSlide5.xml><?xml version="1.0" encoding="utf-8"?>
-<p:notes xmlns:a="http://schemas.openxmlformats.org/drawingml/2006/main" xmlns:p="http://schemas.openxmlformats.org/presentationml/2006/main" xmlns:r="http://schemas.openxmlformats.org/officeDocument/2006/relationships">
-  <p:cSld>
-    <p:spTree>
-      <p:nvGrpSpPr>
-        <p:cNvPr id="1" name=""/>
-        <p:cNvGrpSpPr/>
-        <p:nvPr/>
-      </p:nvGrpSpPr>
-      <p:grpSpPr>
-        <a:xfrm>
-          <a:off x="0" y="0"/>
-          <a:ext cx="0" cy="0"/>
-          <a:chOff x="0" y="0"/>
-          <a:chExt cx="0" cy="0"/>
-        </a:xfrm>
-      </p:grpSpPr>
-      <p:sp>
-        <p:nvSpPr>
-          <p:cNvPr id="2" name="Slide Image Placeholder 1"/>
-          <p:cNvSpPr>
-            <a:spLocks noGrp="1"/>
-          </p:cNvSpPr>
-          <p:nvPr>
-            <p:ph type="sldImg" idx="2"/>
-          </p:nvPr>
-        </p:nvSpPr>
-        <p:spPr/>
-      </p:sp>
-      <p:sp>
-        <p:nvSpPr>
-          <p:cNvPr id="3" name="Notes Placeholder 2"/>
-          <p:cNvSpPr>
-            <a:spLocks noGrp="1"/>
-          </p:cNvSpPr>
-          <p:nvPr>
-            <p:ph type="body" idx="3" sz="quarter"/>
-          </p:nvPr>
-        </p:nvSpPr>
-        <p:spPr/>
-        <p:txBody>
-          <a:bodyPr/>
-          <a:lstStyle/>
-          <a:p/>
-          <a:p/>
-          <a:p>
-            <a:r>
-              <a:t>Glucose, a simple sugar with the chemical formula C6H12O6, plays a crucial role in the process of photosynthesis. This essential biomolecule serves as a primary energy storage and transport molecule within plant cells. The process of photosynthesis, carried out by green plants, algae, and some bacteria, converts carbon dioxide, water, and light energy into glucose and oxygen.</a:t>
-            </a:r>
-          </a:p>
-          <a:p/>
-          <a:p>
-            <a:r>
-              <a:t>The process of photosynthesis can be divided into two main stages: the light-dependent reactions and the light-independent reactions, also known as the Calvin cycle. In the first stage, light energy is captured by pigments such as chlorophyll and carotenoids, located in the thylakoid membranes of chloroplasts. This energy is used to produce ATP (adenosine triphosphate) and NADPH (nicotinamide adenine dinucleotide phosphate), which are vital for the next phase of photosynthesis.</a:t>
-            </a:r>
-          </a:p>
-          <a:p/>
-          <a:p>
-            <a:r>
-              <a:t>ATP and NADPH are then utilized in the Calvin cycle, the second stage of photosynthesis, to convert carbon dioxide into glucose. The Calvin cycle takes place in the stroma of the chloroplasts. During this cycle, carbon dioxide is fixed into an organic compound called a five-carbon sugar, or RuBP (ribulose bisphosphate). This reaction requires energy from ATP and an electron donor from NADPH.</a:t>
-            </a:r>
-          </a:p>
-          <a:p/>
-          <a:p>
-            <a:r>
-              <a:t>The five-carbon sugar then splits into two three-carbon sugars, 3-phosphoglycerate. These intermediates are further processed through a series of reactions, resulting in the production of glucose-6-phosphate. This compound is then converted into glucose, ready for use by the plant or for storage.</a:t>
-            </a:r>
-          </a:p>
-          <a:p/>
-          <a:p>
-            <a:r>
-              <a:t>It is important to note that not all of the glucose produced in photosynthesis is stored within the plant. Some glucose is immediately used for energy needs, while excess glucose may be converted into other carbohydrates such as starch or cellulose for long-term storage.</a:t>
-            </a:r>
-          </a:p>
-          <a:p/>
-          <a:p>
-            <a:r>
-              <a:t>In addition to its role in photosynthesis, glucose is also involved in other metabolic pathways within the plant. For example, it can be broken down through glycolysis to produce ATP, providing energy for various cellular processes. Glucose can also be used in the synthesis of more complex compounds, such as polysaccharides, proteins, and lipids.</a:t>
-            </a:r>
-          </a:p>
-          <a:p/>
-          <a:p>
-            <a:r>
-              <a:t>In conclusion, glucose is a fundamental molecule in the process of photosynthesis, playing a key role in the conversion of carbon dioxide and light energy into glucose and oxygen. Its production and utilization within the plant are integral to the survival and growth of these organisms. Furthermore, glucose is involved in various metabolic pathways, serving as a versatile energy source and building block for many cellular components.</a:t>
-            </a:r>
-          </a:p>
-        </p:txBody>
-      </p:sp>
-      <p:sp>
-        <p:nvSpPr>
-          <p:cNvPr id="4" name="Slide Number Placeholder 3"/>
-          <p:cNvSpPr>
-            <a:spLocks noGrp="1"/>
-          </p:cNvSpPr>
-          <p:nvPr>
-            <p:ph type="sldNum" idx="5" sz="quarter"/>
-          </p:nvPr>
-        </p:nvSpPr>
-        <p:spPr/>
-      </p:sp>
-    </p:spTree>
-  </p:cSld>
-  <p:clrMapOvr>
-    <a:masterClrMapping/>
-  </p:clrMapOvr>
-</p:notes>
-</file>
-
-<file path=ppt/notesSlides/notesSlide6.xml><?xml version="1.0" encoding="utf-8"?>
 <p:notes xmlns:a="http://schemas.openxmlformats.org/drawingml/2006/main" xmlns:p="http://schemas.openxmlformats.org/presentationml/2006/main" xmlns:r="http://schemas.openxmlformats.org/officeDocument/2006/relationships">
   <p:cSld>
     <p:spTree>
@@ -4138,7 +3953,19 @@
                 </a:solidFill>
                 <a:latin typeface="Arial"/>
               </a:rPr>
-              <a:t>Photosynthesis</a:t>
+              <a:t>Photosynthesis:</a:t>
+            </a:r>
+          </a:p>
+          <a:p/>
+          <a:p>
+            <a:r>
+              <a:rPr sz="3200">
+                <a:solidFill>
+                  <a:srgbClr val="FFFFFF"/>
+                </a:solidFill>
+                <a:latin typeface="Arial"/>
+              </a:rPr>
+              <a:t>*process of converting light energy into chemical energy</a:t>
             </a:r>
           </a:p>
         </p:txBody>
@@ -4256,7 +4083,7 @@
                 </a:solidFill>
                 <a:latin typeface="Arial"/>
               </a:rPr>
-              <a:t>Chloroplasts</a:t>
+              <a:t>*plants use this process to create food for themselves</a:t>
             </a:r>
           </a:p>
         </p:txBody>
@@ -4374,7 +4201,7 @@
                 </a:solidFill>
                 <a:latin typeface="Arial"/>
               </a:rPr>
-              <a:t>Carbon dioxide</a:t>
+              <a:t>*chloroplasts in plant cells contain chlorophyll, which absorbs light energy</a:t>
             </a:r>
           </a:p>
         </p:txBody>
@@ -4492,7 +4319,7 @@
                 </a:solidFill>
                 <a:latin typeface="Arial"/>
               </a:rPr>
-              <a:t>Sunlight</a:t>
+              <a:t>*requires water, carbon dioxide, and sunlight</a:t>
             </a:r>
           </a:p>
         </p:txBody>
@@ -4530,124 +4357,6 @@
 </file>
 
 <file path=ppt/slides/slide5.xml><?xml version="1.0" encoding="utf-8"?>
-<p:sld xmlns:a="http://schemas.openxmlformats.org/drawingml/2006/main" xmlns:p="http://schemas.openxmlformats.org/presentationml/2006/main" xmlns:r="http://schemas.openxmlformats.org/officeDocument/2006/relationships">
-  <p:cSld>
-    <p:bg>
-      <p:bgPr>
-        <a:solidFill>
-          <a:srgbClr val="000000"/>
-        </a:solidFill>
-        <a:effectLst/>
-      </p:bgPr>
-    </p:bg>
-    <p:spTree>
-      <p:nvGrpSpPr>
-        <p:cNvPr id="1" name=""/>
-        <p:cNvGrpSpPr/>
-        <p:nvPr/>
-      </p:nvGrpSpPr>
-      <p:grpSpPr/>
-      <p:sp>
-        <p:nvSpPr>
-          <p:cNvPr id="2" name="Title 1"/>
-          <p:cNvSpPr>
-            <a:spLocks noGrp="1"/>
-          </p:cNvSpPr>
-          <p:nvPr>
-            <p:ph type="ctrTitle"/>
-          </p:nvPr>
-        </p:nvSpPr>
-        <p:spPr/>
-        <p:txBody>
-          <a:bodyPr/>
-          <a:lstStyle/>
-          <a:p/>
-        </p:txBody>
-      </p:sp>
-      <p:sp>
-        <p:nvSpPr>
-          <p:cNvPr id="3" name="Subtitle 2"/>
-          <p:cNvSpPr>
-            <a:spLocks noGrp="1"/>
-          </p:cNvSpPr>
-          <p:nvPr>
-            <p:ph type="subTitle" idx="1"/>
-          </p:nvPr>
-        </p:nvSpPr>
-        <p:spPr/>
-        <p:txBody>
-          <a:bodyPr/>
-          <a:lstStyle/>
-          <a:p/>
-        </p:txBody>
-      </p:sp>
-      <p:sp>
-        <p:nvSpPr>
-          <p:cNvPr id="4" name="TextBox 3"/>
-          <p:cNvSpPr txBox="1"/>
-          <p:nvPr/>
-        </p:nvSpPr>
-        <p:spPr>
-          <a:xfrm>
-            <a:off x="457200" y="457200"/>
-            <a:ext cx="7315200" cy="914400"/>
-          </a:xfrm>
-          <a:prstGeom prst="rect">
-            <a:avLst/>
-          </a:prstGeom>
-          <a:noFill/>
-        </p:spPr>
-        <p:txBody>
-          <a:bodyPr wrap="none">
-            <a:spAutoFit/>
-          </a:bodyPr>
-          <a:lstStyle/>
-          <a:p>
-            <a:r>
-              <a:rPr sz="3200">
-                <a:solidFill>
-                  <a:srgbClr val="FFFFFF"/>
-                </a:solidFill>
-                <a:latin typeface="Arial"/>
-              </a:rPr>
-              <a:t>Glucose</a:t>
-            </a:r>
-          </a:p>
-        </p:txBody>
-      </p:sp>
-      <p:pic>
-        <p:nvPicPr>
-          <p:cNvPr id="5" name="Picture 4" descr="image4.jpeg"/>
-          <p:cNvPicPr>
-            <a:picLocks noChangeAspect="1"/>
-          </p:cNvPicPr>
-          <p:nvPr/>
-        </p:nvPicPr>
-        <p:blipFill>
-          <a:blip r:embed="rId3"/>
-          <a:stretch>
-            <a:fillRect/>
-          </a:stretch>
-        </p:blipFill>
-        <p:spPr>
-          <a:xfrm>
-            <a:off x="0" y="1097280"/>
-            <a:ext cx="11025301" cy="5760720"/>
-          </a:xfrm>
-          <a:prstGeom prst="rect">
-            <a:avLst/>
-          </a:prstGeom>
-        </p:spPr>
-      </p:pic>
-    </p:spTree>
-  </p:cSld>
-  <p:clrMapOvr>
-    <a:masterClrMapping/>
-  </p:clrMapOvr>
-</p:sld>
-</file>
-
-<file path=ppt/slides/slide6.xml><?xml version="1.0" encoding="utf-8"?>
 <p:sld xmlns:a="http://schemas.openxmlformats.org/drawingml/2006/main" xmlns:p="http://schemas.openxmlformats.org/presentationml/2006/main" xmlns:r="http://schemas.openxmlformats.org/officeDocument/2006/relationships">
   <p:cSld>
     <p:bg>

</xml_diff>